<commit_message>
Progress Report Final Draft 1
</commit_message>
<xml_diff>
--- a/Files/Finle prgress, Team 1 Group 6.pptx
+++ b/Files/Finle prgress, Team 1 Group 6.pptx
@@ -13,6 +13,8 @@
     <p:sldId id="262" r:id="rId7"/>
     <p:sldId id="263" r:id="rId8"/>
     <p:sldId id="264" r:id="rId9"/>
+    <p:sldId id="265" r:id="rId10"/>
+    <p:sldId id="266" r:id="rId11"/>
   </p:sldIdLst>
   <p:sldSz cx="12192000" cy="6858000"/>
   <p:notesSz cx="6858000" cy="9144000"/>
@@ -7834,7 +7836,7 @@
 </p:sld>
 </file>
 
-<file path=ppt/slides/slide2.xml><?xml version="1.0" encoding="utf-8"?>
+<file path=ppt/slides/slide10.xml><?xml version="1.0" encoding="utf-8"?>
 <p:sld xmlns:a="http://schemas.openxmlformats.org/drawingml/2006/main" xmlns:r="http://schemas.openxmlformats.org/officeDocument/2006/relationships" xmlns:p="http://schemas.openxmlformats.org/presentationml/2006/main">
   <p:cSld>
     <p:bg>
@@ -7867,7 +7869,7 @@
                 <a16:creationId xmlns:a16="http://schemas.microsoft.com/office/drawing/2014/main" id="{0B0BBD46-E160-4D02-9D82-3934E3970C6C}"/>
               </a:ext>
               <a:ext uri="{C183D7F6-B498-43B3-948B-1728B52AA6E4}">
-                <adec:decorative xmlns:adec="http://schemas.microsoft.com/office/drawing/2017/decorative" xmlns="" val="1"/>
+                <adec:decorative xmlns="" xmlns:adec="http://schemas.microsoft.com/office/drawing/2017/decorative" val="1"/>
               </a:ext>
             </a:extLst>
           </p:cNvPr>
@@ -7927,7 +7929,7 @@
                 <a16:creationId xmlns:a16="http://schemas.microsoft.com/office/drawing/2014/main" id="{3114C8A4-DCE7-4155-98CA-D8826574B702}"/>
               </a:ext>
               <a:ext uri="{C183D7F6-B498-43B3-948B-1728B52AA6E4}">
-                <adec:decorative xmlns:adec="http://schemas.microsoft.com/office/drawing/2017/decorative" xmlns="" val="1"/>
+                <adec:decorative xmlns="" xmlns:adec="http://schemas.microsoft.com/office/drawing/2017/decorative" val="1"/>
               </a:ext>
             </a:extLst>
           </p:cNvPr>
@@ -7994,20 +7996,12 @@
           <a:lstStyle/>
           <a:p>
             <a:r>
-              <a:rPr lang="en-GB" dirty="0">
-                <a:solidFill>
-                  <a:srgbClr val="FFFFFF"/>
-                </a:solidFill>
-              </a:rPr>
-              <a:t>Program </a:t>
-            </a:r>
-            <a:r>
               <a:rPr lang="en-GB" dirty="0" smtClean="0">
                 <a:solidFill>
                   <a:srgbClr val="FFFFFF"/>
                 </a:solidFill>
               </a:rPr>
-              <a:t>progress</a:t>
+              <a:t>Any Questions?</a:t>
             </a:r>
             <a:endParaRPr lang="en-GB" dirty="0">
               <a:solidFill>
@@ -8025,7 +8019,7 @@
                 <a16:creationId xmlns:a16="http://schemas.microsoft.com/office/drawing/2014/main" id="{77A64E61-6D37-4CB3-8F42-66B0DACBCB0F}"/>
               </a:ext>
               <a:ext uri="{C183D7F6-B498-43B3-948B-1728B52AA6E4}">
-                <adec:decorative xmlns:adec="http://schemas.microsoft.com/office/drawing/2017/decorative" xmlns="" val="1"/>
+                <adec:decorative xmlns="" xmlns:adec="http://schemas.microsoft.com/office/drawing/2017/decorative" val="1"/>
               </a:ext>
             </a:extLst>
           </p:cNvPr>
@@ -8089,1450 +8083,6 @@
       </p:sp>
       <p:sp>
         <p:nvSpPr>
-          <p:cNvPr id="3" name="Content Placeholder 2">
-            <a:extLst>
-              <a:ext uri="{FF2B5EF4-FFF2-40B4-BE49-F238E27FC236}">
-                <a16:creationId xmlns:a16="http://schemas.microsoft.com/office/drawing/2014/main" id="{EC704661-2884-4E4D-AE8F-BEB655F5EEF2}"/>
-              </a:ext>
-            </a:extLst>
-          </p:cNvPr>
-          <p:cNvSpPr>
-            <a:spLocks noGrp="1"/>
-          </p:cNvSpPr>
-          <p:nvPr>
-            <p:ph idx="1"/>
-          </p:nvPr>
-        </p:nvSpPr>
-        <p:spPr>
-          <a:xfrm>
-            <a:off x="680322" y="2336873"/>
-            <a:ext cx="5913574" cy="3139799"/>
-          </a:xfrm>
-        </p:spPr>
-        <p:txBody>
-          <a:bodyPr anchor="t">
-            <a:normAutofit/>
-          </a:bodyPr>
-          <a:lstStyle/>
-          <a:p>
-            <a:r>
-              <a:rPr lang="en-GB" sz="1800" dirty="0"/>
-              <a:t>Login screen</a:t>
-            </a:r>
-          </a:p>
-          <a:p>
-            <a:r>
-              <a:rPr lang="en-GB" sz="1800" dirty="0"/>
-              <a:t>Will </a:t>
-            </a:r>
-            <a:r>
-              <a:rPr lang="en-GB" sz="1800" dirty="0" smtClean="0"/>
-              <a:t>require </a:t>
-            </a:r>
-            <a:r>
-              <a:rPr lang="en-GB" sz="1800" dirty="0"/>
-              <a:t>a </a:t>
-            </a:r>
-            <a:r>
-              <a:rPr lang="en-GB" sz="1800" dirty="0" smtClean="0"/>
-              <a:t>user’s </a:t>
-            </a:r>
-            <a:r>
-              <a:rPr lang="en-GB" sz="1800" dirty="0"/>
-              <a:t>first name and password</a:t>
-            </a:r>
-          </a:p>
-          <a:p>
-            <a:r>
-              <a:rPr lang="en-GB" sz="1800" dirty="0"/>
-              <a:t>Will open the main </a:t>
-            </a:r>
-            <a:r>
-              <a:rPr lang="en-GB" sz="1800" dirty="0" smtClean="0"/>
-              <a:t>disciplinary action </a:t>
-            </a:r>
-            <a:r>
-              <a:rPr lang="en-GB" sz="1800" dirty="0"/>
-              <a:t>screen if </a:t>
-            </a:r>
-            <a:r>
-              <a:rPr lang="en-GB" sz="1800" dirty="0" smtClean="0"/>
-              <a:t>successfully logged </a:t>
-            </a:r>
-            <a:r>
-              <a:rPr lang="en-GB" sz="1800" dirty="0"/>
-              <a:t>in</a:t>
-            </a:r>
-          </a:p>
-          <a:p>
-            <a:r>
-              <a:rPr lang="en-GB" sz="1800" dirty="0"/>
-              <a:t>Shows error message if </a:t>
-            </a:r>
-            <a:r>
-              <a:rPr lang="en-GB" sz="1800" dirty="0" smtClean="0"/>
-              <a:t>incorrect </a:t>
-            </a:r>
-            <a:r>
-              <a:rPr lang="en-GB" sz="1800" dirty="0"/>
-              <a:t>name or password enter</a:t>
-            </a:r>
-          </a:p>
-          <a:p>
-            <a:r>
-              <a:rPr lang="en-GB" sz="1800" dirty="0"/>
-              <a:t>Has a policy button to show the </a:t>
-            </a:r>
-            <a:r>
-              <a:rPr lang="en-GB" sz="1800" dirty="0" smtClean="0"/>
-              <a:t>company’s </a:t>
-            </a:r>
-            <a:r>
-              <a:rPr lang="en-GB" sz="1800" dirty="0"/>
-              <a:t>policy</a:t>
-            </a:r>
-          </a:p>
-        </p:txBody>
-      </p:sp>
-      <p:pic>
-        <p:nvPicPr>
-          <p:cNvPr id="4" name="Picture 3">
-            <a:extLst>
-              <a:ext uri="{FF2B5EF4-FFF2-40B4-BE49-F238E27FC236}">
-                <a16:creationId xmlns:a16="http://schemas.microsoft.com/office/drawing/2014/main" id="{1CFC352F-7100-4CB7-8533-4923C8D8E7B5}"/>
-              </a:ext>
-            </a:extLst>
-          </p:cNvPr>
-          <p:cNvPicPr>
-            <a:picLocks noChangeAspect="1"/>
-          </p:cNvPicPr>
-          <p:nvPr/>
-        </p:nvPicPr>
-        <p:blipFill>
-          <a:blip r:embed="rId3"/>
-          <a:stretch>
-            <a:fillRect/>
-          </a:stretch>
-        </p:blipFill>
-        <p:spPr>
-          <a:xfrm>
-            <a:off x="7145044" y="88069"/>
-            <a:ext cx="3437394" cy="4917067"/>
-          </a:xfrm>
-          <a:prstGeom prst="rect">
-            <a:avLst/>
-          </a:prstGeom>
-        </p:spPr>
-      </p:pic>
-      <p:pic>
-        <p:nvPicPr>
-          <p:cNvPr id="5" name="Picture 4">
-            <a:extLst>
-              <a:ext uri="{FF2B5EF4-FFF2-40B4-BE49-F238E27FC236}">
-                <a16:creationId xmlns:a16="http://schemas.microsoft.com/office/drawing/2014/main" id="{F421A0B4-0DD1-4831-ADAE-159300E195BC}"/>
-              </a:ext>
-            </a:extLst>
-          </p:cNvPr>
-          <p:cNvPicPr>
-            <a:picLocks noChangeAspect="1"/>
-          </p:cNvPicPr>
-          <p:nvPr/>
-        </p:nvPicPr>
-        <p:blipFill rotWithShape="1">
-          <a:blip r:embed="rId4"/>
-          <a:srcRect l="42467" t="39879" r="41586" b="38356"/>
-          <a:stretch/>
-        </p:blipFill>
-        <p:spPr>
-          <a:xfrm>
-            <a:off x="7893896" y="5005137"/>
-            <a:ext cx="2152471" cy="1651711"/>
-          </a:xfrm>
-          <a:prstGeom prst="rect">
-            <a:avLst/>
-          </a:prstGeom>
-        </p:spPr>
-      </p:pic>
-    </p:spTree>
-    <p:extLst>
-      <p:ext uri="{BB962C8B-B14F-4D97-AF65-F5344CB8AC3E}">
-        <p14:creationId xmlns:p14="http://schemas.microsoft.com/office/powerpoint/2010/main" val="4194044199"/>
-      </p:ext>
-    </p:extLst>
-  </p:cSld>
-  <p:clrMapOvr>
-    <a:masterClrMapping/>
-  </p:clrMapOvr>
-</p:sld>
-</file>
-
-<file path=ppt/slides/slide3.xml><?xml version="1.0" encoding="utf-8"?>
-<p:sld xmlns:a="http://schemas.openxmlformats.org/drawingml/2006/main" xmlns:r="http://schemas.openxmlformats.org/officeDocument/2006/relationships" xmlns:p="http://schemas.openxmlformats.org/presentationml/2006/main">
-  <p:cSld>
-    <p:bg>
-      <p:bgPr>
-        <a:solidFill>
-          <a:schemeClr val="bg1"/>
-        </a:solidFill>
-        <a:effectLst/>
-      </p:bgPr>
-    </p:bg>
-    <p:spTree>
-      <p:nvGrpSpPr>
-        <p:cNvPr id="1" name=""/>
-        <p:cNvGrpSpPr/>
-        <p:nvPr/>
-      </p:nvGrpSpPr>
-      <p:grpSpPr>
-        <a:xfrm>
-          <a:off x="0" y="0"/>
-          <a:ext cx="0" cy="0"/>
-          <a:chOff x="0" y="0"/>
-          <a:chExt cx="0" cy="0"/>
-        </a:xfrm>
-      </p:grpSpPr>
-      <p:sp>
-        <p:nvSpPr>
-          <p:cNvPr id="20" name="Rectangle 7">
-            <a:extLst>
-              <a:ext uri="{FF2B5EF4-FFF2-40B4-BE49-F238E27FC236}">
-                <a16:creationId xmlns:a16="http://schemas.microsoft.com/office/drawing/2014/main" id="{0B0BBD46-E160-4D02-9D82-3934E3970C6C}"/>
-              </a:ext>
-              <a:ext uri="{C183D7F6-B498-43B3-948B-1728B52AA6E4}">
-                <adec:decorative xmlns:adec="http://schemas.microsoft.com/office/drawing/2017/decorative" xmlns="" val="1"/>
-              </a:ext>
-            </a:extLst>
-          </p:cNvPr>
-          <p:cNvSpPr>
-            <a:spLocks noGrp="1" noRot="1" noChangeAspect="1" noMove="1" noResize="1" noEditPoints="1" noAdjustHandles="1" noChangeArrowheads="1" noChangeShapeType="1" noTextEdit="1"/>
-          </p:cNvSpPr>
-          <p:nvPr>
-            <p:extLst>
-              <p:ext uri="{386F3935-93C4-4BCD-93E2-E3B085C9AB24}">
-                <p16:designElem xmlns:p16="http://schemas.microsoft.com/office/powerpoint/2015/main" val="1"/>
-              </p:ext>
-            </p:extLst>
-          </p:nvPr>
-        </p:nvSpPr>
-        <p:spPr>
-          <a:xfrm>
-            <a:off x="0" y="0"/>
-            <a:ext cx="12188952" cy="6857999"/>
-          </a:xfrm>
-          <a:prstGeom prst="rect">
-            <a:avLst/>
-          </a:prstGeom>
-          <a:ln>
-            <a:noFill/>
-          </a:ln>
-        </p:spPr>
-        <p:style>
-          <a:lnRef idx="2">
-            <a:schemeClr val="accent1">
-              <a:shade val="50000"/>
-            </a:schemeClr>
-          </a:lnRef>
-          <a:fillRef idx="1">
-            <a:schemeClr val="accent1"/>
-          </a:fillRef>
-          <a:effectRef idx="0">
-            <a:schemeClr val="accent1"/>
-          </a:effectRef>
-          <a:fontRef idx="minor">
-            <a:schemeClr val="lt1"/>
-          </a:fontRef>
-        </p:style>
-        <p:txBody>
-          <a:bodyPr rtlCol="0" anchor="ctr"/>
-          <a:lstStyle/>
-          <a:p>
-            <a:pPr algn="ctr"/>
-            <a:endParaRPr lang="en-US"/>
-          </a:p>
-        </p:txBody>
-      </p:sp>
-      <p:pic>
-        <p:nvPicPr>
-          <p:cNvPr id="21" name="Picture 9">
-            <a:extLst>
-              <a:ext uri="{FF2B5EF4-FFF2-40B4-BE49-F238E27FC236}">
-                <a16:creationId xmlns:a16="http://schemas.microsoft.com/office/drawing/2014/main" id="{3114C8A4-DCE7-4155-98CA-D8826574B702}"/>
-              </a:ext>
-              <a:ext uri="{C183D7F6-B498-43B3-948B-1728B52AA6E4}">
-                <adec:decorative xmlns:adec="http://schemas.microsoft.com/office/drawing/2017/decorative" xmlns="" val="1"/>
-              </a:ext>
-            </a:extLst>
-          </p:cNvPr>
-          <p:cNvPicPr>
-            <a:picLocks noGrp="1" noRot="1" noChangeAspect="1" noMove="1" noResize="1" noEditPoints="1" noAdjustHandles="1" noChangeArrowheads="1" noChangeShapeType="1" noCrop="1"/>
-          </p:cNvPicPr>
-          <p:nvPr>
-            <p:extLst>
-              <p:ext uri="{386F3935-93C4-4BCD-93E2-E3B085C9AB24}">
-                <p16:designElem xmlns:p16="http://schemas.microsoft.com/office/powerpoint/2015/main" val="1"/>
-              </p:ext>
-            </p:extLst>
-          </p:nvPr>
-        </p:nvPicPr>
-        <p:blipFill>
-          <a:blip r:embed="rId2">
-            <a:alphaModFix amt="10000"/>
-            <a:extLst>
-              <a:ext uri="{28A0092B-C50C-407E-A947-70E740481C1C}">
-                <a14:useLocalDpi xmlns:a14="http://schemas.microsoft.com/office/drawing/2010/main" val="0"/>
-              </a:ext>
-            </a:extLst>
-          </a:blip>
-          <a:stretch>
-            <a:fillRect/>
-          </a:stretch>
-        </p:blipFill>
-        <p:spPr>
-          <a:xfrm>
-            <a:off x="0" y="0"/>
-            <a:ext cx="12192000" cy="6858000"/>
-          </a:xfrm>
-          <a:prstGeom prst="rect">
-            <a:avLst/>
-          </a:prstGeom>
-        </p:spPr>
-      </p:pic>
-      <p:sp>
-        <p:nvSpPr>
-          <p:cNvPr id="2" name="Title 1">
-            <a:extLst>
-              <a:ext uri="{FF2B5EF4-FFF2-40B4-BE49-F238E27FC236}">
-                <a16:creationId xmlns:a16="http://schemas.microsoft.com/office/drawing/2014/main" id="{604533E2-4A4D-4DAB-9F0E-EE21DE5E80CD}"/>
-              </a:ext>
-            </a:extLst>
-          </p:cNvPr>
-          <p:cNvSpPr>
-            <a:spLocks noGrp="1"/>
-          </p:cNvSpPr>
-          <p:nvPr>
-            <p:ph type="title"/>
-          </p:nvPr>
-        </p:nvSpPr>
-        <p:spPr>
-          <a:xfrm>
-            <a:off x="680321" y="321732"/>
-            <a:ext cx="9900593" cy="1080938"/>
-          </a:xfrm>
-        </p:spPr>
-        <p:txBody>
-          <a:bodyPr>
-            <a:normAutofit/>
-          </a:bodyPr>
-          <a:lstStyle/>
-          <a:p>
-            <a:r>
-              <a:rPr lang="en-GB" dirty="0">
-                <a:solidFill>
-                  <a:srgbClr val="FFFFFF"/>
-                </a:solidFill>
-              </a:rPr>
-              <a:t>Program </a:t>
-            </a:r>
-            <a:r>
-              <a:rPr lang="en-GB" dirty="0" smtClean="0">
-                <a:solidFill>
-                  <a:srgbClr val="FFFFFF"/>
-                </a:solidFill>
-              </a:rPr>
-              <a:t>progress</a:t>
-            </a:r>
-            <a:endParaRPr lang="en-GB" dirty="0">
-              <a:solidFill>
-                <a:srgbClr val="FFFFFF"/>
-              </a:solidFill>
-            </a:endParaRPr>
-          </a:p>
-        </p:txBody>
-      </p:sp>
-      <p:sp>
-        <p:nvSpPr>
-          <p:cNvPr id="22" name="Rectangle 11">
-            <a:extLst>
-              <a:ext uri="{FF2B5EF4-FFF2-40B4-BE49-F238E27FC236}">
-                <a16:creationId xmlns:a16="http://schemas.microsoft.com/office/drawing/2014/main" id="{77A64E61-6D37-4CB3-8F42-66B0DACBCB0F}"/>
-              </a:ext>
-              <a:ext uri="{C183D7F6-B498-43B3-948B-1728B52AA6E4}">
-                <adec:decorative xmlns:adec="http://schemas.microsoft.com/office/drawing/2017/decorative" xmlns="" val="1"/>
-              </a:ext>
-            </a:extLst>
-          </p:cNvPr>
-          <p:cNvSpPr>
-            <a:spLocks noGrp="1" noRot="1" noChangeAspect="1" noMove="1" noResize="1" noEditPoints="1" noAdjustHandles="1" noChangeArrowheads="1" noChangeShapeType="1" noTextEdit="1"/>
-          </p:cNvSpPr>
-          <p:nvPr>
-            <p:extLst>
-              <p:ext uri="{386F3935-93C4-4BCD-93E2-E3B085C9AB24}">
-                <p16:designElem xmlns:p16="http://schemas.microsoft.com/office/powerpoint/2015/main" val="1"/>
-              </p:ext>
-            </p:extLst>
-          </p:nvPr>
-        </p:nvSpPr>
-        <p:spPr>
-          <a:xfrm>
-            <a:off x="0" y="1724402"/>
-            <a:ext cx="12192000" cy="5133597"/>
-          </a:xfrm>
-          <a:prstGeom prst="rect">
-            <a:avLst/>
-          </a:prstGeom>
-          <a:solidFill>
-            <a:schemeClr val="bg1"/>
-          </a:solidFill>
-          <a:ln>
-            <a:noFill/>
-          </a:ln>
-          <a:effectLst>
-            <a:outerShdw blurRad="88900" dist="38100" dir="16200000" rotWithShape="0">
-              <a:prstClr val="black">
-                <a:alpha val="30000"/>
-              </a:prstClr>
-            </a:outerShdw>
-          </a:effectLst>
-        </p:spPr>
-        <p:style>
-          <a:lnRef idx="2">
-            <a:schemeClr val="accent1">
-              <a:shade val="50000"/>
-            </a:schemeClr>
-          </a:lnRef>
-          <a:fillRef idx="1">
-            <a:schemeClr val="accent1"/>
-          </a:fillRef>
-          <a:effectRef idx="0">
-            <a:schemeClr val="accent1"/>
-          </a:effectRef>
-          <a:fontRef idx="minor">
-            <a:schemeClr val="lt1"/>
-          </a:fontRef>
-        </p:style>
-        <p:txBody>
-          <a:bodyPr rtlCol="0" anchor="ctr"/>
-          <a:lstStyle/>
-          <a:p>
-            <a:pPr algn="ctr"/>
-            <a:endParaRPr lang="en-US"/>
-          </a:p>
-        </p:txBody>
-      </p:sp>
-      <p:sp>
-        <p:nvSpPr>
-          <p:cNvPr id="3" name="Content Placeholder 2">
-            <a:extLst>
-              <a:ext uri="{FF2B5EF4-FFF2-40B4-BE49-F238E27FC236}">
-                <a16:creationId xmlns:a16="http://schemas.microsoft.com/office/drawing/2014/main" id="{EC704661-2884-4E4D-AE8F-BEB655F5EEF2}"/>
-              </a:ext>
-            </a:extLst>
-          </p:cNvPr>
-          <p:cNvSpPr>
-            <a:spLocks noGrp="1"/>
-          </p:cNvSpPr>
-          <p:nvPr>
-            <p:ph idx="1"/>
-          </p:nvPr>
-        </p:nvSpPr>
-        <p:spPr>
-          <a:xfrm>
-            <a:off x="680322" y="2336873"/>
-            <a:ext cx="5913574" cy="3139799"/>
-          </a:xfrm>
-        </p:spPr>
-        <p:txBody>
-          <a:bodyPr anchor="t">
-            <a:normAutofit/>
-          </a:bodyPr>
-          <a:lstStyle/>
-          <a:p>
-            <a:r>
-              <a:rPr lang="en-GB" sz="1800" dirty="0" smtClean="0"/>
-              <a:t>Policy </a:t>
-            </a:r>
-            <a:r>
-              <a:rPr lang="en-GB" sz="1800" dirty="0"/>
-              <a:t>screen</a:t>
-            </a:r>
-          </a:p>
-          <a:p>
-            <a:endParaRPr lang="en-GB" sz="1800" dirty="0"/>
-          </a:p>
-          <a:p>
-            <a:r>
-              <a:rPr lang="en-GB" sz="1800" dirty="0"/>
-              <a:t>Shows company </a:t>
-            </a:r>
-            <a:r>
-              <a:rPr lang="en-GB" sz="1800" dirty="0" smtClean="0"/>
-              <a:t>Policy</a:t>
-            </a:r>
-            <a:endParaRPr lang="en-GB" sz="1800" dirty="0"/>
-          </a:p>
-        </p:txBody>
-      </p:sp>
-      <p:pic>
-        <p:nvPicPr>
-          <p:cNvPr id="4" name="Picture 3"/>
-          <p:cNvPicPr>
-            <a:picLocks noChangeAspect="1"/>
-          </p:cNvPicPr>
-          <p:nvPr/>
-        </p:nvPicPr>
-        <p:blipFill>
-          <a:blip r:embed="rId3"/>
-          <a:stretch>
-            <a:fillRect/>
-          </a:stretch>
-        </p:blipFill>
-        <p:spPr>
-          <a:xfrm>
-            <a:off x="5749436" y="483577"/>
-            <a:ext cx="5938808" cy="5420458"/>
-          </a:xfrm>
-          <a:prstGeom prst="rect">
-            <a:avLst/>
-          </a:prstGeom>
-        </p:spPr>
-      </p:pic>
-    </p:spTree>
-    <p:extLst>
-      <p:ext uri="{BB962C8B-B14F-4D97-AF65-F5344CB8AC3E}">
-        <p14:creationId xmlns:p14="http://schemas.microsoft.com/office/powerpoint/2010/main" val="2622064099"/>
-      </p:ext>
-    </p:extLst>
-  </p:cSld>
-  <p:clrMapOvr>
-    <a:masterClrMapping/>
-  </p:clrMapOvr>
-</p:sld>
-</file>
-
-<file path=ppt/slides/slide4.xml><?xml version="1.0" encoding="utf-8"?>
-<p:sld xmlns:a="http://schemas.openxmlformats.org/drawingml/2006/main" xmlns:r="http://schemas.openxmlformats.org/officeDocument/2006/relationships" xmlns:p="http://schemas.openxmlformats.org/presentationml/2006/main">
-  <p:cSld>
-    <p:bg>
-      <p:bgPr>
-        <a:solidFill>
-          <a:schemeClr val="bg1"/>
-        </a:solidFill>
-        <a:effectLst/>
-      </p:bgPr>
-    </p:bg>
-    <p:spTree>
-      <p:nvGrpSpPr>
-        <p:cNvPr id="1" name=""/>
-        <p:cNvGrpSpPr/>
-        <p:nvPr/>
-      </p:nvGrpSpPr>
-      <p:grpSpPr>
-        <a:xfrm>
-          <a:off x="0" y="0"/>
-          <a:ext cx="0" cy="0"/>
-          <a:chOff x="0" y="0"/>
-          <a:chExt cx="0" cy="0"/>
-        </a:xfrm>
-      </p:grpSpPr>
-      <p:sp>
-        <p:nvSpPr>
-          <p:cNvPr id="20" name="Rectangle 7">
-            <a:extLst>
-              <a:ext uri="{FF2B5EF4-FFF2-40B4-BE49-F238E27FC236}">
-                <a16:creationId xmlns:a16="http://schemas.microsoft.com/office/drawing/2014/main" id="{0B0BBD46-E160-4D02-9D82-3934E3970C6C}"/>
-              </a:ext>
-              <a:ext uri="{C183D7F6-B498-43B3-948B-1728B52AA6E4}">
-                <adec:decorative xmlns:adec="http://schemas.microsoft.com/office/drawing/2017/decorative" xmlns="" val="1"/>
-              </a:ext>
-            </a:extLst>
-          </p:cNvPr>
-          <p:cNvSpPr>
-            <a:spLocks noGrp="1" noRot="1" noChangeAspect="1" noMove="1" noResize="1" noEditPoints="1" noAdjustHandles="1" noChangeArrowheads="1" noChangeShapeType="1" noTextEdit="1"/>
-          </p:cNvSpPr>
-          <p:nvPr>
-            <p:extLst>
-              <p:ext uri="{386F3935-93C4-4BCD-93E2-E3B085C9AB24}">
-                <p16:designElem xmlns:p16="http://schemas.microsoft.com/office/powerpoint/2015/main" val="1"/>
-              </p:ext>
-            </p:extLst>
-          </p:nvPr>
-        </p:nvSpPr>
-        <p:spPr>
-          <a:xfrm>
-            <a:off x="0" y="0"/>
-            <a:ext cx="12188952" cy="6857999"/>
-          </a:xfrm>
-          <a:prstGeom prst="rect">
-            <a:avLst/>
-          </a:prstGeom>
-          <a:ln>
-            <a:noFill/>
-          </a:ln>
-        </p:spPr>
-        <p:style>
-          <a:lnRef idx="2">
-            <a:schemeClr val="accent1">
-              <a:shade val="50000"/>
-            </a:schemeClr>
-          </a:lnRef>
-          <a:fillRef idx="1">
-            <a:schemeClr val="accent1"/>
-          </a:fillRef>
-          <a:effectRef idx="0">
-            <a:schemeClr val="accent1"/>
-          </a:effectRef>
-          <a:fontRef idx="minor">
-            <a:schemeClr val="lt1"/>
-          </a:fontRef>
-        </p:style>
-        <p:txBody>
-          <a:bodyPr rtlCol="0" anchor="ctr"/>
-          <a:lstStyle/>
-          <a:p>
-            <a:pPr algn="ctr"/>
-            <a:endParaRPr lang="en-US"/>
-          </a:p>
-        </p:txBody>
-      </p:sp>
-      <p:pic>
-        <p:nvPicPr>
-          <p:cNvPr id="21" name="Picture 9">
-            <a:extLst>
-              <a:ext uri="{FF2B5EF4-FFF2-40B4-BE49-F238E27FC236}">
-                <a16:creationId xmlns:a16="http://schemas.microsoft.com/office/drawing/2014/main" id="{3114C8A4-DCE7-4155-98CA-D8826574B702}"/>
-              </a:ext>
-              <a:ext uri="{C183D7F6-B498-43B3-948B-1728B52AA6E4}">
-                <adec:decorative xmlns:adec="http://schemas.microsoft.com/office/drawing/2017/decorative" xmlns="" val="1"/>
-              </a:ext>
-            </a:extLst>
-          </p:cNvPr>
-          <p:cNvPicPr>
-            <a:picLocks noGrp="1" noRot="1" noChangeAspect="1" noMove="1" noResize="1" noEditPoints="1" noAdjustHandles="1" noChangeArrowheads="1" noChangeShapeType="1" noCrop="1"/>
-          </p:cNvPicPr>
-          <p:nvPr>
-            <p:extLst>
-              <p:ext uri="{386F3935-93C4-4BCD-93E2-E3B085C9AB24}">
-                <p16:designElem xmlns:p16="http://schemas.microsoft.com/office/powerpoint/2015/main" val="1"/>
-              </p:ext>
-            </p:extLst>
-          </p:nvPr>
-        </p:nvPicPr>
-        <p:blipFill>
-          <a:blip r:embed="rId2">
-            <a:alphaModFix amt="10000"/>
-            <a:extLst>
-              <a:ext uri="{28A0092B-C50C-407E-A947-70E740481C1C}">
-                <a14:useLocalDpi xmlns:a14="http://schemas.microsoft.com/office/drawing/2010/main" val="0"/>
-              </a:ext>
-            </a:extLst>
-          </a:blip>
-          <a:stretch>
-            <a:fillRect/>
-          </a:stretch>
-        </p:blipFill>
-        <p:spPr>
-          <a:xfrm>
-            <a:off x="0" y="0"/>
-            <a:ext cx="12192000" cy="6858000"/>
-          </a:xfrm>
-          <a:prstGeom prst="rect">
-            <a:avLst/>
-          </a:prstGeom>
-        </p:spPr>
-      </p:pic>
-      <p:sp>
-        <p:nvSpPr>
-          <p:cNvPr id="2" name="Title 1">
-            <a:extLst>
-              <a:ext uri="{FF2B5EF4-FFF2-40B4-BE49-F238E27FC236}">
-                <a16:creationId xmlns:a16="http://schemas.microsoft.com/office/drawing/2014/main" id="{604533E2-4A4D-4DAB-9F0E-EE21DE5E80CD}"/>
-              </a:ext>
-            </a:extLst>
-          </p:cNvPr>
-          <p:cNvSpPr>
-            <a:spLocks noGrp="1"/>
-          </p:cNvSpPr>
-          <p:nvPr>
-            <p:ph type="title"/>
-          </p:nvPr>
-        </p:nvSpPr>
-        <p:spPr>
-          <a:xfrm>
-            <a:off x="680321" y="321732"/>
-            <a:ext cx="9900593" cy="1080938"/>
-          </a:xfrm>
-        </p:spPr>
-        <p:txBody>
-          <a:bodyPr>
-            <a:normAutofit/>
-          </a:bodyPr>
-          <a:lstStyle/>
-          <a:p>
-            <a:r>
-              <a:rPr lang="en-GB" dirty="0">
-                <a:solidFill>
-                  <a:srgbClr val="FFFFFF"/>
-                </a:solidFill>
-              </a:rPr>
-              <a:t>Program </a:t>
-            </a:r>
-            <a:r>
-              <a:rPr lang="en-GB" dirty="0" smtClean="0">
-                <a:solidFill>
-                  <a:srgbClr val="FFFFFF"/>
-                </a:solidFill>
-              </a:rPr>
-              <a:t>progress</a:t>
-            </a:r>
-            <a:endParaRPr lang="en-GB" dirty="0">
-              <a:solidFill>
-                <a:srgbClr val="FFFFFF"/>
-              </a:solidFill>
-            </a:endParaRPr>
-          </a:p>
-        </p:txBody>
-      </p:sp>
-      <p:sp>
-        <p:nvSpPr>
-          <p:cNvPr id="22" name="Rectangle 11">
-            <a:extLst>
-              <a:ext uri="{FF2B5EF4-FFF2-40B4-BE49-F238E27FC236}">
-                <a16:creationId xmlns:a16="http://schemas.microsoft.com/office/drawing/2014/main" id="{77A64E61-6D37-4CB3-8F42-66B0DACBCB0F}"/>
-              </a:ext>
-              <a:ext uri="{C183D7F6-B498-43B3-948B-1728B52AA6E4}">
-                <adec:decorative xmlns:adec="http://schemas.microsoft.com/office/drawing/2017/decorative" xmlns="" val="1"/>
-              </a:ext>
-            </a:extLst>
-          </p:cNvPr>
-          <p:cNvSpPr>
-            <a:spLocks noGrp="1" noRot="1" noChangeAspect="1" noMove="1" noResize="1" noEditPoints="1" noAdjustHandles="1" noChangeArrowheads="1" noChangeShapeType="1" noTextEdit="1"/>
-          </p:cNvSpPr>
-          <p:nvPr>
-            <p:extLst>
-              <p:ext uri="{386F3935-93C4-4BCD-93E2-E3B085C9AB24}">
-                <p16:designElem xmlns:p16="http://schemas.microsoft.com/office/powerpoint/2015/main" val="1"/>
-              </p:ext>
-            </p:extLst>
-          </p:nvPr>
-        </p:nvSpPr>
-        <p:spPr>
-          <a:xfrm>
-            <a:off x="0" y="1724402"/>
-            <a:ext cx="12192000" cy="5133597"/>
-          </a:xfrm>
-          <a:prstGeom prst="rect">
-            <a:avLst/>
-          </a:prstGeom>
-          <a:solidFill>
-            <a:schemeClr val="bg1"/>
-          </a:solidFill>
-          <a:ln>
-            <a:noFill/>
-          </a:ln>
-          <a:effectLst>
-            <a:outerShdw blurRad="88900" dist="38100" dir="16200000" rotWithShape="0">
-              <a:prstClr val="black">
-                <a:alpha val="30000"/>
-              </a:prstClr>
-            </a:outerShdw>
-          </a:effectLst>
-        </p:spPr>
-        <p:style>
-          <a:lnRef idx="2">
-            <a:schemeClr val="accent1">
-              <a:shade val="50000"/>
-            </a:schemeClr>
-          </a:lnRef>
-          <a:fillRef idx="1">
-            <a:schemeClr val="accent1"/>
-          </a:fillRef>
-          <a:effectRef idx="0">
-            <a:schemeClr val="accent1"/>
-          </a:effectRef>
-          <a:fontRef idx="minor">
-            <a:schemeClr val="lt1"/>
-          </a:fontRef>
-        </p:style>
-        <p:txBody>
-          <a:bodyPr rtlCol="0" anchor="ctr"/>
-          <a:lstStyle/>
-          <a:p>
-            <a:pPr algn="ctr"/>
-            <a:endParaRPr lang="en-US"/>
-          </a:p>
-        </p:txBody>
-      </p:sp>
-      <p:sp>
-        <p:nvSpPr>
-          <p:cNvPr id="3" name="Content Placeholder 2">
-            <a:extLst>
-              <a:ext uri="{FF2B5EF4-FFF2-40B4-BE49-F238E27FC236}">
-                <a16:creationId xmlns:a16="http://schemas.microsoft.com/office/drawing/2014/main" id="{EC704661-2884-4E4D-AE8F-BEB655F5EEF2}"/>
-              </a:ext>
-            </a:extLst>
-          </p:cNvPr>
-          <p:cNvSpPr>
-            <a:spLocks noGrp="1"/>
-          </p:cNvSpPr>
-          <p:nvPr>
-            <p:ph idx="1"/>
-          </p:nvPr>
-        </p:nvSpPr>
-        <p:spPr>
-          <a:xfrm>
-            <a:off x="680322" y="2336873"/>
-            <a:ext cx="3054877" cy="3139799"/>
-          </a:xfrm>
-        </p:spPr>
-        <p:txBody>
-          <a:bodyPr anchor="t">
-            <a:normAutofit/>
-          </a:bodyPr>
-          <a:lstStyle/>
-          <a:p>
-            <a:r>
-              <a:rPr lang="en-GB" sz="1800" dirty="0" smtClean="0"/>
-              <a:t>Disciplinary </a:t>
-            </a:r>
-            <a:r>
-              <a:rPr lang="en-GB" sz="1800" dirty="0"/>
-              <a:t>action</a:t>
-            </a:r>
-          </a:p>
-          <a:p>
-            <a:endParaRPr lang="en-GB" sz="1800" dirty="0"/>
-          </a:p>
-          <a:p>
-            <a:endParaRPr lang="en-GB" sz="1800" dirty="0"/>
-          </a:p>
-        </p:txBody>
-      </p:sp>
-      <p:pic>
-        <p:nvPicPr>
-          <p:cNvPr id="5" name="Picture 4">
-            <a:extLst>
-              <a:ext uri="{FF2B5EF4-FFF2-40B4-BE49-F238E27FC236}">
-                <a16:creationId xmlns:a16="http://schemas.microsoft.com/office/drawing/2014/main" id="{CC8CBCC0-E6BF-4AAC-AF90-B6E7B77C8CB1}"/>
-              </a:ext>
-            </a:extLst>
-          </p:cNvPr>
-          <p:cNvPicPr>
-            <a:picLocks noChangeAspect="1"/>
-          </p:cNvPicPr>
-          <p:nvPr/>
-        </p:nvPicPr>
-        <p:blipFill>
-          <a:blip r:embed="rId3"/>
-          <a:stretch>
-            <a:fillRect/>
-          </a:stretch>
-        </p:blipFill>
-        <p:spPr>
-          <a:xfrm>
-            <a:off x="4566256" y="669481"/>
-            <a:ext cx="7625744" cy="6188519"/>
-          </a:xfrm>
-          <a:prstGeom prst="rect">
-            <a:avLst/>
-          </a:prstGeom>
-        </p:spPr>
-      </p:pic>
-    </p:spTree>
-    <p:extLst>
-      <p:ext uri="{BB962C8B-B14F-4D97-AF65-F5344CB8AC3E}">
-        <p14:creationId xmlns:p14="http://schemas.microsoft.com/office/powerpoint/2010/main" val="3859839294"/>
-      </p:ext>
-    </p:extLst>
-  </p:cSld>
-  <p:clrMapOvr>
-    <a:masterClrMapping/>
-  </p:clrMapOvr>
-</p:sld>
-</file>
-
-<file path=ppt/slides/slide5.xml><?xml version="1.0" encoding="utf-8"?>
-<p:sld xmlns:a="http://schemas.openxmlformats.org/drawingml/2006/main" xmlns:r="http://schemas.openxmlformats.org/officeDocument/2006/relationships" xmlns:p="http://schemas.openxmlformats.org/presentationml/2006/main">
-  <p:cSld>
-    <p:bg>
-      <p:bgPr>
-        <a:solidFill>
-          <a:schemeClr val="bg1"/>
-        </a:solidFill>
-        <a:effectLst/>
-      </p:bgPr>
-    </p:bg>
-    <p:spTree>
-      <p:nvGrpSpPr>
-        <p:cNvPr id="1" name=""/>
-        <p:cNvGrpSpPr/>
-        <p:nvPr/>
-      </p:nvGrpSpPr>
-      <p:grpSpPr>
-        <a:xfrm>
-          <a:off x="0" y="0"/>
-          <a:ext cx="0" cy="0"/>
-          <a:chOff x="0" y="0"/>
-          <a:chExt cx="0" cy="0"/>
-        </a:xfrm>
-      </p:grpSpPr>
-      <p:sp>
-        <p:nvSpPr>
-          <p:cNvPr id="20" name="Rectangle 7">
-            <a:extLst>
-              <a:ext uri="{FF2B5EF4-FFF2-40B4-BE49-F238E27FC236}">
-                <a16:creationId xmlns:a16="http://schemas.microsoft.com/office/drawing/2014/main" id="{0B0BBD46-E160-4D02-9D82-3934E3970C6C}"/>
-              </a:ext>
-              <a:ext uri="{C183D7F6-B498-43B3-948B-1728B52AA6E4}">
-                <adec:decorative xmlns:adec="http://schemas.microsoft.com/office/drawing/2017/decorative" xmlns="" val="1"/>
-              </a:ext>
-            </a:extLst>
-          </p:cNvPr>
-          <p:cNvSpPr>
-            <a:spLocks noGrp="1" noRot="1" noChangeAspect="1" noMove="1" noResize="1" noEditPoints="1" noAdjustHandles="1" noChangeArrowheads="1" noChangeShapeType="1" noTextEdit="1"/>
-          </p:cNvSpPr>
-          <p:nvPr>
-            <p:extLst>
-              <p:ext uri="{386F3935-93C4-4BCD-93E2-E3B085C9AB24}">
-                <p16:designElem xmlns:p16="http://schemas.microsoft.com/office/powerpoint/2015/main" val="1"/>
-              </p:ext>
-            </p:extLst>
-          </p:nvPr>
-        </p:nvSpPr>
-        <p:spPr>
-          <a:xfrm>
-            <a:off x="0" y="0"/>
-            <a:ext cx="12188952" cy="6857999"/>
-          </a:xfrm>
-          <a:prstGeom prst="rect">
-            <a:avLst/>
-          </a:prstGeom>
-          <a:ln>
-            <a:noFill/>
-          </a:ln>
-        </p:spPr>
-        <p:style>
-          <a:lnRef idx="2">
-            <a:schemeClr val="accent1">
-              <a:shade val="50000"/>
-            </a:schemeClr>
-          </a:lnRef>
-          <a:fillRef idx="1">
-            <a:schemeClr val="accent1"/>
-          </a:fillRef>
-          <a:effectRef idx="0">
-            <a:schemeClr val="accent1"/>
-          </a:effectRef>
-          <a:fontRef idx="minor">
-            <a:schemeClr val="lt1"/>
-          </a:fontRef>
-        </p:style>
-        <p:txBody>
-          <a:bodyPr rtlCol="0" anchor="ctr"/>
-          <a:lstStyle/>
-          <a:p>
-            <a:pPr algn="ctr"/>
-            <a:endParaRPr lang="en-US"/>
-          </a:p>
-        </p:txBody>
-      </p:sp>
-      <p:pic>
-        <p:nvPicPr>
-          <p:cNvPr id="21" name="Picture 9">
-            <a:extLst>
-              <a:ext uri="{FF2B5EF4-FFF2-40B4-BE49-F238E27FC236}">
-                <a16:creationId xmlns:a16="http://schemas.microsoft.com/office/drawing/2014/main" id="{3114C8A4-DCE7-4155-98CA-D8826574B702}"/>
-              </a:ext>
-              <a:ext uri="{C183D7F6-B498-43B3-948B-1728B52AA6E4}">
-                <adec:decorative xmlns:adec="http://schemas.microsoft.com/office/drawing/2017/decorative" xmlns="" val="1"/>
-              </a:ext>
-            </a:extLst>
-          </p:cNvPr>
-          <p:cNvPicPr>
-            <a:picLocks noGrp="1" noRot="1" noChangeAspect="1" noMove="1" noResize="1" noEditPoints="1" noAdjustHandles="1" noChangeArrowheads="1" noChangeShapeType="1" noCrop="1"/>
-          </p:cNvPicPr>
-          <p:nvPr>
-            <p:extLst>
-              <p:ext uri="{386F3935-93C4-4BCD-93E2-E3B085C9AB24}">
-                <p16:designElem xmlns:p16="http://schemas.microsoft.com/office/powerpoint/2015/main" val="1"/>
-              </p:ext>
-            </p:extLst>
-          </p:nvPr>
-        </p:nvPicPr>
-        <p:blipFill>
-          <a:blip r:embed="rId2">
-            <a:alphaModFix amt="10000"/>
-            <a:extLst>
-              <a:ext uri="{28A0092B-C50C-407E-A947-70E740481C1C}">
-                <a14:useLocalDpi xmlns:a14="http://schemas.microsoft.com/office/drawing/2010/main" val="0"/>
-              </a:ext>
-            </a:extLst>
-          </a:blip>
-          <a:stretch>
-            <a:fillRect/>
-          </a:stretch>
-        </p:blipFill>
-        <p:spPr>
-          <a:xfrm>
-            <a:off x="0" y="0"/>
-            <a:ext cx="12192000" cy="6858000"/>
-          </a:xfrm>
-          <a:prstGeom prst="rect">
-            <a:avLst/>
-          </a:prstGeom>
-        </p:spPr>
-      </p:pic>
-      <p:sp>
-        <p:nvSpPr>
-          <p:cNvPr id="2" name="Title 1">
-            <a:extLst>
-              <a:ext uri="{FF2B5EF4-FFF2-40B4-BE49-F238E27FC236}">
-                <a16:creationId xmlns:a16="http://schemas.microsoft.com/office/drawing/2014/main" id="{604533E2-4A4D-4DAB-9F0E-EE21DE5E80CD}"/>
-              </a:ext>
-            </a:extLst>
-          </p:cNvPr>
-          <p:cNvSpPr>
-            <a:spLocks noGrp="1"/>
-          </p:cNvSpPr>
-          <p:nvPr>
-            <p:ph type="title"/>
-          </p:nvPr>
-        </p:nvSpPr>
-        <p:spPr>
-          <a:xfrm>
-            <a:off x="680321" y="321732"/>
-            <a:ext cx="9900593" cy="1080938"/>
-          </a:xfrm>
-        </p:spPr>
-        <p:txBody>
-          <a:bodyPr>
-            <a:normAutofit/>
-          </a:bodyPr>
-          <a:lstStyle/>
-          <a:p>
-            <a:r>
-              <a:rPr lang="en-GB" dirty="0">
-                <a:solidFill>
-                  <a:srgbClr val="FFFFFF"/>
-                </a:solidFill>
-              </a:rPr>
-              <a:t>Program </a:t>
-            </a:r>
-            <a:r>
-              <a:rPr lang="en-GB" dirty="0" smtClean="0">
-                <a:solidFill>
-                  <a:srgbClr val="FFFFFF"/>
-                </a:solidFill>
-              </a:rPr>
-              <a:t>progress</a:t>
-            </a:r>
-            <a:endParaRPr lang="en-GB" dirty="0">
-              <a:solidFill>
-                <a:srgbClr val="FFFFFF"/>
-              </a:solidFill>
-            </a:endParaRPr>
-          </a:p>
-        </p:txBody>
-      </p:sp>
-      <p:sp>
-        <p:nvSpPr>
-          <p:cNvPr id="22" name="Rectangle 11">
-            <a:extLst>
-              <a:ext uri="{FF2B5EF4-FFF2-40B4-BE49-F238E27FC236}">
-                <a16:creationId xmlns:a16="http://schemas.microsoft.com/office/drawing/2014/main" id="{77A64E61-6D37-4CB3-8F42-66B0DACBCB0F}"/>
-              </a:ext>
-              <a:ext uri="{C183D7F6-B498-43B3-948B-1728B52AA6E4}">
-                <adec:decorative xmlns:adec="http://schemas.microsoft.com/office/drawing/2017/decorative" xmlns="" val="1"/>
-              </a:ext>
-            </a:extLst>
-          </p:cNvPr>
-          <p:cNvSpPr>
-            <a:spLocks noGrp="1" noRot="1" noChangeAspect="1" noMove="1" noResize="1" noEditPoints="1" noAdjustHandles="1" noChangeArrowheads="1" noChangeShapeType="1" noTextEdit="1"/>
-          </p:cNvSpPr>
-          <p:nvPr>
-            <p:extLst>
-              <p:ext uri="{386F3935-93C4-4BCD-93E2-E3B085C9AB24}">
-                <p16:designElem xmlns:p16="http://schemas.microsoft.com/office/powerpoint/2015/main" val="1"/>
-              </p:ext>
-            </p:extLst>
-          </p:nvPr>
-        </p:nvSpPr>
-        <p:spPr>
-          <a:xfrm>
-            <a:off x="0" y="1724402"/>
-            <a:ext cx="12192000" cy="5133597"/>
-          </a:xfrm>
-          <a:prstGeom prst="rect">
-            <a:avLst/>
-          </a:prstGeom>
-          <a:solidFill>
-            <a:schemeClr val="bg1"/>
-          </a:solidFill>
-          <a:ln>
-            <a:noFill/>
-          </a:ln>
-          <a:effectLst>
-            <a:outerShdw blurRad="88900" dist="38100" dir="16200000" rotWithShape="0">
-              <a:prstClr val="black">
-                <a:alpha val="30000"/>
-              </a:prstClr>
-            </a:outerShdw>
-          </a:effectLst>
-        </p:spPr>
-        <p:style>
-          <a:lnRef idx="2">
-            <a:schemeClr val="accent1">
-              <a:shade val="50000"/>
-            </a:schemeClr>
-          </a:lnRef>
-          <a:fillRef idx="1">
-            <a:schemeClr val="accent1"/>
-          </a:fillRef>
-          <a:effectRef idx="0">
-            <a:schemeClr val="accent1"/>
-          </a:effectRef>
-          <a:fontRef idx="minor">
-            <a:schemeClr val="lt1"/>
-          </a:fontRef>
-        </p:style>
-        <p:txBody>
-          <a:bodyPr rtlCol="0" anchor="ctr"/>
-          <a:lstStyle/>
-          <a:p>
-            <a:pPr algn="ctr"/>
-            <a:endParaRPr lang="en-US"/>
-          </a:p>
-        </p:txBody>
-      </p:sp>
-      <p:sp>
-        <p:nvSpPr>
-          <p:cNvPr id="3" name="Content Placeholder 2">
-            <a:extLst>
-              <a:ext uri="{FF2B5EF4-FFF2-40B4-BE49-F238E27FC236}">
-                <a16:creationId xmlns:a16="http://schemas.microsoft.com/office/drawing/2014/main" id="{EC704661-2884-4E4D-AE8F-BEB655F5EEF2}"/>
-              </a:ext>
-            </a:extLst>
-          </p:cNvPr>
-          <p:cNvSpPr>
-            <a:spLocks noGrp="1"/>
-          </p:cNvSpPr>
-          <p:nvPr>
-            <p:ph idx="1"/>
-          </p:nvPr>
-        </p:nvSpPr>
-        <p:spPr>
-          <a:xfrm>
-            <a:off x="680322" y="2336873"/>
-            <a:ext cx="4044331" cy="3139799"/>
-          </a:xfrm>
-        </p:spPr>
-        <p:txBody>
-          <a:bodyPr anchor="t">
-            <a:normAutofit/>
-          </a:bodyPr>
-          <a:lstStyle/>
-          <a:p>
-            <a:r>
-              <a:rPr lang="en-GB" sz="1800" dirty="0" smtClean="0"/>
-              <a:t>Disciplinary </a:t>
-            </a:r>
-            <a:r>
-              <a:rPr lang="en-GB" sz="1800" dirty="0"/>
-              <a:t>action</a:t>
-            </a:r>
-          </a:p>
-          <a:p>
-            <a:endParaRPr lang="en-GB" sz="1800" dirty="0"/>
-          </a:p>
-          <a:p>
-            <a:endParaRPr lang="en-GB" sz="1800" dirty="0"/>
-          </a:p>
-        </p:txBody>
-      </p:sp>
-      <p:pic>
-        <p:nvPicPr>
-          <p:cNvPr id="4" name="Picture 3">
-            <a:extLst>
-              <a:ext uri="{FF2B5EF4-FFF2-40B4-BE49-F238E27FC236}">
-                <a16:creationId xmlns:a16="http://schemas.microsoft.com/office/drawing/2014/main" id="{352D080C-B426-4A78-8F3B-1FC23F443725}"/>
-              </a:ext>
-            </a:extLst>
-          </p:cNvPr>
-          <p:cNvPicPr>
-            <a:picLocks noChangeAspect="1"/>
-          </p:cNvPicPr>
-          <p:nvPr/>
-        </p:nvPicPr>
-        <p:blipFill>
-          <a:blip r:embed="rId3"/>
-          <a:stretch>
-            <a:fillRect/>
-          </a:stretch>
-        </p:blipFill>
-        <p:spPr>
-          <a:xfrm>
-            <a:off x="5009805" y="862201"/>
-            <a:ext cx="6893995" cy="5594683"/>
-          </a:xfrm>
-          <a:prstGeom prst="rect">
-            <a:avLst/>
-          </a:prstGeom>
-        </p:spPr>
-      </p:pic>
-    </p:spTree>
-    <p:extLst>
-      <p:ext uri="{BB962C8B-B14F-4D97-AF65-F5344CB8AC3E}">
-        <p14:creationId xmlns:p14="http://schemas.microsoft.com/office/powerpoint/2010/main" val="1808154281"/>
-      </p:ext>
-    </p:extLst>
-  </p:cSld>
-  <p:clrMapOvr>
-    <a:masterClrMapping/>
-  </p:clrMapOvr>
-</p:sld>
-</file>
-
-<file path=ppt/slides/slide6.xml><?xml version="1.0" encoding="utf-8"?>
-<p:sld xmlns:a="http://schemas.openxmlformats.org/drawingml/2006/main" xmlns:r="http://schemas.openxmlformats.org/officeDocument/2006/relationships" xmlns:p="http://schemas.openxmlformats.org/presentationml/2006/main">
-  <p:cSld>
-    <p:bg>
-      <p:bgPr>
-        <a:solidFill>
-          <a:schemeClr val="bg1"/>
-        </a:solidFill>
-        <a:effectLst/>
-      </p:bgPr>
-    </p:bg>
-    <p:spTree>
-      <p:nvGrpSpPr>
-        <p:cNvPr id="1" name=""/>
-        <p:cNvGrpSpPr/>
-        <p:nvPr/>
-      </p:nvGrpSpPr>
-      <p:grpSpPr>
-        <a:xfrm>
-          <a:off x="0" y="0"/>
-          <a:ext cx="0" cy="0"/>
-          <a:chOff x="0" y="0"/>
-          <a:chExt cx="0" cy="0"/>
-        </a:xfrm>
-      </p:grpSpPr>
-      <p:sp>
-        <p:nvSpPr>
-          <p:cNvPr id="20" name="Rectangle 7">
-            <a:extLst>
-              <a:ext uri="{FF2B5EF4-FFF2-40B4-BE49-F238E27FC236}">
-                <a16:creationId xmlns:a16="http://schemas.microsoft.com/office/drawing/2014/main" id="{0B0BBD46-E160-4D02-9D82-3934E3970C6C}"/>
-              </a:ext>
-              <a:ext uri="{C183D7F6-B498-43B3-948B-1728B52AA6E4}">
-                <adec:decorative xmlns:adec="http://schemas.microsoft.com/office/drawing/2017/decorative" xmlns="" val="1"/>
-              </a:ext>
-            </a:extLst>
-          </p:cNvPr>
-          <p:cNvSpPr>
-            <a:spLocks noGrp="1" noRot="1" noChangeAspect="1" noMove="1" noResize="1" noEditPoints="1" noAdjustHandles="1" noChangeArrowheads="1" noChangeShapeType="1" noTextEdit="1"/>
-          </p:cNvSpPr>
-          <p:nvPr>
-            <p:extLst>
-              <p:ext uri="{386F3935-93C4-4BCD-93E2-E3B085C9AB24}">
-                <p16:designElem xmlns:p16="http://schemas.microsoft.com/office/powerpoint/2015/main" val="1"/>
-              </p:ext>
-            </p:extLst>
-          </p:nvPr>
-        </p:nvSpPr>
-        <p:spPr>
-          <a:xfrm>
-            <a:off x="0" y="0"/>
-            <a:ext cx="12188952" cy="6857999"/>
-          </a:xfrm>
-          <a:prstGeom prst="rect">
-            <a:avLst/>
-          </a:prstGeom>
-          <a:ln>
-            <a:noFill/>
-          </a:ln>
-        </p:spPr>
-        <p:style>
-          <a:lnRef idx="2">
-            <a:schemeClr val="accent1">
-              <a:shade val="50000"/>
-            </a:schemeClr>
-          </a:lnRef>
-          <a:fillRef idx="1">
-            <a:schemeClr val="accent1"/>
-          </a:fillRef>
-          <a:effectRef idx="0">
-            <a:schemeClr val="accent1"/>
-          </a:effectRef>
-          <a:fontRef idx="minor">
-            <a:schemeClr val="lt1"/>
-          </a:fontRef>
-        </p:style>
-        <p:txBody>
-          <a:bodyPr rtlCol="0" anchor="ctr"/>
-          <a:lstStyle/>
-          <a:p>
-            <a:pPr algn="ctr"/>
-            <a:endParaRPr lang="en-US"/>
-          </a:p>
-        </p:txBody>
-      </p:sp>
-      <p:pic>
-        <p:nvPicPr>
-          <p:cNvPr id="21" name="Picture 9">
-            <a:extLst>
-              <a:ext uri="{FF2B5EF4-FFF2-40B4-BE49-F238E27FC236}">
-                <a16:creationId xmlns:a16="http://schemas.microsoft.com/office/drawing/2014/main" id="{3114C8A4-DCE7-4155-98CA-D8826574B702}"/>
-              </a:ext>
-              <a:ext uri="{C183D7F6-B498-43B3-948B-1728B52AA6E4}">
-                <adec:decorative xmlns:adec="http://schemas.microsoft.com/office/drawing/2017/decorative" xmlns="" val="1"/>
-              </a:ext>
-            </a:extLst>
-          </p:cNvPr>
-          <p:cNvPicPr>
-            <a:picLocks noGrp="1" noRot="1" noChangeAspect="1" noMove="1" noResize="1" noEditPoints="1" noAdjustHandles="1" noChangeArrowheads="1" noChangeShapeType="1" noCrop="1"/>
-          </p:cNvPicPr>
-          <p:nvPr>
-            <p:extLst>
-              <p:ext uri="{386F3935-93C4-4BCD-93E2-E3B085C9AB24}">
-                <p16:designElem xmlns:p16="http://schemas.microsoft.com/office/powerpoint/2015/main" val="1"/>
-              </p:ext>
-            </p:extLst>
-          </p:nvPr>
-        </p:nvPicPr>
-        <p:blipFill>
-          <a:blip r:embed="rId2">
-            <a:alphaModFix amt="10000"/>
-            <a:extLst>
-              <a:ext uri="{28A0092B-C50C-407E-A947-70E740481C1C}">
-                <a14:useLocalDpi xmlns:a14="http://schemas.microsoft.com/office/drawing/2010/main" val="0"/>
-              </a:ext>
-            </a:extLst>
-          </a:blip>
-          <a:stretch>
-            <a:fillRect/>
-          </a:stretch>
-        </p:blipFill>
-        <p:spPr>
-          <a:xfrm>
-            <a:off x="0" y="0"/>
-            <a:ext cx="12192000" cy="6858000"/>
-          </a:xfrm>
-          <a:prstGeom prst="rect">
-            <a:avLst/>
-          </a:prstGeom>
-        </p:spPr>
-      </p:pic>
-      <p:sp>
-        <p:nvSpPr>
-          <p:cNvPr id="2" name="Title 1">
-            <a:extLst>
-              <a:ext uri="{FF2B5EF4-FFF2-40B4-BE49-F238E27FC236}">
-                <a16:creationId xmlns:a16="http://schemas.microsoft.com/office/drawing/2014/main" id="{604533E2-4A4D-4DAB-9F0E-EE21DE5E80CD}"/>
-              </a:ext>
-            </a:extLst>
-          </p:cNvPr>
-          <p:cNvSpPr>
-            <a:spLocks noGrp="1"/>
-          </p:cNvSpPr>
-          <p:nvPr>
-            <p:ph type="title"/>
-          </p:nvPr>
-        </p:nvSpPr>
-        <p:spPr>
-          <a:xfrm>
-            <a:off x="680321" y="321732"/>
-            <a:ext cx="9900593" cy="1080938"/>
-          </a:xfrm>
-        </p:spPr>
-        <p:txBody>
-          <a:bodyPr>
-            <a:normAutofit/>
-          </a:bodyPr>
-          <a:lstStyle/>
-          <a:p>
-            <a:r>
-              <a:rPr lang="en-GB" dirty="0">
-                <a:solidFill>
-                  <a:srgbClr val="FFFFFF"/>
-                </a:solidFill>
-              </a:rPr>
-              <a:t>Testing</a:t>
-            </a:r>
-          </a:p>
-        </p:txBody>
-      </p:sp>
-      <p:sp>
-        <p:nvSpPr>
-          <p:cNvPr id="22" name="Rectangle 11">
-            <a:extLst>
-              <a:ext uri="{FF2B5EF4-FFF2-40B4-BE49-F238E27FC236}">
-                <a16:creationId xmlns:a16="http://schemas.microsoft.com/office/drawing/2014/main" id="{77A64E61-6D37-4CB3-8F42-66B0DACBCB0F}"/>
-              </a:ext>
-              <a:ext uri="{C183D7F6-B498-43B3-948B-1728B52AA6E4}">
-                <adec:decorative xmlns:adec="http://schemas.microsoft.com/office/drawing/2017/decorative" xmlns="" val="1"/>
-              </a:ext>
-            </a:extLst>
-          </p:cNvPr>
-          <p:cNvSpPr>
-            <a:spLocks noGrp="1" noRot="1" noChangeAspect="1" noMove="1" noResize="1" noEditPoints="1" noAdjustHandles="1" noChangeArrowheads="1" noChangeShapeType="1" noTextEdit="1"/>
-          </p:cNvSpPr>
-          <p:nvPr>
-            <p:extLst>
-              <p:ext uri="{386F3935-93C4-4BCD-93E2-E3B085C9AB24}">
-                <p16:designElem xmlns:p16="http://schemas.microsoft.com/office/powerpoint/2015/main" val="1"/>
-              </p:ext>
-            </p:extLst>
-          </p:nvPr>
-        </p:nvSpPr>
-        <p:spPr>
-          <a:xfrm>
-            <a:off x="0" y="1724402"/>
-            <a:ext cx="12192000" cy="5133597"/>
-          </a:xfrm>
-          <a:prstGeom prst="rect">
-            <a:avLst/>
-          </a:prstGeom>
-          <a:solidFill>
-            <a:schemeClr val="bg1"/>
-          </a:solidFill>
-          <a:ln>
-            <a:noFill/>
-          </a:ln>
-          <a:effectLst>
-            <a:outerShdw blurRad="88900" dist="38100" dir="16200000" rotWithShape="0">
-              <a:prstClr val="black">
-                <a:alpha val="30000"/>
-              </a:prstClr>
-            </a:outerShdw>
-          </a:effectLst>
-        </p:spPr>
-        <p:style>
-          <a:lnRef idx="2">
-            <a:schemeClr val="accent1">
-              <a:shade val="50000"/>
-            </a:schemeClr>
-          </a:lnRef>
-          <a:fillRef idx="1">
-            <a:schemeClr val="accent1"/>
-          </a:fillRef>
-          <a:effectRef idx="0">
-            <a:schemeClr val="accent1"/>
-          </a:effectRef>
-          <a:fontRef idx="minor">
-            <a:schemeClr val="lt1"/>
-          </a:fontRef>
-        </p:style>
-        <p:txBody>
-          <a:bodyPr rtlCol="0" anchor="ctr"/>
-          <a:lstStyle/>
-          <a:p>
-            <a:pPr algn="ctr"/>
-            <a:endParaRPr lang="en-US"/>
-          </a:p>
-        </p:txBody>
-      </p:sp>
-      <p:sp>
-        <p:nvSpPr>
           <p:cNvPr id="9" name="Content Placeholder 2">
             <a:extLst>
               <a:ext uri="{FF2B5EF4-FFF2-40B4-BE49-F238E27FC236}">
@@ -9548,7 +8098,7 @@
         <p:spPr>
           <a:xfrm>
             <a:off x="680322" y="2336873"/>
-            <a:ext cx="6564540" cy="3139799"/>
+            <a:ext cx="5966663" cy="3729819"/>
           </a:xfrm>
           <a:prstGeom prst="rect">
             <a:avLst/>
@@ -9723,60 +8273,76 @@
             </a:lvl9pPr>
           </a:lstStyle>
           <a:p>
+            <a:pPr marL="0" indent="0">
+              <a:buNone/>
+            </a:pPr>
             <a:r>
               <a:rPr lang="en-GB" sz="1800" dirty="0" smtClean="0"/>
-              <a:t>Some test cases have been created</a:t>
-            </a:r>
+              <a:t>Contact Details:</a:t>
+            </a:r>
+          </a:p>
+          <a:p>
+            <a:pPr marL="0" indent="0">
+              <a:buNone/>
+            </a:pPr>
+            <a:endParaRPr lang="en-GB" sz="1800" dirty="0" smtClean="0"/>
           </a:p>
           <a:p>
             <a:r>
               <a:rPr lang="en-GB" sz="1800" dirty="0" smtClean="0"/>
-              <a:t>Some tests have been completed</a:t>
-            </a:r>
+              <a:t>Matthew: </a:t>
+            </a:r>
+            <a:r>
+              <a:rPr lang="en-GB" sz="1800" dirty="0" smtClean="0">
+                <a:hlinkClick r:id="rId3"/>
+              </a:rPr>
+              <a:t>17025958@students.southwales.ac.uk</a:t>
+            </a:r>
+            <a:endParaRPr lang="en-GB" sz="1800" dirty="0" smtClean="0"/>
+          </a:p>
+          <a:p>
+            <a:endParaRPr lang="en-GB" sz="1800" dirty="0" smtClean="0"/>
           </a:p>
           <a:p>
             <a:r>
               <a:rPr lang="en-GB" sz="1800" dirty="0" smtClean="0"/>
-              <a:t>There is still much testing left to do</a:t>
-            </a:r>
-          </a:p>
-          <a:p>
-            <a:endParaRPr lang="en-GB" sz="1800" dirty="0"/>
-          </a:p>
-          <a:p>
-            <a:pPr marL="0" indent="0">
-              <a:buNone/>
-            </a:pPr>
-            <a:r>
-              <a:rPr lang="en-GB" sz="1800" b="1" dirty="0" smtClean="0"/>
-              <a:t>Side note</a:t>
+              <a:t>Joshua: </a:t>
+            </a:r>
+            <a:r>
+              <a:rPr lang="en-GB" sz="1800" dirty="0" smtClean="0">
+                <a:hlinkClick r:id="rId4"/>
+              </a:rPr>
+              <a:t>16028414@students.southwales.ac.uk</a:t>
+            </a:r>
+            <a:endParaRPr lang="en-GB" sz="1800" dirty="0" smtClean="0"/>
+          </a:p>
+          <a:p>
+            <a:endParaRPr lang="en-GB" sz="1800" dirty="0" smtClean="0"/>
+          </a:p>
+          <a:p>
+            <a:r>
+              <a:rPr lang="en-GB" sz="1800" dirty="0" err="1" smtClean="0"/>
+              <a:t>Aleksander</a:t>
             </a:r>
             <a:r>
               <a:rPr lang="en-GB" sz="1800" dirty="0" smtClean="0"/>
               <a:t>: </a:t>
             </a:r>
+            <a:r>
+              <a:rPr lang="en-GB" sz="1800" dirty="0" smtClean="0">
+                <a:hlinkClick r:id="rId5"/>
+              </a:rPr>
+              <a:t>17111854@students.southwales.ac.uk</a:t>
+            </a:r>
+            <a:endParaRPr lang="en-GB" sz="1800" dirty="0" smtClean="0"/>
+          </a:p>
+          <a:p>
+            <a:endParaRPr lang="en-GB" sz="1800" dirty="0" smtClean="0"/>
           </a:p>
           <a:p>
             <a:pPr marL="0" indent="0">
               <a:buNone/>
             </a:pPr>
-            <a:r>
-              <a:rPr lang="en-GB" sz="1800" dirty="0" smtClean="0"/>
-              <a:t>The </a:t>
-            </a:r>
-            <a:r>
-              <a:rPr lang="en-GB" sz="1800" dirty="0" err="1" smtClean="0"/>
-              <a:t>unittest</a:t>
-            </a:r>
-            <a:r>
-              <a:rPr lang="en-GB" sz="1800" dirty="0" smtClean="0"/>
-              <a:t> module has not been used much, due to the way the code was written. Looking back, it would have been better to use an object oriented design to make better use of unit testing.</a:t>
-            </a:r>
-          </a:p>
-          <a:p>
-            <a:endParaRPr lang="en-GB" sz="1800" dirty="0" smtClean="0"/>
-          </a:p>
-          <a:p>
             <a:endParaRPr lang="en-GB" sz="1800" dirty="0"/>
           </a:p>
         </p:txBody>
@@ -9784,7 +8350,7 @@
     </p:spTree>
     <p:extLst>
       <p:ext uri="{BB962C8B-B14F-4D97-AF65-F5344CB8AC3E}">
-        <p14:creationId xmlns:p14="http://schemas.microsoft.com/office/powerpoint/2010/main" val="2286555159"/>
+        <p14:creationId xmlns:p14="http://schemas.microsoft.com/office/powerpoint/2010/main" val="1109759311"/>
       </p:ext>
     </p:extLst>
   </p:cSld>
@@ -9794,7 +8360,7 @@
 </p:sld>
 </file>
 
-<file path=ppt/slides/slide7.xml><?xml version="1.0" encoding="utf-8"?>
+<file path=ppt/slides/slide2.xml><?xml version="1.0" encoding="utf-8"?>
 <p:sld xmlns:a="http://schemas.openxmlformats.org/drawingml/2006/main" xmlns:r="http://schemas.openxmlformats.org/officeDocument/2006/relationships" xmlns:p="http://schemas.openxmlformats.org/presentationml/2006/main">
   <p:cSld>
     <p:bg>
@@ -9827,7 +8393,7 @@
                 <a16:creationId xmlns:a16="http://schemas.microsoft.com/office/drawing/2014/main" id="{0B0BBD46-E160-4D02-9D82-3934E3970C6C}"/>
               </a:ext>
               <a:ext uri="{C183D7F6-B498-43B3-948B-1728B52AA6E4}">
-                <adec:decorative xmlns:adec="http://schemas.microsoft.com/office/drawing/2017/decorative" xmlns="" val="1"/>
+                <adec:decorative xmlns="" xmlns:adec="http://schemas.microsoft.com/office/drawing/2017/decorative" val="1"/>
               </a:ext>
             </a:extLst>
           </p:cNvPr>
@@ -9887,7 +8453,7 @@
                 <a16:creationId xmlns:a16="http://schemas.microsoft.com/office/drawing/2014/main" id="{3114C8A4-DCE7-4155-98CA-D8826574B702}"/>
               </a:ext>
               <a:ext uri="{C183D7F6-B498-43B3-948B-1728B52AA6E4}">
-                <adec:decorative xmlns:adec="http://schemas.microsoft.com/office/drawing/2017/decorative" xmlns="" val="1"/>
+                <adec:decorative xmlns="" xmlns:adec="http://schemas.microsoft.com/office/drawing/2017/decorative" val="1"/>
               </a:ext>
             </a:extLst>
           </p:cNvPr>
@@ -9959,8 +8525,21 @@
                   <a:srgbClr val="FFFFFF"/>
                 </a:solidFill>
               </a:rPr>
-              <a:t>Testing</a:t>
-            </a:r>
+              <a:t>Program </a:t>
+            </a:r>
+            <a:r>
+              <a:rPr lang="en-GB" dirty="0" smtClean="0">
+                <a:solidFill>
+                  <a:srgbClr val="FFFFFF"/>
+                </a:solidFill>
+              </a:rPr>
+              <a:t>progress</a:t>
+            </a:r>
+            <a:endParaRPr lang="en-GB" dirty="0">
+              <a:solidFill>
+                <a:srgbClr val="FFFFFF"/>
+              </a:solidFill>
+            </a:endParaRPr>
           </a:p>
         </p:txBody>
       </p:sp>
@@ -9972,7 +8551,7 @@
                 <a16:creationId xmlns:a16="http://schemas.microsoft.com/office/drawing/2014/main" id="{77A64E61-6D37-4CB3-8F42-66B0DACBCB0F}"/>
               </a:ext>
               <a:ext uri="{C183D7F6-B498-43B3-948B-1728B52AA6E4}">
-                <adec:decorative xmlns:adec="http://schemas.microsoft.com/office/drawing/2017/decorative" xmlns="" val="1"/>
+                <adec:decorative xmlns="" xmlns:adec="http://schemas.microsoft.com/office/drawing/2017/decorative" val="1"/>
               </a:ext>
             </a:extLst>
           </p:cNvPr>
@@ -10036,6 +8615,1450 @@
       </p:sp>
       <p:sp>
         <p:nvSpPr>
+          <p:cNvPr id="3" name="Content Placeholder 2">
+            <a:extLst>
+              <a:ext uri="{FF2B5EF4-FFF2-40B4-BE49-F238E27FC236}">
+                <a16:creationId xmlns:a16="http://schemas.microsoft.com/office/drawing/2014/main" id="{EC704661-2884-4E4D-AE8F-BEB655F5EEF2}"/>
+              </a:ext>
+            </a:extLst>
+          </p:cNvPr>
+          <p:cNvSpPr>
+            <a:spLocks noGrp="1"/>
+          </p:cNvSpPr>
+          <p:nvPr>
+            <p:ph idx="1"/>
+          </p:nvPr>
+        </p:nvSpPr>
+        <p:spPr>
+          <a:xfrm>
+            <a:off x="680322" y="2336873"/>
+            <a:ext cx="5913574" cy="3139799"/>
+          </a:xfrm>
+        </p:spPr>
+        <p:txBody>
+          <a:bodyPr anchor="t">
+            <a:normAutofit/>
+          </a:bodyPr>
+          <a:lstStyle/>
+          <a:p>
+            <a:r>
+              <a:rPr lang="en-GB" sz="1800" dirty="0"/>
+              <a:t>Login screen</a:t>
+            </a:r>
+          </a:p>
+          <a:p>
+            <a:r>
+              <a:rPr lang="en-GB" sz="1800" dirty="0"/>
+              <a:t>Will </a:t>
+            </a:r>
+            <a:r>
+              <a:rPr lang="en-GB" sz="1800" dirty="0" smtClean="0"/>
+              <a:t>require </a:t>
+            </a:r>
+            <a:r>
+              <a:rPr lang="en-GB" sz="1800" dirty="0"/>
+              <a:t>a </a:t>
+            </a:r>
+            <a:r>
+              <a:rPr lang="en-GB" sz="1800" dirty="0" smtClean="0"/>
+              <a:t>user’s </a:t>
+            </a:r>
+            <a:r>
+              <a:rPr lang="en-GB" sz="1800" dirty="0"/>
+              <a:t>first name and password</a:t>
+            </a:r>
+          </a:p>
+          <a:p>
+            <a:r>
+              <a:rPr lang="en-GB" sz="1800" dirty="0"/>
+              <a:t>Will open the main </a:t>
+            </a:r>
+            <a:r>
+              <a:rPr lang="en-GB" sz="1800" dirty="0" smtClean="0"/>
+              <a:t>disciplinary action </a:t>
+            </a:r>
+            <a:r>
+              <a:rPr lang="en-GB" sz="1800" dirty="0"/>
+              <a:t>screen if </a:t>
+            </a:r>
+            <a:r>
+              <a:rPr lang="en-GB" sz="1800" dirty="0" smtClean="0"/>
+              <a:t>successfully logged </a:t>
+            </a:r>
+            <a:r>
+              <a:rPr lang="en-GB" sz="1800" dirty="0"/>
+              <a:t>in</a:t>
+            </a:r>
+          </a:p>
+          <a:p>
+            <a:r>
+              <a:rPr lang="en-GB" sz="1800" dirty="0"/>
+              <a:t>Shows error message if </a:t>
+            </a:r>
+            <a:r>
+              <a:rPr lang="en-GB" sz="1800" dirty="0" smtClean="0"/>
+              <a:t>incorrect </a:t>
+            </a:r>
+            <a:r>
+              <a:rPr lang="en-GB" sz="1800" dirty="0"/>
+              <a:t>name or password enter</a:t>
+            </a:r>
+          </a:p>
+          <a:p>
+            <a:r>
+              <a:rPr lang="en-GB" sz="1800" dirty="0"/>
+              <a:t>Has a policy button to show the </a:t>
+            </a:r>
+            <a:r>
+              <a:rPr lang="en-GB" sz="1800" dirty="0" smtClean="0"/>
+              <a:t>company’s </a:t>
+            </a:r>
+            <a:r>
+              <a:rPr lang="en-GB" sz="1800" dirty="0"/>
+              <a:t>policy</a:t>
+            </a:r>
+          </a:p>
+        </p:txBody>
+      </p:sp>
+      <p:pic>
+        <p:nvPicPr>
+          <p:cNvPr id="4" name="Picture 3">
+            <a:extLst>
+              <a:ext uri="{FF2B5EF4-FFF2-40B4-BE49-F238E27FC236}">
+                <a16:creationId xmlns:a16="http://schemas.microsoft.com/office/drawing/2014/main" id="{1CFC352F-7100-4CB7-8533-4923C8D8E7B5}"/>
+              </a:ext>
+            </a:extLst>
+          </p:cNvPr>
+          <p:cNvPicPr>
+            <a:picLocks noChangeAspect="1"/>
+          </p:cNvPicPr>
+          <p:nvPr/>
+        </p:nvPicPr>
+        <p:blipFill>
+          <a:blip r:embed="rId3"/>
+          <a:stretch>
+            <a:fillRect/>
+          </a:stretch>
+        </p:blipFill>
+        <p:spPr>
+          <a:xfrm>
+            <a:off x="7145044" y="88069"/>
+            <a:ext cx="3437394" cy="4917067"/>
+          </a:xfrm>
+          <a:prstGeom prst="rect">
+            <a:avLst/>
+          </a:prstGeom>
+        </p:spPr>
+      </p:pic>
+      <p:pic>
+        <p:nvPicPr>
+          <p:cNvPr id="5" name="Picture 4">
+            <a:extLst>
+              <a:ext uri="{FF2B5EF4-FFF2-40B4-BE49-F238E27FC236}">
+                <a16:creationId xmlns:a16="http://schemas.microsoft.com/office/drawing/2014/main" id="{F421A0B4-0DD1-4831-ADAE-159300E195BC}"/>
+              </a:ext>
+            </a:extLst>
+          </p:cNvPr>
+          <p:cNvPicPr>
+            <a:picLocks noChangeAspect="1"/>
+          </p:cNvPicPr>
+          <p:nvPr/>
+        </p:nvPicPr>
+        <p:blipFill rotWithShape="1">
+          <a:blip r:embed="rId4"/>
+          <a:srcRect l="42467" t="39879" r="41586" b="38356"/>
+          <a:stretch/>
+        </p:blipFill>
+        <p:spPr>
+          <a:xfrm>
+            <a:off x="7893896" y="5005137"/>
+            <a:ext cx="2152471" cy="1651711"/>
+          </a:xfrm>
+          <a:prstGeom prst="rect">
+            <a:avLst/>
+          </a:prstGeom>
+        </p:spPr>
+      </p:pic>
+    </p:spTree>
+    <p:extLst>
+      <p:ext uri="{BB962C8B-B14F-4D97-AF65-F5344CB8AC3E}">
+        <p14:creationId xmlns:p14="http://schemas.microsoft.com/office/powerpoint/2010/main" val="4194044199"/>
+      </p:ext>
+    </p:extLst>
+  </p:cSld>
+  <p:clrMapOvr>
+    <a:masterClrMapping/>
+  </p:clrMapOvr>
+</p:sld>
+</file>
+
+<file path=ppt/slides/slide3.xml><?xml version="1.0" encoding="utf-8"?>
+<p:sld xmlns:a="http://schemas.openxmlformats.org/drawingml/2006/main" xmlns:r="http://schemas.openxmlformats.org/officeDocument/2006/relationships" xmlns:p="http://schemas.openxmlformats.org/presentationml/2006/main">
+  <p:cSld>
+    <p:bg>
+      <p:bgPr>
+        <a:solidFill>
+          <a:schemeClr val="bg1"/>
+        </a:solidFill>
+        <a:effectLst/>
+      </p:bgPr>
+    </p:bg>
+    <p:spTree>
+      <p:nvGrpSpPr>
+        <p:cNvPr id="1" name=""/>
+        <p:cNvGrpSpPr/>
+        <p:nvPr/>
+      </p:nvGrpSpPr>
+      <p:grpSpPr>
+        <a:xfrm>
+          <a:off x="0" y="0"/>
+          <a:ext cx="0" cy="0"/>
+          <a:chOff x="0" y="0"/>
+          <a:chExt cx="0" cy="0"/>
+        </a:xfrm>
+      </p:grpSpPr>
+      <p:sp>
+        <p:nvSpPr>
+          <p:cNvPr id="20" name="Rectangle 7">
+            <a:extLst>
+              <a:ext uri="{FF2B5EF4-FFF2-40B4-BE49-F238E27FC236}">
+                <a16:creationId xmlns:a16="http://schemas.microsoft.com/office/drawing/2014/main" id="{0B0BBD46-E160-4D02-9D82-3934E3970C6C}"/>
+              </a:ext>
+              <a:ext uri="{C183D7F6-B498-43B3-948B-1728B52AA6E4}">
+                <adec:decorative xmlns="" xmlns:adec="http://schemas.microsoft.com/office/drawing/2017/decorative" val="1"/>
+              </a:ext>
+            </a:extLst>
+          </p:cNvPr>
+          <p:cNvSpPr>
+            <a:spLocks noGrp="1" noRot="1" noChangeAspect="1" noMove="1" noResize="1" noEditPoints="1" noAdjustHandles="1" noChangeArrowheads="1" noChangeShapeType="1" noTextEdit="1"/>
+          </p:cNvSpPr>
+          <p:nvPr>
+            <p:extLst>
+              <p:ext uri="{386F3935-93C4-4BCD-93E2-E3B085C9AB24}">
+                <p16:designElem xmlns:p16="http://schemas.microsoft.com/office/powerpoint/2015/main" val="1"/>
+              </p:ext>
+            </p:extLst>
+          </p:nvPr>
+        </p:nvSpPr>
+        <p:spPr>
+          <a:xfrm>
+            <a:off x="0" y="0"/>
+            <a:ext cx="12188952" cy="6857999"/>
+          </a:xfrm>
+          <a:prstGeom prst="rect">
+            <a:avLst/>
+          </a:prstGeom>
+          <a:ln>
+            <a:noFill/>
+          </a:ln>
+        </p:spPr>
+        <p:style>
+          <a:lnRef idx="2">
+            <a:schemeClr val="accent1">
+              <a:shade val="50000"/>
+            </a:schemeClr>
+          </a:lnRef>
+          <a:fillRef idx="1">
+            <a:schemeClr val="accent1"/>
+          </a:fillRef>
+          <a:effectRef idx="0">
+            <a:schemeClr val="accent1"/>
+          </a:effectRef>
+          <a:fontRef idx="minor">
+            <a:schemeClr val="lt1"/>
+          </a:fontRef>
+        </p:style>
+        <p:txBody>
+          <a:bodyPr rtlCol="0" anchor="ctr"/>
+          <a:lstStyle/>
+          <a:p>
+            <a:pPr algn="ctr"/>
+            <a:endParaRPr lang="en-US"/>
+          </a:p>
+        </p:txBody>
+      </p:sp>
+      <p:pic>
+        <p:nvPicPr>
+          <p:cNvPr id="21" name="Picture 9">
+            <a:extLst>
+              <a:ext uri="{FF2B5EF4-FFF2-40B4-BE49-F238E27FC236}">
+                <a16:creationId xmlns:a16="http://schemas.microsoft.com/office/drawing/2014/main" id="{3114C8A4-DCE7-4155-98CA-D8826574B702}"/>
+              </a:ext>
+              <a:ext uri="{C183D7F6-B498-43B3-948B-1728B52AA6E4}">
+                <adec:decorative xmlns="" xmlns:adec="http://schemas.microsoft.com/office/drawing/2017/decorative" val="1"/>
+              </a:ext>
+            </a:extLst>
+          </p:cNvPr>
+          <p:cNvPicPr>
+            <a:picLocks noGrp="1" noRot="1" noChangeAspect="1" noMove="1" noResize="1" noEditPoints="1" noAdjustHandles="1" noChangeArrowheads="1" noChangeShapeType="1" noCrop="1"/>
+          </p:cNvPicPr>
+          <p:nvPr>
+            <p:extLst>
+              <p:ext uri="{386F3935-93C4-4BCD-93E2-E3B085C9AB24}">
+                <p16:designElem xmlns:p16="http://schemas.microsoft.com/office/powerpoint/2015/main" val="1"/>
+              </p:ext>
+            </p:extLst>
+          </p:nvPr>
+        </p:nvPicPr>
+        <p:blipFill>
+          <a:blip r:embed="rId2">
+            <a:alphaModFix amt="10000"/>
+            <a:extLst>
+              <a:ext uri="{28A0092B-C50C-407E-A947-70E740481C1C}">
+                <a14:useLocalDpi xmlns:a14="http://schemas.microsoft.com/office/drawing/2010/main" val="0"/>
+              </a:ext>
+            </a:extLst>
+          </a:blip>
+          <a:stretch>
+            <a:fillRect/>
+          </a:stretch>
+        </p:blipFill>
+        <p:spPr>
+          <a:xfrm>
+            <a:off x="0" y="0"/>
+            <a:ext cx="12192000" cy="6858000"/>
+          </a:xfrm>
+          <a:prstGeom prst="rect">
+            <a:avLst/>
+          </a:prstGeom>
+        </p:spPr>
+      </p:pic>
+      <p:sp>
+        <p:nvSpPr>
+          <p:cNvPr id="2" name="Title 1">
+            <a:extLst>
+              <a:ext uri="{FF2B5EF4-FFF2-40B4-BE49-F238E27FC236}">
+                <a16:creationId xmlns:a16="http://schemas.microsoft.com/office/drawing/2014/main" id="{604533E2-4A4D-4DAB-9F0E-EE21DE5E80CD}"/>
+              </a:ext>
+            </a:extLst>
+          </p:cNvPr>
+          <p:cNvSpPr>
+            <a:spLocks noGrp="1"/>
+          </p:cNvSpPr>
+          <p:nvPr>
+            <p:ph type="title"/>
+          </p:nvPr>
+        </p:nvSpPr>
+        <p:spPr>
+          <a:xfrm>
+            <a:off x="680321" y="321732"/>
+            <a:ext cx="9900593" cy="1080938"/>
+          </a:xfrm>
+        </p:spPr>
+        <p:txBody>
+          <a:bodyPr>
+            <a:normAutofit/>
+          </a:bodyPr>
+          <a:lstStyle/>
+          <a:p>
+            <a:r>
+              <a:rPr lang="en-GB" dirty="0">
+                <a:solidFill>
+                  <a:srgbClr val="FFFFFF"/>
+                </a:solidFill>
+              </a:rPr>
+              <a:t>Program </a:t>
+            </a:r>
+            <a:r>
+              <a:rPr lang="en-GB" dirty="0" smtClean="0">
+                <a:solidFill>
+                  <a:srgbClr val="FFFFFF"/>
+                </a:solidFill>
+              </a:rPr>
+              <a:t>progress</a:t>
+            </a:r>
+            <a:endParaRPr lang="en-GB" dirty="0">
+              <a:solidFill>
+                <a:srgbClr val="FFFFFF"/>
+              </a:solidFill>
+            </a:endParaRPr>
+          </a:p>
+        </p:txBody>
+      </p:sp>
+      <p:sp>
+        <p:nvSpPr>
+          <p:cNvPr id="22" name="Rectangle 11">
+            <a:extLst>
+              <a:ext uri="{FF2B5EF4-FFF2-40B4-BE49-F238E27FC236}">
+                <a16:creationId xmlns:a16="http://schemas.microsoft.com/office/drawing/2014/main" id="{77A64E61-6D37-4CB3-8F42-66B0DACBCB0F}"/>
+              </a:ext>
+              <a:ext uri="{C183D7F6-B498-43B3-948B-1728B52AA6E4}">
+                <adec:decorative xmlns="" xmlns:adec="http://schemas.microsoft.com/office/drawing/2017/decorative" val="1"/>
+              </a:ext>
+            </a:extLst>
+          </p:cNvPr>
+          <p:cNvSpPr>
+            <a:spLocks noGrp="1" noRot="1" noChangeAspect="1" noMove="1" noResize="1" noEditPoints="1" noAdjustHandles="1" noChangeArrowheads="1" noChangeShapeType="1" noTextEdit="1"/>
+          </p:cNvSpPr>
+          <p:nvPr>
+            <p:extLst>
+              <p:ext uri="{386F3935-93C4-4BCD-93E2-E3B085C9AB24}">
+                <p16:designElem xmlns:p16="http://schemas.microsoft.com/office/powerpoint/2015/main" val="1"/>
+              </p:ext>
+            </p:extLst>
+          </p:nvPr>
+        </p:nvSpPr>
+        <p:spPr>
+          <a:xfrm>
+            <a:off x="0" y="1724402"/>
+            <a:ext cx="12192000" cy="5133597"/>
+          </a:xfrm>
+          <a:prstGeom prst="rect">
+            <a:avLst/>
+          </a:prstGeom>
+          <a:solidFill>
+            <a:schemeClr val="bg1"/>
+          </a:solidFill>
+          <a:ln>
+            <a:noFill/>
+          </a:ln>
+          <a:effectLst>
+            <a:outerShdw blurRad="88900" dist="38100" dir="16200000" rotWithShape="0">
+              <a:prstClr val="black">
+                <a:alpha val="30000"/>
+              </a:prstClr>
+            </a:outerShdw>
+          </a:effectLst>
+        </p:spPr>
+        <p:style>
+          <a:lnRef idx="2">
+            <a:schemeClr val="accent1">
+              <a:shade val="50000"/>
+            </a:schemeClr>
+          </a:lnRef>
+          <a:fillRef idx="1">
+            <a:schemeClr val="accent1"/>
+          </a:fillRef>
+          <a:effectRef idx="0">
+            <a:schemeClr val="accent1"/>
+          </a:effectRef>
+          <a:fontRef idx="minor">
+            <a:schemeClr val="lt1"/>
+          </a:fontRef>
+        </p:style>
+        <p:txBody>
+          <a:bodyPr rtlCol="0" anchor="ctr"/>
+          <a:lstStyle/>
+          <a:p>
+            <a:pPr algn="ctr"/>
+            <a:endParaRPr lang="en-US"/>
+          </a:p>
+        </p:txBody>
+      </p:sp>
+      <p:sp>
+        <p:nvSpPr>
+          <p:cNvPr id="3" name="Content Placeholder 2">
+            <a:extLst>
+              <a:ext uri="{FF2B5EF4-FFF2-40B4-BE49-F238E27FC236}">
+                <a16:creationId xmlns:a16="http://schemas.microsoft.com/office/drawing/2014/main" id="{EC704661-2884-4E4D-AE8F-BEB655F5EEF2}"/>
+              </a:ext>
+            </a:extLst>
+          </p:cNvPr>
+          <p:cNvSpPr>
+            <a:spLocks noGrp="1"/>
+          </p:cNvSpPr>
+          <p:nvPr>
+            <p:ph idx="1"/>
+          </p:nvPr>
+        </p:nvSpPr>
+        <p:spPr>
+          <a:xfrm>
+            <a:off x="680322" y="2336873"/>
+            <a:ext cx="5913574" cy="3139799"/>
+          </a:xfrm>
+        </p:spPr>
+        <p:txBody>
+          <a:bodyPr anchor="t">
+            <a:normAutofit/>
+          </a:bodyPr>
+          <a:lstStyle/>
+          <a:p>
+            <a:r>
+              <a:rPr lang="en-GB" sz="1800" dirty="0" smtClean="0"/>
+              <a:t>Policy </a:t>
+            </a:r>
+            <a:r>
+              <a:rPr lang="en-GB" sz="1800" dirty="0"/>
+              <a:t>screen</a:t>
+            </a:r>
+          </a:p>
+          <a:p>
+            <a:endParaRPr lang="en-GB" sz="1800" dirty="0"/>
+          </a:p>
+          <a:p>
+            <a:r>
+              <a:rPr lang="en-GB" sz="1800" dirty="0"/>
+              <a:t>Shows company </a:t>
+            </a:r>
+            <a:r>
+              <a:rPr lang="en-GB" sz="1800" dirty="0" smtClean="0"/>
+              <a:t>Policy</a:t>
+            </a:r>
+            <a:endParaRPr lang="en-GB" sz="1800" dirty="0"/>
+          </a:p>
+        </p:txBody>
+      </p:sp>
+      <p:pic>
+        <p:nvPicPr>
+          <p:cNvPr id="4" name="Picture 3"/>
+          <p:cNvPicPr>
+            <a:picLocks noChangeAspect="1"/>
+          </p:cNvPicPr>
+          <p:nvPr/>
+        </p:nvPicPr>
+        <p:blipFill>
+          <a:blip r:embed="rId3"/>
+          <a:stretch>
+            <a:fillRect/>
+          </a:stretch>
+        </p:blipFill>
+        <p:spPr>
+          <a:xfrm>
+            <a:off x="5749436" y="483577"/>
+            <a:ext cx="5938808" cy="5420458"/>
+          </a:xfrm>
+          <a:prstGeom prst="rect">
+            <a:avLst/>
+          </a:prstGeom>
+        </p:spPr>
+      </p:pic>
+    </p:spTree>
+    <p:extLst>
+      <p:ext uri="{BB962C8B-B14F-4D97-AF65-F5344CB8AC3E}">
+        <p14:creationId xmlns:p14="http://schemas.microsoft.com/office/powerpoint/2010/main" val="2622064099"/>
+      </p:ext>
+    </p:extLst>
+  </p:cSld>
+  <p:clrMapOvr>
+    <a:masterClrMapping/>
+  </p:clrMapOvr>
+</p:sld>
+</file>
+
+<file path=ppt/slides/slide4.xml><?xml version="1.0" encoding="utf-8"?>
+<p:sld xmlns:a="http://schemas.openxmlformats.org/drawingml/2006/main" xmlns:r="http://schemas.openxmlformats.org/officeDocument/2006/relationships" xmlns:p="http://schemas.openxmlformats.org/presentationml/2006/main">
+  <p:cSld>
+    <p:bg>
+      <p:bgPr>
+        <a:solidFill>
+          <a:schemeClr val="bg1"/>
+        </a:solidFill>
+        <a:effectLst/>
+      </p:bgPr>
+    </p:bg>
+    <p:spTree>
+      <p:nvGrpSpPr>
+        <p:cNvPr id="1" name=""/>
+        <p:cNvGrpSpPr/>
+        <p:nvPr/>
+      </p:nvGrpSpPr>
+      <p:grpSpPr>
+        <a:xfrm>
+          <a:off x="0" y="0"/>
+          <a:ext cx="0" cy="0"/>
+          <a:chOff x="0" y="0"/>
+          <a:chExt cx="0" cy="0"/>
+        </a:xfrm>
+      </p:grpSpPr>
+      <p:sp>
+        <p:nvSpPr>
+          <p:cNvPr id="20" name="Rectangle 7">
+            <a:extLst>
+              <a:ext uri="{FF2B5EF4-FFF2-40B4-BE49-F238E27FC236}">
+                <a16:creationId xmlns:a16="http://schemas.microsoft.com/office/drawing/2014/main" id="{0B0BBD46-E160-4D02-9D82-3934E3970C6C}"/>
+              </a:ext>
+              <a:ext uri="{C183D7F6-B498-43B3-948B-1728B52AA6E4}">
+                <adec:decorative xmlns="" xmlns:adec="http://schemas.microsoft.com/office/drawing/2017/decorative" val="1"/>
+              </a:ext>
+            </a:extLst>
+          </p:cNvPr>
+          <p:cNvSpPr>
+            <a:spLocks noGrp="1" noRot="1" noChangeAspect="1" noMove="1" noResize="1" noEditPoints="1" noAdjustHandles="1" noChangeArrowheads="1" noChangeShapeType="1" noTextEdit="1"/>
+          </p:cNvSpPr>
+          <p:nvPr>
+            <p:extLst>
+              <p:ext uri="{386F3935-93C4-4BCD-93E2-E3B085C9AB24}">
+                <p16:designElem xmlns:p16="http://schemas.microsoft.com/office/powerpoint/2015/main" val="1"/>
+              </p:ext>
+            </p:extLst>
+          </p:nvPr>
+        </p:nvSpPr>
+        <p:spPr>
+          <a:xfrm>
+            <a:off x="0" y="0"/>
+            <a:ext cx="12188952" cy="6857999"/>
+          </a:xfrm>
+          <a:prstGeom prst="rect">
+            <a:avLst/>
+          </a:prstGeom>
+          <a:ln>
+            <a:noFill/>
+          </a:ln>
+        </p:spPr>
+        <p:style>
+          <a:lnRef idx="2">
+            <a:schemeClr val="accent1">
+              <a:shade val="50000"/>
+            </a:schemeClr>
+          </a:lnRef>
+          <a:fillRef idx="1">
+            <a:schemeClr val="accent1"/>
+          </a:fillRef>
+          <a:effectRef idx="0">
+            <a:schemeClr val="accent1"/>
+          </a:effectRef>
+          <a:fontRef idx="minor">
+            <a:schemeClr val="lt1"/>
+          </a:fontRef>
+        </p:style>
+        <p:txBody>
+          <a:bodyPr rtlCol="0" anchor="ctr"/>
+          <a:lstStyle/>
+          <a:p>
+            <a:pPr algn="ctr"/>
+            <a:endParaRPr lang="en-US"/>
+          </a:p>
+        </p:txBody>
+      </p:sp>
+      <p:pic>
+        <p:nvPicPr>
+          <p:cNvPr id="21" name="Picture 9">
+            <a:extLst>
+              <a:ext uri="{FF2B5EF4-FFF2-40B4-BE49-F238E27FC236}">
+                <a16:creationId xmlns:a16="http://schemas.microsoft.com/office/drawing/2014/main" id="{3114C8A4-DCE7-4155-98CA-D8826574B702}"/>
+              </a:ext>
+              <a:ext uri="{C183D7F6-B498-43B3-948B-1728B52AA6E4}">
+                <adec:decorative xmlns="" xmlns:adec="http://schemas.microsoft.com/office/drawing/2017/decorative" val="1"/>
+              </a:ext>
+            </a:extLst>
+          </p:cNvPr>
+          <p:cNvPicPr>
+            <a:picLocks noGrp="1" noRot="1" noChangeAspect="1" noMove="1" noResize="1" noEditPoints="1" noAdjustHandles="1" noChangeArrowheads="1" noChangeShapeType="1" noCrop="1"/>
+          </p:cNvPicPr>
+          <p:nvPr>
+            <p:extLst>
+              <p:ext uri="{386F3935-93C4-4BCD-93E2-E3B085C9AB24}">
+                <p16:designElem xmlns:p16="http://schemas.microsoft.com/office/powerpoint/2015/main" val="1"/>
+              </p:ext>
+            </p:extLst>
+          </p:nvPr>
+        </p:nvPicPr>
+        <p:blipFill>
+          <a:blip r:embed="rId2">
+            <a:alphaModFix amt="10000"/>
+            <a:extLst>
+              <a:ext uri="{28A0092B-C50C-407E-A947-70E740481C1C}">
+                <a14:useLocalDpi xmlns:a14="http://schemas.microsoft.com/office/drawing/2010/main" val="0"/>
+              </a:ext>
+            </a:extLst>
+          </a:blip>
+          <a:stretch>
+            <a:fillRect/>
+          </a:stretch>
+        </p:blipFill>
+        <p:spPr>
+          <a:xfrm>
+            <a:off x="0" y="0"/>
+            <a:ext cx="12192000" cy="6858000"/>
+          </a:xfrm>
+          <a:prstGeom prst="rect">
+            <a:avLst/>
+          </a:prstGeom>
+        </p:spPr>
+      </p:pic>
+      <p:sp>
+        <p:nvSpPr>
+          <p:cNvPr id="2" name="Title 1">
+            <a:extLst>
+              <a:ext uri="{FF2B5EF4-FFF2-40B4-BE49-F238E27FC236}">
+                <a16:creationId xmlns:a16="http://schemas.microsoft.com/office/drawing/2014/main" id="{604533E2-4A4D-4DAB-9F0E-EE21DE5E80CD}"/>
+              </a:ext>
+            </a:extLst>
+          </p:cNvPr>
+          <p:cNvSpPr>
+            <a:spLocks noGrp="1"/>
+          </p:cNvSpPr>
+          <p:nvPr>
+            <p:ph type="title"/>
+          </p:nvPr>
+        </p:nvSpPr>
+        <p:spPr>
+          <a:xfrm>
+            <a:off x="680321" y="321732"/>
+            <a:ext cx="9900593" cy="1080938"/>
+          </a:xfrm>
+        </p:spPr>
+        <p:txBody>
+          <a:bodyPr>
+            <a:normAutofit/>
+          </a:bodyPr>
+          <a:lstStyle/>
+          <a:p>
+            <a:r>
+              <a:rPr lang="en-GB" dirty="0">
+                <a:solidFill>
+                  <a:srgbClr val="FFFFFF"/>
+                </a:solidFill>
+              </a:rPr>
+              <a:t>Program </a:t>
+            </a:r>
+            <a:r>
+              <a:rPr lang="en-GB" dirty="0" smtClean="0">
+                <a:solidFill>
+                  <a:srgbClr val="FFFFFF"/>
+                </a:solidFill>
+              </a:rPr>
+              <a:t>progress</a:t>
+            </a:r>
+            <a:endParaRPr lang="en-GB" dirty="0">
+              <a:solidFill>
+                <a:srgbClr val="FFFFFF"/>
+              </a:solidFill>
+            </a:endParaRPr>
+          </a:p>
+        </p:txBody>
+      </p:sp>
+      <p:sp>
+        <p:nvSpPr>
+          <p:cNvPr id="22" name="Rectangle 11">
+            <a:extLst>
+              <a:ext uri="{FF2B5EF4-FFF2-40B4-BE49-F238E27FC236}">
+                <a16:creationId xmlns:a16="http://schemas.microsoft.com/office/drawing/2014/main" id="{77A64E61-6D37-4CB3-8F42-66B0DACBCB0F}"/>
+              </a:ext>
+              <a:ext uri="{C183D7F6-B498-43B3-948B-1728B52AA6E4}">
+                <adec:decorative xmlns="" xmlns:adec="http://schemas.microsoft.com/office/drawing/2017/decorative" val="1"/>
+              </a:ext>
+            </a:extLst>
+          </p:cNvPr>
+          <p:cNvSpPr>
+            <a:spLocks noGrp="1" noRot="1" noChangeAspect="1" noMove="1" noResize="1" noEditPoints="1" noAdjustHandles="1" noChangeArrowheads="1" noChangeShapeType="1" noTextEdit="1"/>
+          </p:cNvSpPr>
+          <p:nvPr>
+            <p:extLst>
+              <p:ext uri="{386F3935-93C4-4BCD-93E2-E3B085C9AB24}">
+                <p16:designElem xmlns:p16="http://schemas.microsoft.com/office/powerpoint/2015/main" val="1"/>
+              </p:ext>
+            </p:extLst>
+          </p:nvPr>
+        </p:nvSpPr>
+        <p:spPr>
+          <a:xfrm>
+            <a:off x="0" y="1724402"/>
+            <a:ext cx="12192000" cy="5133597"/>
+          </a:xfrm>
+          <a:prstGeom prst="rect">
+            <a:avLst/>
+          </a:prstGeom>
+          <a:solidFill>
+            <a:schemeClr val="bg1"/>
+          </a:solidFill>
+          <a:ln>
+            <a:noFill/>
+          </a:ln>
+          <a:effectLst>
+            <a:outerShdw blurRad="88900" dist="38100" dir="16200000" rotWithShape="0">
+              <a:prstClr val="black">
+                <a:alpha val="30000"/>
+              </a:prstClr>
+            </a:outerShdw>
+          </a:effectLst>
+        </p:spPr>
+        <p:style>
+          <a:lnRef idx="2">
+            <a:schemeClr val="accent1">
+              <a:shade val="50000"/>
+            </a:schemeClr>
+          </a:lnRef>
+          <a:fillRef idx="1">
+            <a:schemeClr val="accent1"/>
+          </a:fillRef>
+          <a:effectRef idx="0">
+            <a:schemeClr val="accent1"/>
+          </a:effectRef>
+          <a:fontRef idx="minor">
+            <a:schemeClr val="lt1"/>
+          </a:fontRef>
+        </p:style>
+        <p:txBody>
+          <a:bodyPr rtlCol="0" anchor="ctr"/>
+          <a:lstStyle/>
+          <a:p>
+            <a:pPr algn="ctr"/>
+            <a:endParaRPr lang="en-US"/>
+          </a:p>
+        </p:txBody>
+      </p:sp>
+      <p:sp>
+        <p:nvSpPr>
+          <p:cNvPr id="3" name="Content Placeholder 2">
+            <a:extLst>
+              <a:ext uri="{FF2B5EF4-FFF2-40B4-BE49-F238E27FC236}">
+                <a16:creationId xmlns:a16="http://schemas.microsoft.com/office/drawing/2014/main" id="{EC704661-2884-4E4D-AE8F-BEB655F5EEF2}"/>
+              </a:ext>
+            </a:extLst>
+          </p:cNvPr>
+          <p:cNvSpPr>
+            <a:spLocks noGrp="1"/>
+          </p:cNvSpPr>
+          <p:nvPr>
+            <p:ph idx="1"/>
+          </p:nvPr>
+        </p:nvSpPr>
+        <p:spPr>
+          <a:xfrm>
+            <a:off x="680322" y="2336873"/>
+            <a:ext cx="3054877" cy="3139799"/>
+          </a:xfrm>
+        </p:spPr>
+        <p:txBody>
+          <a:bodyPr anchor="t">
+            <a:normAutofit/>
+          </a:bodyPr>
+          <a:lstStyle/>
+          <a:p>
+            <a:r>
+              <a:rPr lang="en-GB" sz="1800" dirty="0" smtClean="0"/>
+              <a:t>Disciplinary </a:t>
+            </a:r>
+            <a:r>
+              <a:rPr lang="en-GB" sz="1800" dirty="0"/>
+              <a:t>action</a:t>
+            </a:r>
+          </a:p>
+          <a:p>
+            <a:endParaRPr lang="en-GB" sz="1800" dirty="0"/>
+          </a:p>
+          <a:p>
+            <a:endParaRPr lang="en-GB" sz="1800" dirty="0"/>
+          </a:p>
+        </p:txBody>
+      </p:sp>
+      <p:pic>
+        <p:nvPicPr>
+          <p:cNvPr id="5" name="Picture 4">
+            <a:extLst>
+              <a:ext uri="{FF2B5EF4-FFF2-40B4-BE49-F238E27FC236}">
+                <a16:creationId xmlns:a16="http://schemas.microsoft.com/office/drawing/2014/main" id="{CC8CBCC0-E6BF-4AAC-AF90-B6E7B77C8CB1}"/>
+              </a:ext>
+            </a:extLst>
+          </p:cNvPr>
+          <p:cNvPicPr>
+            <a:picLocks noChangeAspect="1"/>
+          </p:cNvPicPr>
+          <p:nvPr/>
+        </p:nvPicPr>
+        <p:blipFill>
+          <a:blip r:embed="rId3"/>
+          <a:stretch>
+            <a:fillRect/>
+          </a:stretch>
+        </p:blipFill>
+        <p:spPr>
+          <a:xfrm>
+            <a:off x="4566256" y="669481"/>
+            <a:ext cx="7625744" cy="6188519"/>
+          </a:xfrm>
+          <a:prstGeom prst="rect">
+            <a:avLst/>
+          </a:prstGeom>
+        </p:spPr>
+      </p:pic>
+    </p:spTree>
+    <p:extLst>
+      <p:ext uri="{BB962C8B-B14F-4D97-AF65-F5344CB8AC3E}">
+        <p14:creationId xmlns:p14="http://schemas.microsoft.com/office/powerpoint/2010/main" val="3859839294"/>
+      </p:ext>
+    </p:extLst>
+  </p:cSld>
+  <p:clrMapOvr>
+    <a:masterClrMapping/>
+  </p:clrMapOvr>
+</p:sld>
+</file>
+
+<file path=ppt/slides/slide5.xml><?xml version="1.0" encoding="utf-8"?>
+<p:sld xmlns:a="http://schemas.openxmlformats.org/drawingml/2006/main" xmlns:r="http://schemas.openxmlformats.org/officeDocument/2006/relationships" xmlns:p="http://schemas.openxmlformats.org/presentationml/2006/main">
+  <p:cSld>
+    <p:bg>
+      <p:bgPr>
+        <a:solidFill>
+          <a:schemeClr val="bg1"/>
+        </a:solidFill>
+        <a:effectLst/>
+      </p:bgPr>
+    </p:bg>
+    <p:spTree>
+      <p:nvGrpSpPr>
+        <p:cNvPr id="1" name=""/>
+        <p:cNvGrpSpPr/>
+        <p:nvPr/>
+      </p:nvGrpSpPr>
+      <p:grpSpPr>
+        <a:xfrm>
+          <a:off x="0" y="0"/>
+          <a:ext cx="0" cy="0"/>
+          <a:chOff x="0" y="0"/>
+          <a:chExt cx="0" cy="0"/>
+        </a:xfrm>
+      </p:grpSpPr>
+      <p:sp>
+        <p:nvSpPr>
+          <p:cNvPr id="20" name="Rectangle 7">
+            <a:extLst>
+              <a:ext uri="{FF2B5EF4-FFF2-40B4-BE49-F238E27FC236}">
+                <a16:creationId xmlns:a16="http://schemas.microsoft.com/office/drawing/2014/main" id="{0B0BBD46-E160-4D02-9D82-3934E3970C6C}"/>
+              </a:ext>
+              <a:ext uri="{C183D7F6-B498-43B3-948B-1728B52AA6E4}">
+                <adec:decorative xmlns="" xmlns:adec="http://schemas.microsoft.com/office/drawing/2017/decorative" val="1"/>
+              </a:ext>
+            </a:extLst>
+          </p:cNvPr>
+          <p:cNvSpPr>
+            <a:spLocks noGrp="1" noRot="1" noChangeAspect="1" noMove="1" noResize="1" noEditPoints="1" noAdjustHandles="1" noChangeArrowheads="1" noChangeShapeType="1" noTextEdit="1"/>
+          </p:cNvSpPr>
+          <p:nvPr>
+            <p:extLst>
+              <p:ext uri="{386F3935-93C4-4BCD-93E2-E3B085C9AB24}">
+                <p16:designElem xmlns:p16="http://schemas.microsoft.com/office/powerpoint/2015/main" val="1"/>
+              </p:ext>
+            </p:extLst>
+          </p:nvPr>
+        </p:nvSpPr>
+        <p:spPr>
+          <a:xfrm>
+            <a:off x="0" y="0"/>
+            <a:ext cx="12188952" cy="6857999"/>
+          </a:xfrm>
+          <a:prstGeom prst="rect">
+            <a:avLst/>
+          </a:prstGeom>
+          <a:ln>
+            <a:noFill/>
+          </a:ln>
+        </p:spPr>
+        <p:style>
+          <a:lnRef idx="2">
+            <a:schemeClr val="accent1">
+              <a:shade val="50000"/>
+            </a:schemeClr>
+          </a:lnRef>
+          <a:fillRef idx="1">
+            <a:schemeClr val="accent1"/>
+          </a:fillRef>
+          <a:effectRef idx="0">
+            <a:schemeClr val="accent1"/>
+          </a:effectRef>
+          <a:fontRef idx="minor">
+            <a:schemeClr val="lt1"/>
+          </a:fontRef>
+        </p:style>
+        <p:txBody>
+          <a:bodyPr rtlCol="0" anchor="ctr"/>
+          <a:lstStyle/>
+          <a:p>
+            <a:pPr algn="ctr"/>
+            <a:endParaRPr lang="en-US"/>
+          </a:p>
+        </p:txBody>
+      </p:sp>
+      <p:pic>
+        <p:nvPicPr>
+          <p:cNvPr id="21" name="Picture 9">
+            <a:extLst>
+              <a:ext uri="{FF2B5EF4-FFF2-40B4-BE49-F238E27FC236}">
+                <a16:creationId xmlns:a16="http://schemas.microsoft.com/office/drawing/2014/main" id="{3114C8A4-DCE7-4155-98CA-D8826574B702}"/>
+              </a:ext>
+              <a:ext uri="{C183D7F6-B498-43B3-948B-1728B52AA6E4}">
+                <adec:decorative xmlns="" xmlns:adec="http://schemas.microsoft.com/office/drawing/2017/decorative" val="1"/>
+              </a:ext>
+            </a:extLst>
+          </p:cNvPr>
+          <p:cNvPicPr>
+            <a:picLocks noGrp="1" noRot="1" noChangeAspect="1" noMove="1" noResize="1" noEditPoints="1" noAdjustHandles="1" noChangeArrowheads="1" noChangeShapeType="1" noCrop="1"/>
+          </p:cNvPicPr>
+          <p:nvPr>
+            <p:extLst>
+              <p:ext uri="{386F3935-93C4-4BCD-93E2-E3B085C9AB24}">
+                <p16:designElem xmlns:p16="http://schemas.microsoft.com/office/powerpoint/2015/main" val="1"/>
+              </p:ext>
+            </p:extLst>
+          </p:nvPr>
+        </p:nvPicPr>
+        <p:blipFill>
+          <a:blip r:embed="rId2">
+            <a:alphaModFix amt="10000"/>
+            <a:extLst>
+              <a:ext uri="{28A0092B-C50C-407E-A947-70E740481C1C}">
+                <a14:useLocalDpi xmlns:a14="http://schemas.microsoft.com/office/drawing/2010/main" val="0"/>
+              </a:ext>
+            </a:extLst>
+          </a:blip>
+          <a:stretch>
+            <a:fillRect/>
+          </a:stretch>
+        </p:blipFill>
+        <p:spPr>
+          <a:xfrm>
+            <a:off x="0" y="0"/>
+            <a:ext cx="12192000" cy="6858000"/>
+          </a:xfrm>
+          <a:prstGeom prst="rect">
+            <a:avLst/>
+          </a:prstGeom>
+        </p:spPr>
+      </p:pic>
+      <p:sp>
+        <p:nvSpPr>
+          <p:cNvPr id="2" name="Title 1">
+            <a:extLst>
+              <a:ext uri="{FF2B5EF4-FFF2-40B4-BE49-F238E27FC236}">
+                <a16:creationId xmlns:a16="http://schemas.microsoft.com/office/drawing/2014/main" id="{604533E2-4A4D-4DAB-9F0E-EE21DE5E80CD}"/>
+              </a:ext>
+            </a:extLst>
+          </p:cNvPr>
+          <p:cNvSpPr>
+            <a:spLocks noGrp="1"/>
+          </p:cNvSpPr>
+          <p:nvPr>
+            <p:ph type="title"/>
+          </p:nvPr>
+        </p:nvSpPr>
+        <p:spPr>
+          <a:xfrm>
+            <a:off x="680321" y="321732"/>
+            <a:ext cx="9900593" cy="1080938"/>
+          </a:xfrm>
+        </p:spPr>
+        <p:txBody>
+          <a:bodyPr>
+            <a:normAutofit/>
+          </a:bodyPr>
+          <a:lstStyle/>
+          <a:p>
+            <a:r>
+              <a:rPr lang="en-GB" dirty="0">
+                <a:solidFill>
+                  <a:srgbClr val="FFFFFF"/>
+                </a:solidFill>
+              </a:rPr>
+              <a:t>Program </a:t>
+            </a:r>
+            <a:r>
+              <a:rPr lang="en-GB" dirty="0" smtClean="0">
+                <a:solidFill>
+                  <a:srgbClr val="FFFFFF"/>
+                </a:solidFill>
+              </a:rPr>
+              <a:t>progress</a:t>
+            </a:r>
+            <a:endParaRPr lang="en-GB" dirty="0">
+              <a:solidFill>
+                <a:srgbClr val="FFFFFF"/>
+              </a:solidFill>
+            </a:endParaRPr>
+          </a:p>
+        </p:txBody>
+      </p:sp>
+      <p:sp>
+        <p:nvSpPr>
+          <p:cNvPr id="22" name="Rectangle 11">
+            <a:extLst>
+              <a:ext uri="{FF2B5EF4-FFF2-40B4-BE49-F238E27FC236}">
+                <a16:creationId xmlns:a16="http://schemas.microsoft.com/office/drawing/2014/main" id="{77A64E61-6D37-4CB3-8F42-66B0DACBCB0F}"/>
+              </a:ext>
+              <a:ext uri="{C183D7F6-B498-43B3-948B-1728B52AA6E4}">
+                <adec:decorative xmlns="" xmlns:adec="http://schemas.microsoft.com/office/drawing/2017/decorative" val="1"/>
+              </a:ext>
+            </a:extLst>
+          </p:cNvPr>
+          <p:cNvSpPr>
+            <a:spLocks noGrp="1" noRot="1" noChangeAspect="1" noMove="1" noResize="1" noEditPoints="1" noAdjustHandles="1" noChangeArrowheads="1" noChangeShapeType="1" noTextEdit="1"/>
+          </p:cNvSpPr>
+          <p:nvPr>
+            <p:extLst>
+              <p:ext uri="{386F3935-93C4-4BCD-93E2-E3B085C9AB24}">
+                <p16:designElem xmlns:p16="http://schemas.microsoft.com/office/powerpoint/2015/main" val="1"/>
+              </p:ext>
+            </p:extLst>
+          </p:nvPr>
+        </p:nvSpPr>
+        <p:spPr>
+          <a:xfrm>
+            <a:off x="0" y="1724402"/>
+            <a:ext cx="12192000" cy="5133597"/>
+          </a:xfrm>
+          <a:prstGeom prst="rect">
+            <a:avLst/>
+          </a:prstGeom>
+          <a:solidFill>
+            <a:schemeClr val="bg1"/>
+          </a:solidFill>
+          <a:ln>
+            <a:noFill/>
+          </a:ln>
+          <a:effectLst>
+            <a:outerShdw blurRad="88900" dist="38100" dir="16200000" rotWithShape="0">
+              <a:prstClr val="black">
+                <a:alpha val="30000"/>
+              </a:prstClr>
+            </a:outerShdw>
+          </a:effectLst>
+        </p:spPr>
+        <p:style>
+          <a:lnRef idx="2">
+            <a:schemeClr val="accent1">
+              <a:shade val="50000"/>
+            </a:schemeClr>
+          </a:lnRef>
+          <a:fillRef idx="1">
+            <a:schemeClr val="accent1"/>
+          </a:fillRef>
+          <a:effectRef idx="0">
+            <a:schemeClr val="accent1"/>
+          </a:effectRef>
+          <a:fontRef idx="minor">
+            <a:schemeClr val="lt1"/>
+          </a:fontRef>
+        </p:style>
+        <p:txBody>
+          <a:bodyPr rtlCol="0" anchor="ctr"/>
+          <a:lstStyle/>
+          <a:p>
+            <a:pPr algn="ctr"/>
+            <a:endParaRPr lang="en-US"/>
+          </a:p>
+        </p:txBody>
+      </p:sp>
+      <p:sp>
+        <p:nvSpPr>
+          <p:cNvPr id="3" name="Content Placeholder 2">
+            <a:extLst>
+              <a:ext uri="{FF2B5EF4-FFF2-40B4-BE49-F238E27FC236}">
+                <a16:creationId xmlns:a16="http://schemas.microsoft.com/office/drawing/2014/main" id="{EC704661-2884-4E4D-AE8F-BEB655F5EEF2}"/>
+              </a:ext>
+            </a:extLst>
+          </p:cNvPr>
+          <p:cNvSpPr>
+            <a:spLocks noGrp="1"/>
+          </p:cNvSpPr>
+          <p:nvPr>
+            <p:ph idx="1"/>
+          </p:nvPr>
+        </p:nvSpPr>
+        <p:spPr>
+          <a:xfrm>
+            <a:off x="680322" y="2336873"/>
+            <a:ext cx="4044331" cy="3139799"/>
+          </a:xfrm>
+        </p:spPr>
+        <p:txBody>
+          <a:bodyPr anchor="t">
+            <a:normAutofit/>
+          </a:bodyPr>
+          <a:lstStyle/>
+          <a:p>
+            <a:r>
+              <a:rPr lang="en-GB" sz="1800" dirty="0" smtClean="0"/>
+              <a:t>Disciplinary </a:t>
+            </a:r>
+            <a:r>
+              <a:rPr lang="en-GB" sz="1800" dirty="0"/>
+              <a:t>action</a:t>
+            </a:r>
+          </a:p>
+          <a:p>
+            <a:endParaRPr lang="en-GB" sz="1800" dirty="0"/>
+          </a:p>
+          <a:p>
+            <a:endParaRPr lang="en-GB" sz="1800" dirty="0"/>
+          </a:p>
+        </p:txBody>
+      </p:sp>
+      <p:pic>
+        <p:nvPicPr>
+          <p:cNvPr id="4" name="Picture 3">
+            <a:extLst>
+              <a:ext uri="{FF2B5EF4-FFF2-40B4-BE49-F238E27FC236}">
+                <a16:creationId xmlns:a16="http://schemas.microsoft.com/office/drawing/2014/main" id="{352D080C-B426-4A78-8F3B-1FC23F443725}"/>
+              </a:ext>
+            </a:extLst>
+          </p:cNvPr>
+          <p:cNvPicPr>
+            <a:picLocks noChangeAspect="1"/>
+          </p:cNvPicPr>
+          <p:nvPr/>
+        </p:nvPicPr>
+        <p:blipFill>
+          <a:blip r:embed="rId3"/>
+          <a:stretch>
+            <a:fillRect/>
+          </a:stretch>
+        </p:blipFill>
+        <p:spPr>
+          <a:xfrm>
+            <a:off x="5009805" y="862201"/>
+            <a:ext cx="6893995" cy="5594683"/>
+          </a:xfrm>
+          <a:prstGeom prst="rect">
+            <a:avLst/>
+          </a:prstGeom>
+        </p:spPr>
+      </p:pic>
+    </p:spTree>
+    <p:extLst>
+      <p:ext uri="{BB962C8B-B14F-4D97-AF65-F5344CB8AC3E}">
+        <p14:creationId xmlns:p14="http://schemas.microsoft.com/office/powerpoint/2010/main" val="1808154281"/>
+      </p:ext>
+    </p:extLst>
+  </p:cSld>
+  <p:clrMapOvr>
+    <a:masterClrMapping/>
+  </p:clrMapOvr>
+</p:sld>
+</file>
+
+<file path=ppt/slides/slide6.xml><?xml version="1.0" encoding="utf-8"?>
+<p:sld xmlns:a="http://schemas.openxmlformats.org/drawingml/2006/main" xmlns:r="http://schemas.openxmlformats.org/officeDocument/2006/relationships" xmlns:p="http://schemas.openxmlformats.org/presentationml/2006/main">
+  <p:cSld>
+    <p:bg>
+      <p:bgPr>
+        <a:solidFill>
+          <a:schemeClr val="bg1"/>
+        </a:solidFill>
+        <a:effectLst/>
+      </p:bgPr>
+    </p:bg>
+    <p:spTree>
+      <p:nvGrpSpPr>
+        <p:cNvPr id="1" name=""/>
+        <p:cNvGrpSpPr/>
+        <p:nvPr/>
+      </p:nvGrpSpPr>
+      <p:grpSpPr>
+        <a:xfrm>
+          <a:off x="0" y="0"/>
+          <a:ext cx="0" cy="0"/>
+          <a:chOff x="0" y="0"/>
+          <a:chExt cx="0" cy="0"/>
+        </a:xfrm>
+      </p:grpSpPr>
+      <p:sp>
+        <p:nvSpPr>
+          <p:cNvPr id="20" name="Rectangle 7">
+            <a:extLst>
+              <a:ext uri="{FF2B5EF4-FFF2-40B4-BE49-F238E27FC236}">
+                <a16:creationId xmlns:a16="http://schemas.microsoft.com/office/drawing/2014/main" id="{0B0BBD46-E160-4D02-9D82-3934E3970C6C}"/>
+              </a:ext>
+              <a:ext uri="{C183D7F6-B498-43B3-948B-1728B52AA6E4}">
+                <adec:decorative xmlns="" xmlns:adec="http://schemas.microsoft.com/office/drawing/2017/decorative" val="1"/>
+              </a:ext>
+            </a:extLst>
+          </p:cNvPr>
+          <p:cNvSpPr>
+            <a:spLocks noGrp="1" noRot="1" noChangeAspect="1" noMove="1" noResize="1" noEditPoints="1" noAdjustHandles="1" noChangeArrowheads="1" noChangeShapeType="1" noTextEdit="1"/>
+          </p:cNvSpPr>
+          <p:nvPr>
+            <p:extLst>
+              <p:ext uri="{386F3935-93C4-4BCD-93E2-E3B085C9AB24}">
+                <p16:designElem xmlns:p16="http://schemas.microsoft.com/office/powerpoint/2015/main" val="1"/>
+              </p:ext>
+            </p:extLst>
+          </p:nvPr>
+        </p:nvSpPr>
+        <p:spPr>
+          <a:xfrm>
+            <a:off x="0" y="0"/>
+            <a:ext cx="12188952" cy="6857999"/>
+          </a:xfrm>
+          <a:prstGeom prst="rect">
+            <a:avLst/>
+          </a:prstGeom>
+          <a:ln>
+            <a:noFill/>
+          </a:ln>
+        </p:spPr>
+        <p:style>
+          <a:lnRef idx="2">
+            <a:schemeClr val="accent1">
+              <a:shade val="50000"/>
+            </a:schemeClr>
+          </a:lnRef>
+          <a:fillRef idx="1">
+            <a:schemeClr val="accent1"/>
+          </a:fillRef>
+          <a:effectRef idx="0">
+            <a:schemeClr val="accent1"/>
+          </a:effectRef>
+          <a:fontRef idx="minor">
+            <a:schemeClr val="lt1"/>
+          </a:fontRef>
+        </p:style>
+        <p:txBody>
+          <a:bodyPr rtlCol="0" anchor="ctr"/>
+          <a:lstStyle/>
+          <a:p>
+            <a:pPr algn="ctr"/>
+            <a:endParaRPr lang="en-US"/>
+          </a:p>
+        </p:txBody>
+      </p:sp>
+      <p:pic>
+        <p:nvPicPr>
+          <p:cNvPr id="21" name="Picture 9">
+            <a:extLst>
+              <a:ext uri="{FF2B5EF4-FFF2-40B4-BE49-F238E27FC236}">
+                <a16:creationId xmlns:a16="http://schemas.microsoft.com/office/drawing/2014/main" id="{3114C8A4-DCE7-4155-98CA-D8826574B702}"/>
+              </a:ext>
+              <a:ext uri="{C183D7F6-B498-43B3-948B-1728B52AA6E4}">
+                <adec:decorative xmlns="" xmlns:adec="http://schemas.microsoft.com/office/drawing/2017/decorative" val="1"/>
+              </a:ext>
+            </a:extLst>
+          </p:cNvPr>
+          <p:cNvPicPr>
+            <a:picLocks noGrp="1" noRot="1" noChangeAspect="1" noMove="1" noResize="1" noEditPoints="1" noAdjustHandles="1" noChangeArrowheads="1" noChangeShapeType="1" noCrop="1"/>
+          </p:cNvPicPr>
+          <p:nvPr>
+            <p:extLst>
+              <p:ext uri="{386F3935-93C4-4BCD-93E2-E3B085C9AB24}">
+                <p16:designElem xmlns:p16="http://schemas.microsoft.com/office/powerpoint/2015/main" val="1"/>
+              </p:ext>
+            </p:extLst>
+          </p:nvPr>
+        </p:nvPicPr>
+        <p:blipFill>
+          <a:blip r:embed="rId2">
+            <a:alphaModFix amt="10000"/>
+            <a:extLst>
+              <a:ext uri="{28A0092B-C50C-407E-A947-70E740481C1C}">
+                <a14:useLocalDpi xmlns:a14="http://schemas.microsoft.com/office/drawing/2010/main" val="0"/>
+              </a:ext>
+            </a:extLst>
+          </a:blip>
+          <a:stretch>
+            <a:fillRect/>
+          </a:stretch>
+        </p:blipFill>
+        <p:spPr>
+          <a:xfrm>
+            <a:off x="0" y="0"/>
+            <a:ext cx="12192000" cy="6858000"/>
+          </a:xfrm>
+          <a:prstGeom prst="rect">
+            <a:avLst/>
+          </a:prstGeom>
+        </p:spPr>
+      </p:pic>
+      <p:sp>
+        <p:nvSpPr>
+          <p:cNvPr id="2" name="Title 1">
+            <a:extLst>
+              <a:ext uri="{FF2B5EF4-FFF2-40B4-BE49-F238E27FC236}">
+                <a16:creationId xmlns:a16="http://schemas.microsoft.com/office/drawing/2014/main" id="{604533E2-4A4D-4DAB-9F0E-EE21DE5E80CD}"/>
+              </a:ext>
+            </a:extLst>
+          </p:cNvPr>
+          <p:cNvSpPr>
+            <a:spLocks noGrp="1"/>
+          </p:cNvSpPr>
+          <p:nvPr>
+            <p:ph type="title"/>
+          </p:nvPr>
+        </p:nvSpPr>
+        <p:spPr>
+          <a:xfrm>
+            <a:off x="680321" y="321732"/>
+            <a:ext cx="9900593" cy="1080938"/>
+          </a:xfrm>
+        </p:spPr>
+        <p:txBody>
+          <a:bodyPr>
+            <a:normAutofit/>
+          </a:bodyPr>
+          <a:lstStyle/>
+          <a:p>
+            <a:r>
+              <a:rPr lang="en-GB" dirty="0">
+                <a:solidFill>
+                  <a:srgbClr val="FFFFFF"/>
+                </a:solidFill>
+              </a:rPr>
+              <a:t>Testing</a:t>
+            </a:r>
+          </a:p>
+        </p:txBody>
+      </p:sp>
+      <p:sp>
+        <p:nvSpPr>
+          <p:cNvPr id="22" name="Rectangle 11">
+            <a:extLst>
+              <a:ext uri="{FF2B5EF4-FFF2-40B4-BE49-F238E27FC236}">
+                <a16:creationId xmlns:a16="http://schemas.microsoft.com/office/drawing/2014/main" id="{77A64E61-6D37-4CB3-8F42-66B0DACBCB0F}"/>
+              </a:ext>
+              <a:ext uri="{C183D7F6-B498-43B3-948B-1728B52AA6E4}">
+                <adec:decorative xmlns="" xmlns:adec="http://schemas.microsoft.com/office/drawing/2017/decorative" val="1"/>
+              </a:ext>
+            </a:extLst>
+          </p:cNvPr>
+          <p:cNvSpPr>
+            <a:spLocks noGrp="1" noRot="1" noChangeAspect="1" noMove="1" noResize="1" noEditPoints="1" noAdjustHandles="1" noChangeArrowheads="1" noChangeShapeType="1" noTextEdit="1"/>
+          </p:cNvSpPr>
+          <p:nvPr>
+            <p:extLst>
+              <p:ext uri="{386F3935-93C4-4BCD-93E2-E3B085C9AB24}">
+                <p16:designElem xmlns:p16="http://schemas.microsoft.com/office/powerpoint/2015/main" val="1"/>
+              </p:ext>
+            </p:extLst>
+          </p:nvPr>
+        </p:nvSpPr>
+        <p:spPr>
+          <a:xfrm>
+            <a:off x="0" y="1724402"/>
+            <a:ext cx="12192000" cy="5133597"/>
+          </a:xfrm>
+          <a:prstGeom prst="rect">
+            <a:avLst/>
+          </a:prstGeom>
+          <a:solidFill>
+            <a:schemeClr val="bg1"/>
+          </a:solidFill>
+          <a:ln>
+            <a:noFill/>
+          </a:ln>
+          <a:effectLst>
+            <a:outerShdw blurRad="88900" dist="38100" dir="16200000" rotWithShape="0">
+              <a:prstClr val="black">
+                <a:alpha val="30000"/>
+              </a:prstClr>
+            </a:outerShdw>
+          </a:effectLst>
+        </p:spPr>
+        <p:style>
+          <a:lnRef idx="2">
+            <a:schemeClr val="accent1">
+              <a:shade val="50000"/>
+            </a:schemeClr>
+          </a:lnRef>
+          <a:fillRef idx="1">
+            <a:schemeClr val="accent1"/>
+          </a:fillRef>
+          <a:effectRef idx="0">
+            <a:schemeClr val="accent1"/>
+          </a:effectRef>
+          <a:fontRef idx="minor">
+            <a:schemeClr val="lt1"/>
+          </a:fontRef>
+        </p:style>
+        <p:txBody>
+          <a:bodyPr rtlCol="0" anchor="ctr"/>
+          <a:lstStyle/>
+          <a:p>
+            <a:pPr algn="ctr"/>
+            <a:endParaRPr lang="en-US"/>
+          </a:p>
+        </p:txBody>
+      </p:sp>
+      <p:sp>
+        <p:nvSpPr>
           <p:cNvPr id="9" name="Content Placeholder 2">
             <a:extLst>
               <a:ext uri="{FF2B5EF4-FFF2-40B4-BE49-F238E27FC236}">
@@ -10050,8 +10073,8 @@
         </p:nvSpPr>
         <p:spPr>
           <a:xfrm>
-            <a:off x="680322" y="2336873"/>
-            <a:ext cx="2695924" cy="790199"/>
+            <a:off x="680321" y="2336873"/>
+            <a:ext cx="10072671" cy="3844119"/>
           </a:xfrm>
           <a:prstGeom prst="rect">
             <a:avLst/>
@@ -10228,13 +10251,72 @@
           <a:p>
             <a:r>
               <a:rPr lang="en-GB" sz="1800" dirty="0" smtClean="0"/>
-              <a:t>Example test cases</a:t>
-            </a:r>
+              <a:t>Some test cases have been created</a:t>
+            </a:r>
+          </a:p>
+          <a:p>
+            <a:r>
+              <a:rPr lang="en-GB" sz="1800" dirty="0" smtClean="0"/>
+              <a:t>Some tests have been completed</a:t>
+            </a:r>
+          </a:p>
+          <a:p>
+            <a:r>
+              <a:rPr lang="en-GB" sz="1800" dirty="0" smtClean="0"/>
+              <a:t>There is still much testing left to do</a:t>
+            </a:r>
+          </a:p>
+          <a:p>
+            <a:endParaRPr lang="en-GB" sz="1800" dirty="0"/>
           </a:p>
           <a:p>
             <a:pPr marL="0" indent="0">
               <a:buNone/>
             </a:pPr>
+            <a:r>
+              <a:rPr lang="en-GB" sz="1800" b="1" dirty="0" smtClean="0"/>
+              <a:t>Side note</a:t>
+            </a:r>
+            <a:r>
+              <a:rPr lang="en-GB" sz="1800" dirty="0" smtClean="0"/>
+              <a:t>: </a:t>
+            </a:r>
+          </a:p>
+          <a:p>
+            <a:pPr marL="0" indent="0">
+              <a:buNone/>
+            </a:pPr>
+            <a:r>
+              <a:rPr lang="en-GB" sz="1800" dirty="0" smtClean="0"/>
+              <a:t>The </a:t>
+            </a:r>
+            <a:r>
+              <a:rPr lang="en-GB" sz="1800" dirty="0" err="1" smtClean="0"/>
+              <a:t>unittest</a:t>
+            </a:r>
+            <a:r>
+              <a:rPr lang="en-GB" sz="1800" dirty="0" smtClean="0"/>
+              <a:t> module has not been used much, due to the way the code was written. Looking back, it would have been better to use an object oriented design to make better use of unit testing</a:t>
+            </a:r>
+            <a:r>
+              <a:rPr lang="en-GB" sz="1800" dirty="0" smtClean="0"/>
+              <a:t>.</a:t>
+            </a:r>
+          </a:p>
+          <a:p>
+            <a:pPr marL="0" indent="0">
+              <a:buNone/>
+            </a:pPr>
+            <a:r>
+              <a:rPr lang="en-GB" sz="1800" dirty="0" smtClean="0"/>
+              <a:t>We are considering converting to an object oriented solution (if we have time)</a:t>
+            </a:r>
+            <a:endParaRPr lang="en-GB" sz="1800" dirty="0" smtClean="0"/>
+          </a:p>
+          <a:p>
+            <a:endParaRPr lang="en-GB" sz="1800" dirty="0" smtClean="0"/>
+          </a:p>
+          <a:p>
             <a:endParaRPr lang="en-GB" sz="1800" dirty="0"/>
           </a:p>
         </p:txBody>
@@ -10242,7 +10324,7 @@
     </p:spTree>
     <p:extLst>
       <p:ext uri="{BB962C8B-B14F-4D97-AF65-F5344CB8AC3E}">
-        <p14:creationId xmlns:p14="http://schemas.microsoft.com/office/powerpoint/2010/main" val="1570243911"/>
+        <p14:creationId xmlns:p14="http://schemas.microsoft.com/office/powerpoint/2010/main" val="2286555159"/>
       </p:ext>
     </p:extLst>
   </p:cSld>
@@ -10252,7 +10334,7 @@
 </p:sld>
 </file>
 
-<file path=ppt/slides/slide8.xml><?xml version="1.0" encoding="utf-8"?>
+<file path=ppt/slides/slide7.xml><?xml version="1.0" encoding="utf-8"?>
 <p:sld xmlns:a="http://schemas.openxmlformats.org/drawingml/2006/main" xmlns:r="http://schemas.openxmlformats.org/officeDocument/2006/relationships" xmlns:p="http://schemas.openxmlformats.org/presentationml/2006/main">
   <p:cSld>
     <p:bg>
@@ -10285,7 +10367,7 @@
                 <a16:creationId xmlns:a16="http://schemas.microsoft.com/office/drawing/2014/main" id="{0B0BBD46-E160-4D02-9D82-3934E3970C6C}"/>
               </a:ext>
               <a:ext uri="{C183D7F6-B498-43B3-948B-1728B52AA6E4}">
-                <adec:decorative xmlns:adec="http://schemas.microsoft.com/office/drawing/2017/decorative" xmlns="" val="1"/>
+                <adec:decorative xmlns="" xmlns:adec="http://schemas.microsoft.com/office/drawing/2017/decorative" val="1"/>
               </a:ext>
             </a:extLst>
           </p:cNvPr>
@@ -10345,7 +10427,7 @@
                 <a16:creationId xmlns:a16="http://schemas.microsoft.com/office/drawing/2014/main" id="{3114C8A4-DCE7-4155-98CA-D8826574B702}"/>
               </a:ext>
               <a:ext uri="{C183D7F6-B498-43B3-948B-1728B52AA6E4}">
-                <adec:decorative xmlns:adec="http://schemas.microsoft.com/office/drawing/2017/decorative" xmlns="" val="1"/>
+                <adec:decorative xmlns="" xmlns:adec="http://schemas.microsoft.com/office/drawing/2017/decorative" val="1"/>
               </a:ext>
             </a:extLst>
           </p:cNvPr>
@@ -10412,18 +10494,13 @@
           <a:lstStyle/>
           <a:p>
             <a:r>
-              <a:rPr lang="en-GB" dirty="0" smtClean="0">
+              <a:rPr lang="en-GB" dirty="0">
                 <a:solidFill>
                   <a:srgbClr val="FFFFFF"/>
                 </a:solidFill>
               </a:rPr>
-              <a:t>Vulnerabilities Research</a:t>
-            </a:r>
-            <a:endParaRPr lang="en-GB" dirty="0">
-              <a:solidFill>
-                <a:srgbClr val="FFFFFF"/>
-              </a:solidFill>
-            </a:endParaRPr>
+              <a:t>Testing</a:t>
+            </a:r>
           </a:p>
         </p:txBody>
       </p:sp>
@@ -10435,7 +10512,7 @@
                 <a16:creationId xmlns:a16="http://schemas.microsoft.com/office/drawing/2014/main" id="{77A64E61-6D37-4CB3-8F42-66B0DACBCB0F}"/>
               </a:ext>
               <a:ext uri="{C183D7F6-B498-43B3-948B-1728B52AA6E4}">
-                <adec:decorative xmlns:adec="http://schemas.microsoft.com/office/drawing/2017/decorative" xmlns="" val="1"/>
+                <adec:decorative xmlns="" xmlns:adec="http://schemas.microsoft.com/office/drawing/2017/decorative" val="1"/>
               </a:ext>
             </a:extLst>
           </p:cNvPr>
@@ -10689,6 +10766,12 @@
             </a:lvl9pPr>
           </a:lstStyle>
           <a:p>
+            <a:r>
+              <a:rPr lang="en-GB" sz="1800" dirty="0" smtClean="0"/>
+              <a:t>Example test cases</a:t>
+            </a:r>
+          </a:p>
+          <a:p>
             <a:pPr marL="0" indent="0">
               <a:buNone/>
             </a:pPr>
@@ -10696,10 +10779,1234 @@
           </a:p>
         </p:txBody>
       </p:sp>
+    </p:spTree>
+    <p:extLst>
+      <p:ext uri="{BB962C8B-B14F-4D97-AF65-F5344CB8AC3E}">
+        <p14:creationId xmlns:p14="http://schemas.microsoft.com/office/powerpoint/2010/main" val="1570243911"/>
+      </p:ext>
+    </p:extLst>
+  </p:cSld>
+  <p:clrMapOvr>
+    <a:masterClrMapping/>
+  </p:clrMapOvr>
+</p:sld>
+</file>
+
+<file path=ppt/slides/slide8.xml><?xml version="1.0" encoding="utf-8"?>
+<p:sld xmlns:a="http://schemas.openxmlformats.org/drawingml/2006/main" xmlns:r="http://schemas.openxmlformats.org/officeDocument/2006/relationships" xmlns:p="http://schemas.openxmlformats.org/presentationml/2006/main">
+  <p:cSld>
+    <p:bg>
+      <p:bgPr>
+        <a:solidFill>
+          <a:schemeClr val="bg1"/>
+        </a:solidFill>
+        <a:effectLst/>
+      </p:bgPr>
+    </p:bg>
+    <p:spTree>
+      <p:nvGrpSpPr>
+        <p:cNvPr id="1" name=""/>
+        <p:cNvGrpSpPr/>
+        <p:nvPr/>
+      </p:nvGrpSpPr>
+      <p:grpSpPr>
+        <a:xfrm>
+          <a:off x="0" y="0"/>
+          <a:ext cx="0" cy="0"/>
+          <a:chOff x="0" y="0"/>
+          <a:chExt cx="0" cy="0"/>
+        </a:xfrm>
+      </p:grpSpPr>
+      <p:sp>
+        <p:nvSpPr>
+          <p:cNvPr id="20" name="Rectangle 7">
+            <a:extLst>
+              <a:ext uri="{FF2B5EF4-FFF2-40B4-BE49-F238E27FC236}">
+                <a16:creationId xmlns:a16="http://schemas.microsoft.com/office/drawing/2014/main" id="{0B0BBD46-E160-4D02-9D82-3934E3970C6C}"/>
+              </a:ext>
+              <a:ext uri="{C183D7F6-B498-43B3-948B-1728B52AA6E4}">
+                <adec:decorative xmlns="" xmlns:adec="http://schemas.microsoft.com/office/drawing/2017/decorative" val="1"/>
+              </a:ext>
+            </a:extLst>
+          </p:cNvPr>
+          <p:cNvSpPr>
+            <a:spLocks noGrp="1" noRot="1" noChangeAspect="1" noMove="1" noResize="1" noEditPoints="1" noAdjustHandles="1" noChangeArrowheads="1" noChangeShapeType="1" noTextEdit="1"/>
+          </p:cNvSpPr>
+          <p:nvPr>
+            <p:extLst>
+              <p:ext uri="{386F3935-93C4-4BCD-93E2-E3B085C9AB24}">
+                <p16:designElem xmlns:p16="http://schemas.microsoft.com/office/powerpoint/2015/main" val="1"/>
+              </p:ext>
+            </p:extLst>
+          </p:nvPr>
+        </p:nvSpPr>
+        <p:spPr>
+          <a:xfrm>
+            <a:off x="0" y="0"/>
+            <a:ext cx="12188952" cy="6857999"/>
+          </a:xfrm>
+          <a:prstGeom prst="rect">
+            <a:avLst/>
+          </a:prstGeom>
+          <a:ln>
+            <a:noFill/>
+          </a:ln>
+        </p:spPr>
+        <p:style>
+          <a:lnRef idx="2">
+            <a:schemeClr val="accent1">
+              <a:shade val="50000"/>
+            </a:schemeClr>
+          </a:lnRef>
+          <a:fillRef idx="1">
+            <a:schemeClr val="accent1"/>
+          </a:fillRef>
+          <a:effectRef idx="0">
+            <a:schemeClr val="accent1"/>
+          </a:effectRef>
+          <a:fontRef idx="minor">
+            <a:schemeClr val="lt1"/>
+          </a:fontRef>
+        </p:style>
+        <p:txBody>
+          <a:bodyPr rtlCol="0" anchor="ctr"/>
+          <a:lstStyle/>
+          <a:p>
+            <a:pPr algn="ctr"/>
+            <a:endParaRPr lang="en-US"/>
+          </a:p>
+        </p:txBody>
+      </p:sp>
+      <p:pic>
+        <p:nvPicPr>
+          <p:cNvPr id="21" name="Picture 9">
+            <a:extLst>
+              <a:ext uri="{FF2B5EF4-FFF2-40B4-BE49-F238E27FC236}">
+                <a16:creationId xmlns:a16="http://schemas.microsoft.com/office/drawing/2014/main" id="{3114C8A4-DCE7-4155-98CA-D8826574B702}"/>
+              </a:ext>
+              <a:ext uri="{C183D7F6-B498-43B3-948B-1728B52AA6E4}">
+                <adec:decorative xmlns="" xmlns:adec="http://schemas.microsoft.com/office/drawing/2017/decorative" val="1"/>
+              </a:ext>
+            </a:extLst>
+          </p:cNvPr>
+          <p:cNvPicPr>
+            <a:picLocks noGrp="1" noRot="1" noChangeAspect="1" noMove="1" noResize="1" noEditPoints="1" noAdjustHandles="1" noChangeArrowheads="1" noChangeShapeType="1" noCrop="1"/>
+          </p:cNvPicPr>
+          <p:nvPr>
+            <p:extLst>
+              <p:ext uri="{386F3935-93C4-4BCD-93E2-E3B085C9AB24}">
+                <p16:designElem xmlns:p16="http://schemas.microsoft.com/office/powerpoint/2015/main" val="1"/>
+              </p:ext>
+            </p:extLst>
+          </p:nvPr>
+        </p:nvPicPr>
+        <p:blipFill>
+          <a:blip r:embed="rId2">
+            <a:alphaModFix amt="10000"/>
+            <a:extLst>
+              <a:ext uri="{28A0092B-C50C-407E-A947-70E740481C1C}">
+                <a14:useLocalDpi xmlns:a14="http://schemas.microsoft.com/office/drawing/2010/main" val="0"/>
+              </a:ext>
+            </a:extLst>
+          </a:blip>
+          <a:stretch>
+            <a:fillRect/>
+          </a:stretch>
+        </p:blipFill>
+        <p:spPr>
+          <a:xfrm>
+            <a:off x="0" y="0"/>
+            <a:ext cx="12192000" cy="6858000"/>
+          </a:xfrm>
+          <a:prstGeom prst="rect">
+            <a:avLst/>
+          </a:prstGeom>
+        </p:spPr>
+      </p:pic>
+      <p:sp>
+        <p:nvSpPr>
+          <p:cNvPr id="2" name="Title 1">
+            <a:extLst>
+              <a:ext uri="{FF2B5EF4-FFF2-40B4-BE49-F238E27FC236}">
+                <a16:creationId xmlns:a16="http://schemas.microsoft.com/office/drawing/2014/main" id="{604533E2-4A4D-4DAB-9F0E-EE21DE5E80CD}"/>
+              </a:ext>
+            </a:extLst>
+          </p:cNvPr>
+          <p:cNvSpPr>
+            <a:spLocks noGrp="1"/>
+          </p:cNvSpPr>
+          <p:nvPr>
+            <p:ph type="title"/>
+          </p:nvPr>
+        </p:nvSpPr>
+        <p:spPr>
+          <a:xfrm>
+            <a:off x="680321" y="321732"/>
+            <a:ext cx="9900593" cy="1080938"/>
+          </a:xfrm>
+        </p:spPr>
+        <p:txBody>
+          <a:bodyPr>
+            <a:normAutofit/>
+          </a:bodyPr>
+          <a:lstStyle/>
+          <a:p>
+            <a:r>
+              <a:rPr lang="en-GB" dirty="0" smtClean="0">
+                <a:solidFill>
+                  <a:srgbClr val="FFFFFF"/>
+                </a:solidFill>
+              </a:rPr>
+              <a:t>Vulnerabilities Research</a:t>
+            </a:r>
+            <a:endParaRPr lang="en-GB" dirty="0">
+              <a:solidFill>
+                <a:srgbClr val="FFFFFF"/>
+              </a:solidFill>
+            </a:endParaRPr>
+          </a:p>
+        </p:txBody>
+      </p:sp>
+      <p:sp>
+        <p:nvSpPr>
+          <p:cNvPr id="22" name="Rectangle 11">
+            <a:extLst>
+              <a:ext uri="{FF2B5EF4-FFF2-40B4-BE49-F238E27FC236}">
+                <a16:creationId xmlns:a16="http://schemas.microsoft.com/office/drawing/2014/main" id="{77A64E61-6D37-4CB3-8F42-66B0DACBCB0F}"/>
+              </a:ext>
+              <a:ext uri="{C183D7F6-B498-43B3-948B-1728B52AA6E4}">
+                <adec:decorative xmlns="" xmlns:adec="http://schemas.microsoft.com/office/drawing/2017/decorative" val="1"/>
+              </a:ext>
+            </a:extLst>
+          </p:cNvPr>
+          <p:cNvSpPr>
+            <a:spLocks noGrp="1" noRot="1" noChangeAspect="1" noMove="1" noResize="1" noEditPoints="1" noAdjustHandles="1" noChangeArrowheads="1" noChangeShapeType="1" noTextEdit="1"/>
+          </p:cNvSpPr>
+          <p:nvPr>
+            <p:extLst>
+              <p:ext uri="{386F3935-93C4-4BCD-93E2-E3B085C9AB24}">
+                <p16:designElem xmlns:p16="http://schemas.microsoft.com/office/powerpoint/2015/main" val="1"/>
+              </p:ext>
+            </p:extLst>
+          </p:nvPr>
+        </p:nvSpPr>
+        <p:spPr>
+          <a:xfrm>
+            <a:off x="0" y="1724402"/>
+            <a:ext cx="12192000" cy="5133597"/>
+          </a:xfrm>
+          <a:prstGeom prst="rect">
+            <a:avLst/>
+          </a:prstGeom>
+          <a:solidFill>
+            <a:schemeClr val="bg1"/>
+          </a:solidFill>
+          <a:ln>
+            <a:noFill/>
+          </a:ln>
+          <a:effectLst>
+            <a:outerShdw blurRad="88900" dist="38100" dir="16200000" rotWithShape="0">
+              <a:prstClr val="black">
+                <a:alpha val="30000"/>
+              </a:prstClr>
+            </a:outerShdw>
+          </a:effectLst>
+        </p:spPr>
+        <p:style>
+          <a:lnRef idx="2">
+            <a:schemeClr val="accent1">
+              <a:shade val="50000"/>
+            </a:schemeClr>
+          </a:lnRef>
+          <a:fillRef idx="1">
+            <a:schemeClr val="accent1"/>
+          </a:fillRef>
+          <a:effectRef idx="0">
+            <a:schemeClr val="accent1"/>
+          </a:effectRef>
+          <a:fontRef idx="minor">
+            <a:schemeClr val="lt1"/>
+          </a:fontRef>
+        </p:style>
+        <p:txBody>
+          <a:bodyPr rtlCol="0" anchor="ctr"/>
+          <a:lstStyle/>
+          <a:p>
+            <a:pPr algn="ctr"/>
+            <a:endParaRPr lang="en-US"/>
+          </a:p>
+        </p:txBody>
+      </p:sp>
+      <p:sp>
+        <p:nvSpPr>
+          <p:cNvPr id="9" name="Content Placeholder 2">
+            <a:extLst>
+              <a:ext uri="{FF2B5EF4-FFF2-40B4-BE49-F238E27FC236}">
+                <a16:creationId xmlns:a16="http://schemas.microsoft.com/office/drawing/2014/main" id="{EC704661-2884-4E4D-AE8F-BEB655F5EEF2}"/>
+              </a:ext>
+            </a:extLst>
+          </p:cNvPr>
+          <p:cNvSpPr txBox="1">
+            <a:spLocks/>
+          </p:cNvSpPr>
+          <p:nvPr/>
+        </p:nvSpPr>
+        <p:spPr>
+          <a:xfrm>
+            <a:off x="680322" y="2336873"/>
+            <a:ext cx="5774946" cy="3316581"/>
+          </a:xfrm>
+          <a:prstGeom prst="rect">
+            <a:avLst/>
+          </a:prstGeom>
+        </p:spPr>
+        <p:txBody>
+          <a:bodyPr vert="horz" lIns="91440" tIns="45720" rIns="91440" bIns="45720" rtlCol="0" anchor="t">
+            <a:normAutofit/>
+          </a:bodyPr>
+          <a:lstStyle>
+            <a:lvl1pPr marL="228600" indent="-228600" algn="l" defTabSz="914400" rtl="0" eaLnBrk="1" latinLnBrk="0" hangingPunct="1">
+              <a:lnSpc>
+                <a:spcPct val="90000"/>
+              </a:lnSpc>
+              <a:spcBef>
+                <a:spcPts val="1000"/>
+              </a:spcBef>
+              <a:buFont typeface="Arial" panose="020B0604020202020204" pitchFamily="34" charset="0"/>
+              <a:buChar char="•"/>
+              <a:defRPr sz="2400" kern="1200">
+                <a:solidFill>
+                  <a:schemeClr val="tx1"/>
+                </a:solidFill>
+                <a:latin typeface="+mn-lt"/>
+                <a:ea typeface="+mn-ea"/>
+                <a:cs typeface="+mn-cs"/>
+              </a:defRPr>
+            </a:lvl1pPr>
+            <a:lvl2pPr marL="685800" indent="-228600" algn="l" defTabSz="914400" rtl="0" eaLnBrk="1" latinLnBrk="0" hangingPunct="1">
+              <a:lnSpc>
+                <a:spcPct val="90000"/>
+              </a:lnSpc>
+              <a:spcBef>
+                <a:spcPts val="500"/>
+              </a:spcBef>
+              <a:buFont typeface="Arial" panose="020B0604020202020204" pitchFamily="34" charset="0"/>
+              <a:buChar char="•"/>
+              <a:defRPr sz="2000" kern="1200">
+                <a:solidFill>
+                  <a:schemeClr val="tx1"/>
+                </a:solidFill>
+                <a:latin typeface="+mn-lt"/>
+                <a:ea typeface="+mn-ea"/>
+                <a:cs typeface="+mn-cs"/>
+              </a:defRPr>
+            </a:lvl2pPr>
+            <a:lvl3pPr marL="1143000" indent="-228600" algn="l" defTabSz="914400" rtl="0" eaLnBrk="1" latinLnBrk="0" hangingPunct="1">
+              <a:lnSpc>
+                <a:spcPct val="90000"/>
+              </a:lnSpc>
+              <a:spcBef>
+                <a:spcPts val="500"/>
+              </a:spcBef>
+              <a:buFont typeface="Arial" panose="020B0604020202020204" pitchFamily="34" charset="0"/>
+              <a:buChar char="•"/>
+              <a:defRPr sz="1800" kern="1200">
+                <a:solidFill>
+                  <a:schemeClr val="tx1"/>
+                </a:solidFill>
+                <a:latin typeface="+mn-lt"/>
+                <a:ea typeface="+mn-ea"/>
+                <a:cs typeface="+mn-cs"/>
+              </a:defRPr>
+            </a:lvl3pPr>
+            <a:lvl4pPr marL="1600200" indent="-228600" algn="l" defTabSz="914400" rtl="0" eaLnBrk="1" latinLnBrk="0" hangingPunct="1">
+              <a:lnSpc>
+                <a:spcPct val="90000"/>
+              </a:lnSpc>
+              <a:spcBef>
+                <a:spcPts val="500"/>
+              </a:spcBef>
+              <a:buFont typeface="Arial" panose="020B0604020202020204" pitchFamily="34" charset="0"/>
+              <a:buChar char="•"/>
+              <a:defRPr sz="1600" kern="1200">
+                <a:solidFill>
+                  <a:schemeClr val="tx1"/>
+                </a:solidFill>
+                <a:latin typeface="+mn-lt"/>
+                <a:ea typeface="+mn-ea"/>
+                <a:cs typeface="+mn-cs"/>
+              </a:defRPr>
+            </a:lvl4pPr>
+            <a:lvl5pPr marL="2057400" indent="-228600" algn="l" defTabSz="914400" rtl="0" eaLnBrk="1" latinLnBrk="0" hangingPunct="1">
+              <a:lnSpc>
+                <a:spcPct val="90000"/>
+              </a:lnSpc>
+              <a:spcBef>
+                <a:spcPts val="500"/>
+              </a:spcBef>
+              <a:buFont typeface="Arial" panose="020B0604020202020204" pitchFamily="34" charset="0"/>
+              <a:buChar char="•"/>
+              <a:defRPr sz="1600" kern="1200">
+                <a:solidFill>
+                  <a:schemeClr val="tx1"/>
+                </a:solidFill>
+                <a:latin typeface="+mn-lt"/>
+                <a:ea typeface="+mn-ea"/>
+                <a:cs typeface="+mn-cs"/>
+              </a:defRPr>
+            </a:lvl5pPr>
+            <a:lvl6pPr marL="2514600" indent="-228600" algn="l" defTabSz="914400" rtl="0" eaLnBrk="1" latinLnBrk="0" hangingPunct="1">
+              <a:lnSpc>
+                <a:spcPct val="90000"/>
+              </a:lnSpc>
+              <a:spcBef>
+                <a:spcPts val="500"/>
+              </a:spcBef>
+              <a:buFont typeface="Arial" panose="020B0604020202020204" pitchFamily="34" charset="0"/>
+              <a:buChar char="•"/>
+              <a:defRPr sz="1400" kern="1200">
+                <a:solidFill>
+                  <a:schemeClr val="tx1"/>
+                </a:solidFill>
+                <a:latin typeface="+mn-lt"/>
+                <a:ea typeface="+mn-ea"/>
+                <a:cs typeface="+mn-cs"/>
+              </a:defRPr>
+            </a:lvl6pPr>
+            <a:lvl7pPr marL="2971800" indent="-228600" algn="l" defTabSz="914400" rtl="0" eaLnBrk="1" latinLnBrk="0" hangingPunct="1">
+              <a:lnSpc>
+                <a:spcPct val="90000"/>
+              </a:lnSpc>
+              <a:spcBef>
+                <a:spcPts val="500"/>
+              </a:spcBef>
+              <a:buFont typeface="Arial" panose="020B0604020202020204" pitchFamily="34" charset="0"/>
+              <a:buChar char="•"/>
+              <a:defRPr sz="1400" kern="1200">
+                <a:solidFill>
+                  <a:schemeClr val="tx1"/>
+                </a:solidFill>
+                <a:latin typeface="+mn-lt"/>
+                <a:ea typeface="+mn-ea"/>
+                <a:cs typeface="+mn-cs"/>
+              </a:defRPr>
+            </a:lvl7pPr>
+            <a:lvl8pPr marL="3429000" indent="-228600" algn="l" defTabSz="914400" rtl="0" eaLnBrk="1" latinLnBrk="0" hangingPunct="1">
+              <a:lnSpc>
+                <a:spcPct val="90000"/>
+              </a:lnSpc>
+              <a:spcBef>
+                <a:spcPts val="500"/>
+              </a:spcBef>
+              <a:buFont typeface="Arial" panose="020B0604020202020204" pitchFamily="34" charset="0"/>
+              <a:buChar char="•"/>
+              <a:defRPr sz="1400" kern="1200">
+                <a:solidFill>
+                  <a:schemeClr val="tx1"/>
+                </a:solidFill>
+                <a:latin typeface="+mn-lt"/>
+                <a:ea typeface="+mn-ea"/>
+                <a:cs typeface="+mn-cs"/>
+              </a:defRPr>
+            </a:lvl8pPr>
+            <a:lvl9pPr marL="3886200" indent="-228600" algn="l" defTabSz="914400" rtl="0" eaLnBrk="1" latinLnBrk="0" hangingPunct="1">
+              <a:lnSpc>
+                <a:spcPct val="90000"/>
+              </a:lnSpc>
+              <a:spcBef>
+                <a:spcPts val="500"/>
+              </a:spcBef>
+              <a:buFont typeface="Arial" panose="020B0604020202020204" pitchFamily="34" charset="0"/>
+              <a:buChar char="•"/>
+              <a:defRPr sz="1400" kern="1200">
+                <a:solidFill>
+                  <a:schemeClr val="tx1"/>
+                </a:solidFill>
+                <a:latin typeface="+mn-lt"/>
+                <a:ea typeface="+mn-ea"/>
+                <a:cs typeface="+mn-cs"/>
+              </a:defRPr>
+            </a:lvl9pPr>
+          </a:lstStyle>
+          <a:p>
+            <a:r>
+              <a:rPr lang="en-GB" sz="1800" dirty="0" smtClean="0"/>
+              <a:t>We have begun our research on vulnerabilities</a:t>
+            </a:r>
+          </a:p>
+          <a:p>
+            <a:pPr marL="0" indent="0">
+              <a:buNone/>
+            </a:pPr>
+            <a:endParaRPr lang="en-GB" sz="1800" dirty="0" smtClean="0"/>
+          </a:p>
+          <a:p>
+            <a:r>
+              <a:rPr lang="en-GB" sz="1800" dirty="0" smtClean="0"/>
+              <a:t>For example: SQL Injections</a:t>
+            </a:r>
+          </a:p>
+          <a:p>
+            <a:pPr lvl="1"/>
+            <a:r>
+              <a:rPr lang="en-GB" sz="1400" dirty="0" smtClean="0"/>
+              <a:t>Using regular string formatting is vulnerable to SQL injection</a:t>
+            </a:r>
+          </a:p>
+          <a:p>
+            <a:pPr lvl="1"/>
+            <a:r>
+              <a:rPr lang="en-GB" sz="1400" dirty="0" smtClean="0"/>
+              <a:t>Users can exploit the strings to insert their own instructions</a:t>
+            </a:r>
+          </a:p>
+          <a:p>
+            <a:pPr lvl="1"/>
+            <a:r>
+              <a:rPr lang="en-GB" sz="1400" dirty="0" smtClean="0"/>
+              <a:t>To avoid this, can use parameters:</a:t>
+            </a:r>
+            <a:endParaRPr lang="en-GB" sz="1400" dirty="0"/>
+          </a:p>
+        </p:txBody>
+      </p:sp>
+      <p:pic>
+        <p:nvPicPr>
+          <p:cNvPr id="4" name="Picture 3"/>
+          <p:cNvPicPr>
+            <a:picLocks noChangeAspect="1"/>
+          </p:cNvPicPr>
+          <p:nvPr/>
+        </p:nvPicPr>
+        <p:blipFill>
+          <a:blip r:embed="rId3"/>
+          <a:stretch>
+            <a:fillRect/>
+          </a:stretch>
+        </p:blipFill>
+        <p:spPr>
+          <a:xfrm>
+            <a:off x="6455268" y="2497749"/>
+            <a:ext cx="5553075" cy="209550"/>
+          </a:xfrm>
+          <a:prstGeom prst="rect">
+            <a:avLst/>
+          </a:prstGeom>
+        </p:spPr>
+      </p:pic>
+      <p:sp>
+        <p:nvSpPr>
+          <p:cNvPr id="5" name="TextBox 4"/>
+          <p:cNvSpPr txBox="1"/>
+          <p:nvPr/>
+        </p:nvSpPr>
+        <p:spPr>
+          <a:xfrm>
+            <a:off x="7110977" y="3127072"/>
+            <a:ext cx="4241656" cy="523220"/>
+          </a:xfrm>
+          <a:prstGeom prst="rect">
+            <a:avLst/>
+          </a:prstGeom>
+          <a:noFill/>
+        </p:spPr>
+        <p:txBody>
+          <a:bodyPr wrap="square" rtlCol="0">
+            <a:spAutoFit/>
+          </a:bodyPr>
+          <a:lstStyle/>
+          <a:p>
+            <a:r>
+              <a:rPr lang="en-GB" sz="1400" i="1" dirty="0" smtClean="0">
+                <a:solidFill>
+                  <a:schemeClr val="tx1">
+                    <a:lumMod val="65000"/>
+                  </a:schemeClr>
+                </a:solidFill>
+              </a:rPr>
+              <a:t>If the user enters “</a:t>
+            </a:r>
+            <a:r>
+              <a:rPr lang="en-GB" sz="1400" b="1" i="1" dirty="0" smtClean="0">
+                <a:solidFill>
+                  <a:schemeClr val="tx1">
+                    <a:lumMod val="65000"/>
+                  </a:schemeClr>
+                </a:solidFill>
+              </a:rPr>
+              <a:t>105 OR 1=1</a:t>
+            </a:r>
+            <a:r>
+              <a:rPr lang="en-GB" sz="1400" i="1" dirty="0" smtClean="0">
+                <a:solidFill>
+                  <a:schemeClr val="tx1">
+                    <a:lumMod val="65000"/>
+                  </a:schemeClr>
+                </a:solidFill>
+              </a:rPr>
+              <a:t>”, the following SQL instruction will be executed:</a:t>
+            </a:r>
+            <a:endParaRPr lang="en-GB" sz="1400" i="1" dirty="0">
+              <a:solidFill>
+                <a:schemeClr val="tx1">
+                  <a:lumMod val="65000"/>
+                </a:schemeClr>
+              </a:solidFill>
+            </a:endParaRPr>
+          </a:p>
+        </p:txBody>
+      </p:sp>
+      <p:cxnSp>
+        <p:nvCxnSpPr>
+          <p:cNvPr id="7" name="Straight Arrow Connector 6"/>
+          <p:cNvCxnSpPr>
+            <a:stCxn id="4" idx="2"/>
+            <a:endCxn id="5" idx="0"/>
+          </p:cNvCxnSpPr>
+          <p:nvPr/>
+        </p:nvCxnSpPr>
+        <p:spPr>
+          <a:xfrm flipH="1">
+            <a:off x="9231805" y="2707299"/>
+            <a:ext cx="1" cy="419773"/>
+          </a:xfrm>
+          <a:prstGeom prst="straightConnector1">
+            <a:avLst/>
+          </a:prstGeom>
+          <a:ln>
+            <a:tailEnd type="triangle"/>
+          </a:ln>
+        </p:spPr>
+        <p:style>
+          <a:lnRef idx="1">
+            <a:schemeClr val="accent1"/>
+          </a:lnRef>
+          <a:fillRef idx="0">
+            <a:schemeClr val="accent1"/>
+          </a:fillRef>
+          <a:effectRef idx="0">
+            <a:schemeClr val="accent1"/>
+          </a:effectRef>
+          <a:fontRef idx="minor">
+            <a:schemeClr val="tx1"/>
+          </a:fontRef>
+        </p:style>
+      </p:cxnSp>
+      <p:pic>
+        <p:nvPicPr>
+          <p:cNvPr id="8" name="Picture 7"/>
+          <p:cNvPicPr>
+            <a:picLocks noChangeAspect="1"/>
+          </p:cNvPicPr>
+          <p:nvPr/>
+        </p:nvPicPr>
+        <p:blipFill>
+          <a:blip r:embed="rId4"/>
+          <a:stretch>
+            <a:fillRect/>
+          </a:stretch>
+        </p:blipFill>
+        <p:spPr>
+          <a:xfrm>
+            <a:off x="7245843" y="4111474"/>
+            <a:ext cx="3971925" cy="304800"/>
+          </a:xfrm>
+          <a:prstGeom prst="rect">
+            <a:avLst/>
+          </a:prstGeom>
+        </p:spPr>
+      </p:pic>
+      <p:cxnSp>
+        <p:nvCxnSpPr>
+          <p:cNvPr id="11" name="Straight Arrow Connector 10"/>
+          <p:cNvCxnSpPr>
+            <a:stCxn id="5" idx="2"/>
+            <a:endCxn id="8" idx="0"/>
+          </p:cNvCxnSpPr>
+          <p:nvPr/>
+        </p:nvCxnSpPr>
+        <p:spPr>
+          <a:xfrm>
+            <a:off x="9231805" y="3650292"/>
+            <a:ext cx="1" cy="461182"/>
+          </a:xfrm>
+          <a:prstGeom prst="straightConnector1">
+            <a:avLst/>
+          </a:prstGeom>
+          <a:ln>
+            <a:tailEnd type="triangle"/>
+          </a:ln>
+        </p:spPr>
+        <p:style>
+          <a:lnRef idx="1">
+            <a:schemeClr val="accent1"/>
+          </a:lnRef>
+          <a:fillRef idx="0">
+            <a:schemeClr val="accent1"/>
+          </a:fillRef>
+          <a:effectRef idx="0">
+            <a:schemeClr val="accent1"/>
+          </a:effectRef>
+          <a:fontRef idx="minor">
+            <a:schemeClr val="tx1"/>
+          </a:fontRef>
+        </p:style>
+      </p:cxnSp>
+      <p:sp>
+        <p:nvSpPr>
+          <p:cNvPr id="13" name="TextBox 12"/>
+          <p:cNvSpPr txBox="1"/>
+          <p:nvPr/>
+        </p:nvSpPr>
+        <p:spPr>
+          <a:xfrm>
+            <a:off x="7183315" y="4484077"/>
+            <a:ext cx="4360985" cy="523220"/>
+          </a:xfrm>
+          <a:prstGeom prst="rect">
+            <a:avLst/>
+          </a:prstGeom>
+          <a:noFill/>
+        </p:spPr>
+        <p:txBody>
+          <a:bodyPr wrap="square" rtlCol="0">
+            <a:spAutoFit/>
+          </a:bodyPr>
+          <a:lstStyle/>
+          <a:p>
+            <a:r>
+              <a:rPr lang="en-GB" sz="1400" i="1" dirty="0" smtClean="0">
+                <a:solidFill>
+                  <a:schemeClr val="tx1">
+                    <a:lumMod val="65000"/>
+                  </a:schemeClr>
+                </a:solidFill>
+              </a:rPr>
+              <a:t>Which is true for all users, and so the whole user database is returned</a:t>
+            </a:r>
+            <a:endParaRPr lang="en-GB" sz="1400" i="1" dirty="0">
+              <a:solidFill>
+                <a:schemeClr val="tx1">
+                  <a:lumMod val="65000"/>
+                </a:schemeClr>
+              </a:solidFill>
+            </a:endParaRPr>
+          </a:p>
+        </p:txBody>
+      </p:sp>
+      <p:pic>
+        <p:nvPicPr>
+          <p:cNvPr id="14" name="Picture 13"/>
+          <p:cNvPicPr>
+            <a:picLocks noChangeAspect="1"/>
+          </p:cNvPicPr>
+          <p:nvPr/>
+        </p:nvPicPr>
+        <p:blipFill>
+          <a:blip r:embed="rId5"/>
+          <a:stretch>
+            <a:fillRect/>
+          </a:stretch>
+        </p:blipFill>
+        <p:spPr>
+          <a:xfrm>
+            <a:off x="953182" y="4484077"/>
+            <a:ext cx="5229225" cy="219075"/>
+          </a:xfrm>
+          <a:prstGeom prst="rect">
+            <a:avLst/>
+          </a:prstGeom>
+        </p:spPr>
+      </p:pic>
     </p:spTree>
     <p:extLst>
       <p:ext uri="{BB962C8B-B14F-4D97-AF65-F5344CB8AC3E}">
         <p14:creationId xmlns:p14="http://schemas.microsoft.com/office/powerpoint/2010/main" val="3399940350"/>
+      </p:ext>
+    </p:extLst>
+  </p:cSld>
+  <p:clrMapOvr>
+    <a:masterClrMapping/>
+  </p:clrMapOvr>
+</p:sld>
+</file>
+
+<file path=ppt/slides/slide9.xml><?xml version="1.0" encoding="utf-8"?>
+<p:sld xmlns:a="http://schemas.openxmlformats.org/drawingml/2006/main" xmlns:r="http://schemas.openxmlformats.org/officeDocument/2006/relationships" xmlns:p="http://schemas.openxmlformats.org/presentationml/2006/main">
+  <p:cSld>
+    <p:bg>
+      <p:bgPr>
+        <a:solidFill>
+          <a:schemeClr val="bg1"/>
+        </a:solidFill>
+        <a:effectLst/>
+      </p:bgPr>
+    </p:bg>
+    <p:spTree>
+      <p:nvGrpSpPr>
+        <p:cNvPr id="1" name=""/>
+        <p:cNvGrpSpPr/>
+        <p:nvPr/>
+      </p:nvGrpSpPr>
+      <p:grpSpPr>
+        <a:xfrm>
+          <a:off x="0" y="0"/>
+          <a:ext cx="0" cy="0"/>
+          <a:chOff x="0" y="0"/>
+          <a:chExt cx="0" cy="0"/>
+        </a:xfrm>
+      </p:grpSpPr>
+      <p:sp>
+        <p:nvSpPr>
+          <p:cNvPr id="20" name="Rectangle 7">
+            <a:extLst>
+              <a:ext uri="{FF2B5EF4-FFF2-40B4-BE49-F238E27FC236}">
+                <a16:creationId xmlns:a16="http://schemas.microsoft.com/office/drawing/2014/main" id="{0B0BBD46-E160-4D02-9D82-3934E3970C6C}"/>
+              </a:ext>
+              <a:ext uri="{C183D7F6-B498-43B3-948B-1728B52AA6E4}">
+                <adec:decorative xmlns="" xmlns:adec="http://schemas.microsoft.com/office/drawing/2017/decorative" val="1"/>
+              </a:ext>
+            </a:extLst>
+          </p:cNvPr>
+          <p:cNvSpPr>
+            <a:spLocks noGrp="1" noRot="1" noChangeAspect="1" noMove="1" noResize="1" noEditPoints="1" noAdjustHandles="1" noChangeArrowheads="1" noChangeShapeType="1" noTextEdit="1"/>
+          </p:cNvSpPr>
+          <p:nvPr>
+            <p:extLst>
+              <p:ext uri="{386F3935-93C4-4BCD-93E2-E3B085C9AB24}">
+                <p16:designElem xmlns:p16="http://schemas.microsoft.com/office/powerpoint/2015/main" val="1"/>
+              </p:ext>
+            </p:extLst>
+          </p:nvPr>
+        </p:nvSpPr>
+        <p:spPr>
+          <a:xfrm>
+            <a:off x="0" y="0"/>
+            <a:ext cx="12188952" cy="6857999"/>
+          </a:xfrm>
+          <a:prstGeom prst="rect">
+            <a:avLst/>
+          </a:prstGeom>
+          <a:ln>
+            <a:noFill/>
+          </a:ln>
+        </p:spPr>
+        <p:style>
+          <a:lnRef idx="2">
+            <a:schemeClr val="accent1">
+              <a:shade val="50000"/>
+            </a:schemeClr>
+          </a:lnRef>
+          <a:fillRef idx="1">
+            <a:schemeClr val="accent1"/>
+          </a:fillRef>
+          <a:effectRef idx="0">
+            <a:schemeClr val="accent1"/>
+          </a:effectRef>
+          <a:fontRef idx="minor">
+            <a:schemeClr val="lt1"/>
+          </a:fontRef>
+        </p:style>
+        <p:txBody>
+          <a:bodyPr rtlCol="0" anchor="ctr"/>
+          <a:lstStyle/>
+          <a:p>
+            <a:pPr algn="ctr"/>
+            <a:endParaRPr lang="en-US"/>
+          </a:p>
+        </p:txBody>
+      </p:sp>
+      <p:pic>
+        <p:nvPicPr>
+          <p:cNvPr id="21" name="Picture 9">
+            <a:extLst>
+              <a:ext uri="{FF2B5EF4-FFF2-40B4-BE49-F238E27FC236}">
+                <a16:creationId xmlns:a16="http://schemas.microsoft.com/office/drawing/2014/main" id="{3114C8A4-DCE7-4155-98CA-D8826574B702}"/>
+              </a:ext>
+              <a:ext uri="{C183D7F6-B498-43B3-948B-1728B52AA6E4}">
+                <adec:decorative xmlns="" xmlns:adec="http://schemas.microsoft.com/office/drawing/2017/decorative" val="1"/>
+              </a:ext>
+            </a:extLst>
+          </p:cNvPr>
+          <p:cNvPicPr>
+            <a:picLocks noGrp="1" noRot="1" noChangeAspect="1" noMove="1" noResize="1" noEditPoints="1" noAdjustHandles="1" noChangeArrowheads="1" noChangeShapeType="1" noCrop="1"/>
+          </p:cNvPicPr>
+          <p:nvPr>
+            <p:extLst>
+              <p:ext uri="{386F3935-93C4-4BCD-93E2-E3B085C9AB24}">
+                <p16:designElem xmlns:p16="http://schemas.microsoft.com/office/powerpoint/2015/main" val="1"/>
+              </p:ext>
+            </p:extLst>
+          </p:nvPr>
+        </p:nvPicPr>
+        <p:blipFill>
+          <a:blip r:embed="rId2">
+            <a:alphaModFix amt="10000"/>
+            <a:extLst>
+              <a:ext uri="{28A0092B-C50C-407E-A947-70E740481C1C}">
+                <a14:useLocalDpi xmlns:a14="http://schemas.microsoft.com/office/drawing/2010/main" val="0"/>
+              </a:ext>
+            </a:extLst>
+          </a:blip>
+          <a:stretch>
+            <a:fillRect/>
+          </a:stretch>
+        </p:blipFill>
+        <p:spPr>
+          <a:xfrm>
+            <a:off x="0" y="0"/>
+            <a:ext cx="12192000" cy="6858000"/>
+          </a:xfrm>
+          <a:prstGeom prst="rect">
+            <a:avLst/>
+          </a:prstGeom>
+        </p:spPr>
+      </p:pic>
+      <p:sp>
+        <p:nvSpPr>
+          <p:cNvPr id="2" name="Title 1">
+            <a:extLst>
+              <a:ext uri="{FF2B5EF4-FFF2-40B4-BE49-F238E27FC236}">
+                <a16:creationId xmlns:a16="http://schemas.microsoft.com/office/drawing/2014/main" id="{604533E2-4A4D-4DAB-9F0E-EE21DE5E80CD}"/>
+              </a:ext>
+            </a:extLst>
+          </p:cNvPr>
+          <p:cNvSpPr>
+            <a:spLocks noGrp="1"/>
+          </p:cNvSpPr>
+          <p:nvPr>
+            <p:ph type="title"/>
+          </p:nvPr>
+        </p:nvSpPr>
+        <p:spPr>
+          <a:xfrm>
+            <a:off x="680321" y="321732"/>
+            <a:ext cx="9900593" cy="1080938"/>
+          </a:xfrm>
+        </p:spPr>
+        <p:txBody>
+          <a:bodyPr>
+            <a:normAutofit/>
+          </a:bodyPr>
+          <a:lstStyle/>
+          <a:p>
+            <a:r>
+              <a:rPr lang="en-GB" dirty="0" smtClean="0">
+                <a:solidFill>
+                  <a:srgbClr val="FFFFFF"/>
+                </a:solidFill>
+              </a:rPr>
+              <a:t>Vulnerabilities Research</a:t>
+            </a:r>
+            <a:endParaRPr lang="en-GB" dirty="0">
+              <a:solidFill>
+                <a:srgbClr val="FFFFFF"/>
+              </a:solidFill>
+            </a:endParaRPr>
+          </a:p>
+        </p:txBody>
+      </p:sp>
+      <p:sp>
+        <p:nvSpPr>
+          <p:cNvPr id="22" name="Rectangle 11">
+            <a:extLst>
+              <a:ext uri="{FF2B5EF4-FFF2-40B4-BE49-F238E27FC236}">
+                <a16:creationId xmlns:a16="http://schemas.microsoft.com/office/drawing/2014/main" id="{77A64E61-6D37-4CB3-8F42-66B0DACBCB0F}"/>
+              </a:ext>
+              <a:ext uri="{C183D7F6-B498-43B3-948B-1728B52AA6E4}">
+                <adec:decorative xmlns="" xmlns:adec="http://schemas.microsoft.com/office/drawing/2017/decorative" val="1"/>
+              </a:ext>
+            </a:extLst>
+          </p:cNvPr>
+          <p:cNvSpPr>
+            <a:spLocks noGrp="1" noRot="1" noChangeAspect="1" noMove="1" noResize="1" noEditPoints="1" noAdjustHandles="1" noChangeArrowheads="1" noChangeShapeType="1" noTextEdit="1"/>
+          </p:cNvSpPr>
+          <p:nvPr>
+            <p:extLst>
+              <p:ext uri="{386F3935-93C4-4BCD-93E2-E3B085C9AB24}">
+                <p16:designElem xmlns:p16="http://schemas.microsoft.com/office/powerpoint/2015/main" val="1"/>
+              </p:ext>
+            </p:extLst>
+          </p:nvPr>
+        </p:nvSpPr>
+        <p:spPr>
+          <a:xfrm>
+            <a:off x="0" y="1724402"/>
+            <a:ext cx="12192000" cy="5133597"/>
+          </a:xfrm>
+          <a:prstGeom prst="rect">
+            <a:avLst/>
+          </a:prstGeom>
+          <a:solidFill>
+            <a:schemeClr val="bg1"/>
+          </a:solidFill>
+          <a:ln>
+            <a:noFill/>
+          </a:ln>
+          <a:effectLst>
+            <a:outerShdw blurRad="88900" dist="38100" dir="16200000" rotWithShape="0">
+              <a:prstClr val="black">
+                <a:alpha val="30000"/>
+              </a:prstClr>
+            </a:outerShdw>
+          </a:effectLst>
+        </p:spPr>
+        <p:style>
+          <a:lnRef idx="2">
+            <a:schemeClr val="accent1">
+              <a:shade val="50000"/>
+            </a:schemeClr>
+          </a:lnRef>
+          <a:fillRef idx="1">
+            <a:schemeClr val="accent1"/>
+          </a:fillRef>
+          <a:effectRef idx="0">
+            <a:schemeClr val="accent1"/>
+          </a:effectRef>
+          <a:fontRef idx="minor">
+            <a:schemeClr val="lt1"/>
+          </a:fontRef>
+        </p:style>
+        <p:txBody>
+          <a:bodyPr rtlCol="0" anchor="ctr"/>
+          <a:lstStyle/>
+          <a:p>
+            <a:pPr algn="ctr"/>
+            <a:endParaRPr lang="en-US"/>
+          </a:p>
+        </p:txBody>
+      </p:sp>
+      <p:sp>
+        <p:nvSpPr>
+          <p:cNvPr id="9" name="Content Placeholder 2">
+            <a:extLst>
+              <a:ext uri="{FF2B5EF4-FFF2-40B4-BE49-F238E27FC236}">
+                <a16:creationId xmlns:a16="http://schemas.microsoft.com/office/drawing/2014/main" id="{EC704661-2884-4E4D-AE8F-BEB655F5EEF2}"/>
+              </a:ext>
+            </a:extLst>
+          </p:cNvPr>
+          <p:cNvSpPr txBox="1">
+            <a:spLocks/>
+          </p:cNvSpPr>
+          <p:nvPr/>
+        </p:nvSpPr>
+        <p:spPr>
+          <a:xfrm>
+            <a:off x="680322" y="2336873"/>
+            <a:ext cx="5966663" cy="3729819"/>
+          </a:xfrm>
+          <a:prstGeom prst="rect">
+            <a:avLst/>
+          </a:prstGeom>
+        </p:spPr>
+        <p:txBody>
+          <a:bodyPr vert="horz" lIns="91440" tIns="45720" rIns="91440" bIns="45720" rtlCol="0" anchor="t">
+            <a:normAutofit/>
+          </a:bodyPr>
+          <a:lstStyle>
+            <a:lvl1pPr marL="228600" indent="-228600" algn="l" defTabSz="914400" rtl="0" eaLnBrk="1" latinLnBrk="0" hangingPunct="1">
+              <a:lnSpc>
+                <a:spcPct val="90000"/>
+              </a:lnSpc>
+              <a:spcBef>
+                <a:spcPts val="1000"/>
+              </a:spcBef>
+              <a:buFont typeface="Arial" panose="020B0604020202020204" pitchFamily="34" charset="0"/>
+              <a:buChar char="•"/>
+              <a:defRPr sz="2400" kern="1200">
+                <a:solidFill>
+                  <a:schemeClr val="tx1"/>
+                </a:solidFill>
+                <a:latin typeface="+mn-lt"/>
+                <a:ea typeface="+mn-ea"/>
+                <a:cs typeface="+mn-cs"/>
+              </a:defRPr>
+            </a:lvl1pPr>
+            <a:lvl2pPr marL="685800" indent="-228600" algn="l" defTabSz="914400" rtl="0" eaLnBrk="1" latinLnBrk="0" hangingPunct="1">
+              <a:lnSpc>
+                <a:spcPct val="90000"/>
+              </a:lnSpc>
+              <a:spcBef>
+                <a:spcPts val="500"/>
+              </a:spcBef>
+              <a:buFont typeface="Arial" panose="020B0604020202020204" pitchFamily="34" charset="0"/>
+              <a:buChar char="•"/>
+              <a:defRPr sz="2000" kern="1200">
+                <a:solidFill>
+                  <a:schemeClr val="tx1"/>
+                </a:solidFill>
+                <a:latin typeface="+mn-lt"/>
+                <a:ea typeface="+mn-ea"/>
+                <a:cs typeface="+mn-cs"/>
+              </a:defRPr>
+            </a:lvl2pPr>
+            <a:lvl3pPr marL="1143000" indent="-228600" algn="l" defTabSz="914400" rtl="0" eaLnBrk="1" latinLnBrk="0" hangingPunct="1">
+              <a:lnSpc>
+                <a:spcPct val="90000"/>
+              </a:lnSpc>
+              <a:spcBef>
+                <a:spcPts val="500"/>
+              </a:spcBef>
+              <a:buFont typeface="Arial" panose="020B0604020202020204" pitchFamily="34" charset="0"/>
+              <a:buChar char="•"/>
+              <a:defRPr sz="1800" kern="1200">
+                <a:solidFill>
+                  <a:schemeClr val="tx1"/>
+                </a:solidFill>
+                <a:latin typeface="+mn-lt"/>
+                <a:ea typeface="+mn-ea"/>
+                <a:cs typeface="+mn-cs"/>
+              </a:defRPr>
+            </a:lvl3pPr>
+            <a:lvl4pPr marL="1600200" indent="-228600" algn="l" defTabSz="914400" rtl="0" eaLnBrk="1" latinLnBrk="0" hangingPunct="1">
+              <a:lnSpc>
+                <a:spcPct val="90000"/>
+              </a:lnSpc>
+              <a:spcBef>
+                <a:spcPts val="500"/>
+              </a:spcBef>
+              <a:buFont typeface="Arial" panose="020B0604020202020204" pitchFamily="34" charset="0"/>
+              <a:buChar char="•"/>
+              <a:defRPr sz="1600" kern="1200">
+                <a:solidFill>
+                  <a:schemeClr val="tx1"/>
+                </a:solidFill>
+                <a:latin typeface="+mn-lt"/>
+                <a:ea typeface="+mn-ea"/>
+                <a:cs typeface="+mn-cs"/>
+              </a:defRPr>
+            </a:lvl4pPr>
+            <a:lvl5pPr marL="2057400" indent="-228600" algn="l" defTabSz="914400" rtl="0" eaLnBrk="1" latinLnBrk="0" hangingPunct="1">
+              <a:lnSpc>
+                <a:spcPct val="90000"/>
+              </a:lnSpc>
+              <a:spcBef>
+                <a:spcPts val="500"/>
+              </a:spcBef>
+              <a:buFont typeface="Arial" panose="020B0604020202020204" pitchFamily="34" charset="0"/>
+              <a:buChar char="•"/>
+              <a:defRPr sz="1600" kern="1200">
+                <a:solidFill>
+                  <a:schemeClr val="tx1"/>
+                </a:solidFill>
+                <a:latin typeface="+mn-lt"/>
+                <a:ea typeface="+mn-ea"/>
+                <a:cs typeface="+mn-cs"/>
+              </a:defRPr>
+            </a:lvl5pPr>
+            <a:lvl6pPr marL="2514600" indent="-228600" algn="l" defTabSz="914400" rtl="0" eaLnBrk="1" latinLnBrk="0" hangingPunct="1">
+              <a:lnSpc>
+                <a:spcPct val="90000"/>
+              </a:lnSpc>
+              <a:spcBef>
+                <a:spcPts val="500"/>
+              </a:spcBef>
+              <a:buFont typeface="Arial" panose="020B0604020202020204" pitchFamily="34" charset="0"/>
+              <a:buChar char="•"/>
+              <a:defRPr sz="1400" kern="1200">
+                <a:solidFill>
+                  <a:schemeClr val="tx1"/>
+                </a:solidFill>
+                <a:latin typeface="+mn-lt"/>
+                <a:ea typeface="+mn-ea"/>
+                <a:cs typeface="+mn-cs"/>
+              </a:defRPr>
+            </a:lvl6pPr>
+            <a:lvl7pPr marL="2971800" indent="-228600" algn="l" defTabSz="914400" rtl="0" eaLnBrk="1" latinLnBrk="0" hangingPunct="1">
+              <a:lnSpc>
+                <a:spcPct val="90000"/>
+              </a:lnSpc>
+              <a:spcBef>
+                <a:spcPts val="500"/>
+              </a:spcBef>
+              <a:buFont typeface="Arial" panose="020B0604020202020204" pitchFamily="34" charset="0"/>
+              <a:buChar char="•"/>
+              <a:defRPr sz="1400" kern="1200">
+                <a:solidFill>
+                  <a:schemeClr val="tx1"/>
+                </a:solidFill>
+                <a:latin typeface="+mn-lt"/>
+                <a:ea typeface="+mn-ea"/>
+                <a:cs typeface="+mn-cs"/>
+              </a:defRPr>
+            </a:lvl7pPr>
+            <a:lvl8pPr marL="3429000" indent="-228600" algn="l" defTabSz="914400" rtl="0" eaLnBrk="1" latinLnBrk="0" hangingPunct="1">
+              <a:lnSpc>
+                <a:spcPct val="90000"/>
+              </a:lnSpc>
+              <a:spcBef>
+                <a:spcPts val="500"/>
+              </a:spcBef>
+              <a:buFont typeface="Arial" panose="020B0604020202020204" pitchFamily="34" charset="0"/>
+              <a:buChar char="•"/>
+              <a:defRPr sz="1400" kern="1200">
+                <a:solidFill>
+                  <a:schemeClr val="tx1"/>
+                </a:solidFill>
+                <a:latin typeface="+mn-lt"/>
+                <a:ea typeface="+mn-ea"/>
+                <a:cs typeface="+mn-cs"/>
+              </a:defRPr>
+            </a:lvl8pPr>
+            <a:lvl9pPr marL="3886200" indent="-228600" algn="l" defTabSz="914400" rtl="0" eaLnBrk="1" latinLnBrk="0" hangingPunct="1">
+              <a:lnSpc>
+                <a:spcPct val="90000"/>
+              </a:lnSpc>
+              <a:spcBef>
+                <a:spcPts val="500"/>
+              </a:spcBef>
+              <a:buFont typeface="Arial" panose="020B0604020202020204" pitchFamily="34" charset="0"/>
+              <a:buChar char="•"/>
+              <a:defRPr sz="1400" kern="1200">
+                <a:solidFill>
+                  <a:schemeClr val="tx1"/>
+                </a:solidFill>
+                <a:latin typeface="+mn-lt"/>
+                <a:ea typeface="+mn-ea"/>
+                <a:cs typeface="+mn-cs"/>
+              </a:defRPr>
+            </a:lvl9pPr>
+          </a:lstStyle>
+          <a:p>
+            <a:pPr marL="0" indent="0">
+              <a:buNone/>
+            </a:pPr>
+            <a:r>
+              <a:rPr lang="en-GB" sz="1800" dirty="0" smtClean="0"/>
+              <a:t>Other potential vulnerabilities may include:</a:t>
+            </a:r>
+          </a:p>
+          <a:p>
+            <a:r>
+              <a:rPr lang="en-GB" sz="1800" dirty="0" smtClean="0"/>
+              <a:t>Insecure password storage</a:t>
+            </a:r>
+          </a:p>
+          <a:p>
+            <a:r>
+              <a:rPr lang="en-GB" sz="1800" dirty="0" smtClean="0"/>
+              <a:t>Poor backup management</a:t>
+            </a:r>
+          </a:p>
+          <a:p>
+            <a:r>
+              <a:rPr lang="en-GB" sz="1800" dirty="0" smtClean="0"/>
+              <a:t>Interaction between different parts of the database (in particular parts that were written by different teams)</a:t>
+            </a:r>
+            <a:endParaRPr lang="en-GB" sz="1800" dirty="0" smtClean="0"/>
+          </a:p>
+          <a:p>
+            <a:pPr marL="0" indent="0">
+              <a:buNone/>
+            </a:pPr>
+            <a:endParaRPr lang="en-GB" sz="1800" dirty="0"/>
+          </a:p>
+        </p:txBody>
+      </p:sp>
+    </p:spTree>
+    <p:extLst>
+      <p:ext uri="{BB962C8B-B14F-4D97-AF65-F5344CB8AC3E}">
+        <p14:creationId xmlns:p14="http://schemas.microsoft.com/office/powerpoint/2010/main" val="933078630"/>
       </p:ext>
     </p:extLst>
   </p:cSld>

</xml_diff>

<commit_message>
updata powerpoint with example tests
</commit_message>
<xml_diff>
--- a/Files/Finle prgress, Team 1 Group 6.pptx
+++ b/Files/Finle prgress, Team 1 Group 6.pptx
@@ -7869,7 +7869,7 @@
                 <a16:creationId xmlns:a16="http://schemas.microsoft.com/office/drawing/2014/main" id="{0B0BBD46-E160-4D02-9D82-3934E3970C6C}"/>
               </a:ext>
               <a:ext uri="{C183D7F6-B498-43B3-948B-1728B52AA6E4}">
-                <adec:decorative xmlns="" xmlns:adec="http://schemas.microsoft.com/office/drawing/2017/decorative" val="1"/>
+                <adec:decorative xmlns:adec="http://schemas.microsoft.com/office/drawing/2017/decorative" xmlns="" val="1"/>
               </a:ext>
             </a:extLst>
           </p:cNvPr>
@@ -7929,7 +7929,7 @@
                 <a16:creationId xmlns:a16="http://schemas.microsoft.com/office/drawing/2014/main" id="{3114C8A4-DCE7-4155-98CA-D8826574B702}"/>
               </a:ext>
               <a:ext uri="{C183D7F6-B498-43B3-948B-1728B52AA6E4}">
-                <adec:decorative xmlns="" xmlns:adec="http://schemas.microsoft.com/office/drawing/2017/decorative" val="1"/>
+                <adec:decorative xmlns:adec="http://schemas.microsoft.com/office/drawing/2017/decorative" xmlns="" val="1"/>
               </a:ext>
             </a:extLst>
           </p:cNvPr>
@@ -8019,7 +8019,7 @@
                 <a16:creationId xmlns:a16="http://schemas.microsoft.com/office/drawing/2014/main" id="{77A64E61-6D37-4CB3-8F42-66B0DACBCB0F}"/>
               </a:ext>
               <a:ext uri="{C183D7F6-B498-43B3-948B-1728B52AA6E4}">
-                <adec:decorative xmlns="" xmlns:adec="http://schemas.microsoft.com/office/drawing/2017/decorative" val="1"/>
+                <adec:decorative xmlns:adec="http://schemas.microsoft.com/office/drawing/2017/decorative" xmlns="" val="1"/>
               </a:ext>
             </a:extLst>
           </p:cNvPr>
@@ -8393,7 +8393,7 @@
                 <a16:creationId xmlns:a16="http://schemas.microsoft.com/office/drawing/2014/main" id="{0B0BBD46-E160-4D02-9D82-3934E3970C6C}"/>
               </a:ext>
               <a:ext uri="{C183D7F6-B498-43B3-948B-1728B52AA6E4}">
-                <adec:decorative xmlns="" xmlns:adec="http://schemas.microsoft.com/office/drawing/2017/decorative" val="1"/>
+                <adec:decorative xmlns:adec="http://schemas.microsoft.com/office/drawing/2017/decorative" xmlns="" val="1"/>
               </a:ext>
             </a:extLst>
           </p:cNvPr>
@@ -8453,7 +8453,7 @@
                 <a16:creationId xmlns:a16="http://schemas.microsoft.com/office/drawing/2014/main" id="{3114C8A4-DCE7-4155-98CA-D8826574B702}"/>
               </a:ext>
               <a:ext uri="{C183D7F6-B498-43B3-948B-1728B52AA6E4}">
-                <adec:decorative xmlns="" xmlns:adec="http://schemas.microsoft.com/office/drawing/2017/decorative" val="1"/>
+                <adec:decorative xmlns:adec="http://schemas.microsoft.com/office/drawing/2017/decorative" xmlns="" val="1"/>
               </a:ext>
             </a:extLst>
           </p:cNvPr>
@@ -8551,7 +8551,7 @@
                 <a16:creationId xmlns:a16="http://schemas.microsoft.com/office/drawing/2014/main" id="{77A64E61-6D37-4CB3-8F42-66B0DACBCB0F}"/>
               </a:ext>
               <a:ext uri="{C183D7F6-B498-43B3-948B-1728B52AA6E4}">
-                <adec:decorative xmlns="" xmlns:adec="http://schemas.microsoft.com/office/drawing/2017/decorative" val="1"/>
+                <adec:decorative xmlns:adec="http://schemas.microsoft.com/office/drawing/2017/decorative" xmlns="" val="1"/>
               </a:ext>
             </a:extLst>
           </p:cNvPr>
@@ -8825,7 +8825,7 @@
                 <a16:creationId xmlns:a16="http://schemas.microsoft.com/office/drawing/2014/main" id="{0B0BBD46-E160-4D02-9D82-3934E3970C6C}"/>
               </a:ext>
               <a:ext uri="{C183D7F6-B498-43B3-948B-1728B52AA6E4}">
-                <adec:decorative xmlns="" xmlns:adec="http://schemas.microsoft.com/office/drawing/2017/decorative" val="1"/>
+                <adec:decorative xmlns:adec="http://schemas.microsoft.com/office/drawing/2017/decorative" xmlns="" val="1"/>
               </a:ext>
             </a:extLst>
           </p:cNvPr>
@@ -8885,7 +8885,7 @@
                 <a16:creationId xmlns:a16="http://schemas.microsoft.com/office/drawing/2014/main" id="{3114C8A4-DCE7-4155-98CA-D8826574B702}"/>
               </a:ext>
               <a:ext uri="{C183D7F6-B498-43B3-948B-1728B52AA6E4}">
-                <adec:decorative xmlns="" xmlns:adec="http://schemas.microsoft.com/office/drawing/2017/decorative" val="1"/>
+                <adec:decorative xmlns:adec="http://schemas.microsoft.com/office/drawing/2017/decorative" xmlns="" val="1"/>
               </a:ext>
             </a:extLst>
           </p:cNvPr>
@@ -8983,7 +8983,7 @@
                 <a16:creationId xmlns:a16="http://schemas.microsoft.com/office/drawing/2014/main" id="{77A64E61-6D37-4CB3-8F42-66B0DACBCB0F}"/>
               </a:ext>
               <a:ext uri="{C183D7F6-B498-43B3-948B-1728B52AA6E4}">
-                <adec:decorative xmlns="" xmlns:adec="http://schemas.microsoft.com/office/drawing/2017/decorative" val="1"/>
+                <adec:decorative xmlns:adec="http://schemas.microsoft.com/office/drawing/2017/decorative" xmlns="" val="1"/>
               </a:ext>
             </a:extLst>
           </p:cNvPr>
@@ -9168,7 +9168,7 @@
                 <a16:creationId xmlns:a16="http://schemas.microsoft.com/office/drawing/2014/main" id="{0B0BBD46-E160-4D02-9D82-3934E3970C6C}"/>
               </a:ext>
               <a:ext uri="{C183D7F6-B498-43B3-948B-1728B52AA6E4}">
-                <adec:decorative xmlns="" xmlns:adec="http://schemas.microsoft.com/office/drawing/2017/decorative" val="1"/>
+                <adec:decorative xmlns:adec="http://schemas.microsoft.com/office/drawing/2017/decorative" xmlns="" val="1"/>
               </a:ext>
             </a:extLst>
           </p:cNvPr>
@@ -9228,7 +9228,7 @@
                 <a16:creationId xmlns:a16="http://schemas.microsoft.com/office/drawing/2014/main" id="{3114C8A4-DCE7-4155-98CA-D8826574B702}"/>
               </a:ext>
               <a:ext uri="{C183D7F6-B498-43B3-948B-1728B52AA6E4}">
-                <adec:decorative xmlns="" xmlns:adec="http://schemas.microsoft.com/office/drawing/2017/decorative" val="1"/>
+                <adec:decorative xmlns:adec="http://schemas.microsoft.com/office/drawing/2017/decorative" xmlns="" val="1"/>
               </a:ext>
             </a:extLst>
           </p:cNvPr>
@@ -9326,7 +9326,7 @@
                 <a16:creationId xmlns:a16="http://schemas.microsoft.com/office/drawing/2014/main" id="{77A64E61-6D37-4CB3-8F42-66B0DACBCB0F}"/>
               </a:ext>
               <a:ext uri="{C183D7F6-B498-43B3-948B-1728B52AA6E4}">
-                <adec:decorative xmlns="" xmlns:adec="http://schemas.microsoft.com/office/drawing/2017/decorative" val="1"/>
+                <adec:decorative xmlns:adec="http://schemas.microsoft.com/office/drawing/2017/decorative" xmlns="" val="1"/>
               </a:ext>
             </a:extLst>
           </p:cNvPr>
@@ -9509,7 +9509,7 @@
                 <a16:creationId xmlns:a16="http://schemas.microsoft.com/office/drawing/2014/main" id="{0B0BBD46-E160-4D02-9D82-3934E3970C6C}"/>
               </a:ext>
               <a:ext uri="{C183D7F6-B498-43B3-948B-1728B52AA6E4}">
-                <adec:decorative xmlns="" xmlns:adec="http://schemas.microsoft.com/office/drawing/2017/decorative" val="1"/>
+                <adec:decorative xmlns:adec="http://schemas.microsoft.com/office/drawing/2017/decorative" xmlns="" val="1"/>
               </a:ext>
             </a:extLst>
           </p:cNvPr>
@@ -9569,7 +9569,7 @@
                 <a16:creationId xmlns:a16="http://schemas.microsoft.com/office/drawing/2014/main" id="{3114C8A4-DCE7-4155-98CA-D8826574B702}"/>
               </a:ext>
               <a:ext uri="{C183D7F6-B498-43B3-948B-1728B52AA6E4}">
-                <adec:decorative xmlns="" xmlns:adec="http://schemas.microsoft.com/office/drawing/2017/decorative" val="1"/>
+                <adec:decorative xmlns:adec="http://schemas.microsoft.com/office/drawing/2017/decorative" xmlns="" val="1"/>
               </a:ext>
             </a:extLst>
           </p:cNvPr>
@@ -9667,7 +9667,7 @@
                 <a16:creationId xmlns:a16="http://schemas.microsoft.com/office/drawing/2014/main" id="{77A64E61-6D37-4CB3-8F42-66B0DACBCB0F}"/>
               </a:ext>
               <a:ext uri="{C183D7F6-B498-43B3-948B-1728B52AA6E4}">
-                <adec:decorative xmlns="" xmlns:adec="http://schemas.microsoft.com/office/drawing/2017/decorative" val="1"/>
+                <adec:decorative xmlns:adec="http://schemas.microsoft.com/office/drawing/2017/decorative" xmlns="" val="1"/>
               </a:ext>
             </a:extLst>
           </p:cNvPr>
@@ -9850,7 +9850,7 @@
                 <a16:creationId xmlns:a16="http://schemas.microsoft.com/office/drawing/2014/main" id="{0B0BBD46-E160-4D02-9D82-3934E3970C6C}"/>
               </a:ext>
               <a:ext uri="{C183D7F6-B498-43B3-948B-1728B52AA6E4}">
-                <adec:decorative xmlns="" xmlns:adec="http://schemas.microsoft.com/office/drawing/2017/decorative" val="1"/>
+                <adec:decorative xmlns:adec="http://schemas.microsoft.com/office/drawing/2017/decorative" xmlns="" val="1"/>
               </a:ext>
             </a:extLst>
           </p:cNvPr>
@@ -9910,7 +9910,7 @@
                 <a16:creationId xmlns:a16="http://schemas.microsoft.com/office/drawing/2014/main" id="{3114C8A4-DCE7-4155-98CA-D8826574B702}"/>
               </a:ext>
               <a:ext uri="{C183D7F6-B498-43B3-948B-1728B52AA6E4}">
-                <adec:decorative xmlns="" xmlns:adec="http://schemas.microsoft.com/office/drawing/2017/decorative" val="1"/>
+                <adec:decorative xmlns:adec="http://schemas.microsoft.com/office/drawing/2017/decorative" xmlns="" val="1"/>
               </a:ext>
             </a:extLst>
           </p:cNvPr>
@@ -9995,7 +9995,7 @@
                 <a16:creationId xmlns:a16="http://schemas.microsoft.com/office/drawing/2014/main" id="{77A64E61-6D37-4CB3-8F42-66B0DACBCB0F}"/>
               </a:ext>
               <a:ext uri="{C183D7F6-B498-43B3-948B-1728B52AA6E4}">
-                <adec:decorative xmlns="" xmlns:adec="http://schemas.microsoft.com/office/drawing/2017/decorative" val="1"/>
+                <adec:decorative xmlns:adec="http://schemas.microsoft.com/office/drawing/2017/decorative" xmlns="" val="1"/>
               </a:ext>
             </a:extLst>
           </p:cNvPr>
@@ -10296,11 +10296,7 @@
             </a:r>
             <a:r>
               <a:rPr lang="en-GB" sz="1800" dirty="0" smtClean="0"/>
-              <a:t> module has not been used much, due to the way the code was written. Looking back, it would have been better to use an object oriented design to make better use of unit testing</a:t>
-            </a:r>
-            <a:r>
-              <a:rPr lang="en-GB" sz="1800" dirty="0" smtClean="0"/>
-              <a:t>.</a:t>
+              <a:t> module has not been used much, due to the way the code was written. Looking back, it would have been better to use an object oriented design to make better use of unit testing.</a:t>
             </a:r>
           </a:p>
           <a:p>
@@ -10311,7 +10307,6 @@
               <a:rPr lang="en-GB" sz="1800" dirty="0" smtClean="0"/>
               <a:t>We are considering converting to an object oriented solution (if we have time)</a:t>
             </a:r>
-            <a:endParaRPr lang="en-GB" sz="1800" dirty="0" smtClean="0"/>
           </a:p>
           <a:p>
             <a:endParaRPr lang="en-GB" sz="1800" dirty="0" smtClean="0"/>
@@ -10367,7 +10362,7 @@
                 <a16:creationId xmlns:a16="http://schemas.microsoft.com/office/drawing/2014/main" id="{0B0BBD46-E160-4D02-9D82-3934E3970C6C}"/>
               </a:ext>
               <a:ext uri="{C183D7F6-B498-43B3-948B-1728B52AA6E4}">
-                <adec:decorative xmlns="" xmlns:adec="http://schemas.microsoft.com/office/drawing/2017/decorative" val="1"/>
+                <adec:decorative xmlns:adec="http://schemas.microsoft.com/office/drawing/2017/decorative" xmlns="" val="1"/>
               </a:ext>
             </a:extLst>
           </p:cNvPr>
@@ -10427,7 +10422,7 @@
                 <a16:creationId xmlns:a16="http://schemas.microsoft.com/office/drawing/2014/main" id="{3114C8A4-DCE7-4155-98CA-D8826574B702}"/>
               </a:ext>
               <a:ext uri="{C183D7F6-B498-43B3-948B-1728B52AA6E4}">
-                <adec:decorative xmlns="" xmlns:adec="http://schemas.microsoft.com/office/drawing/2017/decorative" val="1"/>
+                <adec:decorative xmlns:adec="http://schemas.microsoft.com/office/drawing/2017/decorative" xmlns="" val="1"/>
               </a:ext>
             </a:extLst>
           </p:cNvPr>
@@ -10512,7 +10507,7 @@
                 <a16:creationId xmlns:a16="http://schemas.microsoft.com/office/drawing/2014/main" id="{77A64E61-6D37-4CB3-8F42-66B0DACBCB0F}"/>
               </a:ext>
               <a:ext uri="{C183D7F6-B498-43B3-948B-1728B52AA6E4}">
-                <adec:decorative xmlns="" xmlns:adec="http://schemas.microsoft.com/office/drawing/2017/decorative" val="1"/>
+                <adec:decorative xmlns:adec="http://schemas.microsoft.com/office/drawing/2017/decorative" xmlns="" val="1"/>
               </a:ext>
             </a:extLst>
           </p:cNvPr>
@@ -10779,6 +10774,77 @@
           </a:p>
         </p:txBody>
       </p:sp>
+      <p:pic>
+        <p:nvPicPr>
+          <p:cNvPr id="3" name="Picture 2"/>
+          <p:cNvPicPr>
+            <a:picLocks noChangeAspect="1"/>
+          </p:cNvPicPr>
+          <p:nvPr/>
+        </p:nvPicPr>
+        <p:blipFill rotWithShape="1">
+          <a:blip r:embed="rId3"/>
+          <a:srcRect l="32917" t="36481" r="34896" b="24259"/>
+          <a:stretch/>
+        </p:blipFill>
+        <p:spPr>
+          <a:xfrm>
+            <a:off x="304800" y="2820836"/>
+            <a:ext cx="4968070" cy="3408514"/>
+          </a:xfrm>
+          <a:prstGeom prst="rect">
+            <a:avLst/>
+          </a:prstGeom>
+        </p:spPr>
+      </p:pic>
+      <p:pic>
+        <p:nvPicPr>
+          <p:cNvPr id="4" name="Picture 3"/>
+          <p:cNvPicPr>
+            <a:picLocks noChangeAspect="1"/>
+          </p:cNvPicPr>
+          <p:nvPr/>
+        </p:nvPicPr>
+        <p:blipFill>
+          <a:blip r:embed="rId4"/>
+          <a:stretch>
+            <a:fillRect/>
+          </a:stretch>
+        </p:blipFill>
+        <p:spPr>
+          <a:xfrm>
+            <a:off x="3276300" y="-24723"/>
+            <a:ext cx="6410325" cy="2771775"/>
+          </a:xfrm>
+          <a:prstGeom prst="rect">
+            <a:avLst/>
+          </a:prstGeom>
+        </p:spPr>
+      </p:pic>
+      <p:pic>
+        <p:nvPicPr>
+          <p:cNvPr id="5" name="Picture 4"/>
+          <p:cNvPicPr>
+            <a:picLocks noChangeAspect="1"/>
+          </p:cNvPicPr>
+          <p:nvPr/>
+        </p:nvPicPr>
+        <p:blipFill>
+          <a:blip r:embed="rId5"/>
+          <a:stretch>
+            <a:fillRect/>
+          </a:stretch>
+        </p:blipFill>
+        <p:spPr>
+          <a:xfrm>
+            <a:off x="7639050" y="1148985"/>
+            <a:ext cx="4419667" cy="5709014"/>
+          </a:xfrm>
+          <a:prstGeom prst="rect">
+            <a:avLst/>
+          </a:prstGeom>
+        </p:spPr>
+      </p:pic>
     </p:spTree>
     <p:extLst>
       <p:ext uri="{BB962C8B-B14F-4D97-AF65-F5344CB8AC3E}">
@@ -10825,7 +10891,7 @@
                 <a16:creationId xmlns:a16="http://schemas.microsoft.com/office/drawing/2014/main" id="{0B0BBD46-E160-4D02-9D82-3934E3970C6C}"/>
               </a:ext>
               <a:ext uri="{C183D7F6-B498-43B3-948B-1728B52AA6E4}">
-                <adec:decorative xmlns="" xmlns:adec="http://schemas.microsoft.com/office/drawing/2017/decorative" val="1"/>
+                <adec:decorative xmlns:adec="http://schemas.microsoft.com/office/drawing/2017/decorative" xmlns="" val="1"/>
               </a:ext>
             </a:extLst>
           </p:cNvPr>
@@ -10885,7 +10951,7 @@
                 <a16:creationId xmlns:a16="http://schemas.microsoft.com/office/drawing/2014/main" id="{3114C8A4-DCE7-4155-98CA-D8826574B702}"/>
               </a:ext>
               <a:ext uri="{C183D7F6-B498-43B3-948B-1728B52AA6E4}">
-                <adec:decorative xmlns="" xmlns:adec="http://schemas.microsoft.com/office/drawing/2017/decorative" val="1"/>
+                <adec:decorative xmlns:adec="http://schemas.microsoft.com/office/drawing/2017/decorative" xmlns="" val="1"/>
               </a:ext>
             </a:extLst>
           </p:cNvPr>
@@ -10975,7 +11041,7 @@
                 <a16:creationId xmlns:a16="http://schemas.microsoft.com/office/drawing/2014/main" id="{77A64E61-6D37-4CB3-8F42-66B0DACBCB0F}"/>
               </a:ext>
               <a:ext uri="{C183D7F6-B498-43B3-948B-1728B52AA6E4}">
-                <adec:decorative xmlns="" xmlns:adec="http://schemas.microsoft.com/office/drawing/2017/decorative" val="1"/>
+                <adec:decorative xmlns:adec="http://schemas.microsoft.com/office/drawing/2017/decorative" xmlns="" val="1"/>
               </a:ext>
             </a:extLst>
           </p:cNvPr>
@@ -11564,7 +11630,7 @@
                 <a16:creationId xmlns:a16="http://schemas.microsoft.com/office/drawing/2014/main" id="{0B0BBD46-E160-4D02-9D82-3934E3970C6C}"/>
               </a:ext>
               <a:ext uri="{C183D7F6-B498-43B3-948B-1728B52AA6E4}">
-                <adec:decorative xmlns="" xmlns:adec="http://schemas.microsoft.com/office/drawing/2017/decorative" val="1"/>
+                <adec:decorative xmlns:adec="http://schemas.microsoft.com/office/drawing/2017/decorative" xmlns="" val="1"/>
               </a:ext>
             </a:extLst>
           </p:cNvPr>
@@ -11624,7 +11690,7 @@
                 <a16:creationId xmlns:a16="http://schemas.microsoft.com/office/drawing/2014/main" id="{3114C8A4-DCE7-4155-98CA-D8826574B702}"/>
               </a:ext>
               <a:ext uri="{C183D7F6-B498-43B3-948B-1728B52AA6E4}">
-                <adec:decorative xmlns="" xmlns:adec="http://schemas.microsoft.com/office/drawing/2017/decorative" val="1"/>
+                <adec:decorative xmlns:adec="http://schemas.microsoft.com/office/drawing/2017/decorative" xmlns="" val="1"/>
               </a:ext>
             </a:extLst>
           </p:cNvPr>
@@ -11714,7 +11780,7 @@
                 <a16:creationId xmlns:a16="http://schemas.microsoft.com/office/drawing/2014/main" id="{77A64E61-6D37-4CB3-8F42-66B0DACBCB0F}"/>
               </a:ext>
               <a:ext uri="{C183D7F6-B498-43B3-948B-1728B52AA6E4}">
-                <adec:decorative xmlns="" xmlns:adec="http://schemas.microsoft.com/office/drawing/2017/decorative" val="1"/>
+                <adec:decorative xmlns:adec="http://schemas.microsoft.com/office/drawing/2017/decorative" xmlns="" val="1"/>
               </a:ext>
             </a:extLst>
           </p:cNvPr>
@@ -11993,7 +12059,6 @@
               <a:rPr lang="en-GB" sz="1800" dirty="0" smtClean="0"/>
               <a:t>Interaction between different parts of the database (in particular parts that were written by different teams)</a:t>
             </a:r>
-            <a:endParaRPr lang="en-GB" sz="1800" dirty="0" smtClean="0"/>
           </a:p>
           <a:p>
             <a:pPr marL="0" indent="0">

</xml_diff>